<commit_message>
Initial checkin of Problem 3.
</commit_message>
<xml_diff>
--- a/FiveEasyPieces1.pptx
+++ b/FiveEasyPieces1.pptx
@@ -8309,7 +8309,23 @@
                   <a:srgbClr val="FFFF00"/>
                 </a:solidFill>
               </a:rPr>
-              <a:t>The LINQ version takes 3 times as long as the imperative version</a:t>
+              <a:t>The LINQ version </a:t>
+            </a:r>
+            <a:r>
+              <a:rPr lang="en-US" b="0" smtClean="0">
+                <a:solidFill>
+                  <a:srgbClr val="FFFF00"/>
+                </a:solidFill>
+              </a:rPr>
+              <a:t>takes &gt;3 </a:t>
+            </a:r>
+            <a:r>
+              <a:rPr lang="en-US" b="0" dirty="0" smtClean="0">
+                <a:solidFill>
+                  <a:srgbClr val="FFFF00"/>
+                </a:solidFill>
+              </a:rPr>
+              <a:t>times as long as the imperative version</a:t>
             </a:r>
           </a:p>
         </p:txBody>

</xml_diff>

<commit_message>
Working on slides for problem 2.
</commit_message>
<xml_diff>
--- a/FiveEasyPieces1.pptx
+++ b/FiveEasyPieces1.pptx
@@ -5,10 +5,10 @@
     <p:sldMasterId id="2147483648" r:id="rId1"/>
   </p:sldMasterIdLst>
   <p:notesMasterIdLst>
-    <p:notesMasterId r:id="rId31"/>
+    <p:notesMasterId r:id="rId32"/>
   </p:notesMasterIdLst>
   <p:handoutMasterIdLst>
-    <p:handoutMasterId r:id="rId32"/>
+    <p:handoutMasterId r:id="rId33"/>
   </p:handoutMasterIdLst>
   <p:sldIdLst>
     <p:sldId id="256" r:id="rId2"/>
@@ -40,6 +40,7 @@
     <p:sldId id="382" r:id="rId28"/>
     <p:sldId id="383" r:id="rId29"/>
     <p:sldId id="384" r:id="rId30"/>
+    <p:sldId id="385" r:id="rId31"/>
   </p:sldIdLst>
   <p:sldSz cx="9144000" cy="6858000" type="screen4x3"/>
   <p:notesSz cx="6954838" cy="9240838"/>
@@ -689,7 +690,7 @@
         <p:nvSpPr>
           <p:cNvPr id="21511" name="Rectangle 7"/>
           <p:cNvSpPr>
-            <a:spLocks noChangeArrowheads="1" noTextEdit="1"/>
+            <a:spLocks noGrp="1" noRot="1" noChangeAspect="1" noChangeArrowheads="1" noTextEdit="1"/>
           </p:cNvSpPr>
           <p:nvPr>
             <p:ph type="sldImg" idx="2"/>
@@ -1020,7 +1021,7 @@
         <p:nvSpPr>
           <p:cNvPr id="22531" name="Rectangle 2"/>
           <p:cNvSpPr>
-            <a:spLocks noChangeArrowheads="1" noTextEdit="1"/>
+            <a:spLocks noGrp="1" noRot="1" noChangeAspect="1" noChangeArrowheads="1" noTextEdit="1"/>
           </p:cNvSpPr>
           <p:nvPr>
             <p:ph type="sldImg"/>
@@ -6601,7 +6602,6 @@
               <a:rPr lang="en-US" sz="5400" dirty="0" smtClean="0"/>
               <a:t>Multiples of 3 and 5</a:t>
             </a:r>
-            <a:endParaRPr lang="en-US" sz="5400" dirty="0" smtClean="0"/>
           </a:p>
         </p:txBody>
       </p:sp>
@@ -6632,15 +6632,7 @@
                   <a:srgbClr val="FFFFFF"/>
                 </a:solidFill>
               </a:rPr>
-              <a:t>David </a:t>
-            </a:r>
-            <a:r>
-              <a:rPr lang="en-US" b="1" dirty="0" smtClean="0">
-                <a:solidFill>
-                  <a:srgbClr val="FFFFFF"/>
-                </a:solidFill>
-              </a:rPr>
-              <a:t>Sanders</a:t>
+              <a:t>David Sanders</a:t>
             </a:r>
           </a:p>
           <a:p>
@@ -6718,7 +6710,6 @@
               <a:rPr lang="en-US" dirty="0" smtClean="0"/>
               <a:t>Extension Methods</a:t>
             </a:r>
-            <a:endParaRPr lang="en-US" dirty="0" smtClean="0"/>
           </a:p>
         </p:txBody>
       </p:sp>
@@ -6969,7 +6960,6 @@
               <a:rPr lang="en-US" dirty="0" smtClean="0"/>
               <a:t>Delegates and Lambdas</a:t>
             </a:r>
-            <a:endParaRPr lang="en-US" dirty="0" smtClean="0"/>
           </a:p>
         </p:txBody>
       </p:sp>
@@ -7362,7 +7352,6 @@
               <a:rPr lang="en-US" dirty="0" smtClean="0"/>
               <a:t>Delegates and Lambdas</a:t>
             </a:r>
-            <a:endParaRPr lang="en-US" dirty="0" smtClean="0"/>
           </a:p>
         </p:txBody>
       </p:sp>
@@ -7676,7 +7665,6 @@
               <a:rPr lang="en-US" dirty="0" smtClean="0"/>
               <a:t>Performance Comparison</a:t>
             </a:r>
-            <a:endParaRPr lang="en-US" dirty="0" smtClean="0"/>
           </a:p>
         </p:txBody>
       </p:sp>
@@ -8386,7 +8374,6 @@
               <a:rPr lang="en-US" dirty="0" smtClean="0"/>
               <a:t>Imperative C++</a:t>
             </a:r>
-            <a:endParaRPr lang="en-US" dirty="0" smtClean="0"/>
           </a:p>
         </p:txBody>
       </p:sp>
@@ -8877,7 +8864,6 @@
               <a:rPr lang="en-US" dirty="0" smtClean="0"/>
               <a:t>Functional C++</a:t>
             </a:r>
-            <a:endParaRPr lang="en-US" dirty="0" smtClean="0"/>
           </a:p>
         </p:txBody>
       </p:sp>
@@ -9356,7 +9342,6 @@
               <a:rPr lang="en-US" dirty="0" smtClean="0"/>
               <a:t>Performance Comparison</a:t>
             </a:r>
-            <a:endParaRPr lang="en-US" dirty="0" smtClean="0"/>
           </a:p>
         </p:txBody>
       </p:sp>
@@ -10252,7 +10237,6 @@
               <a:rPr lang="en-US" dirty="0" smtClean="0"/>
               <a:t>Is There a Better Way?</a:t>
             </a:r>
-            <a:endParaRPr lang="en-US" dirty="0" smtClean="0"/>
           </a:p>
         </p:txBody>
       </p:sp>
@@ -11205,7 +11189,6 @@
               <a:rPr lang="en-US" dirty="0" smtClean="0"/>
               <a:t>Imperative C++</a:t>
             </a:r>
-            <a:endParaRPr lang="en-US" dirty="0" smtClean="0"/>
           </a:p>
         </p:txBody>
       </p:sp>
@@ -11540,7 +11523,6 @@
               <a:rPr lang="en-US" dirty="0" smtClean="0"/>
               <a:t>Iterator Methods</a:t>
             </a:r>
-            <a:endParaRPr lang="en-US" dirty="0" smtClean="0"/>
           </a:p>
         </p:txBody>
       </p:sp>
@@ -12152,7 +12134,6 @@
               <a:rPr lang="en-US" dirty="0" smtClean="0"/>
               <a:t>More Functional C#</a:t>
             </a:r>
-            <a:endParaRPr lang="en-US" dirty="0" smtClean="0"/>
           </a:p>
         </p:txBody>
       </p:sp>
@@ -13030,7 +13011,6 @@
               <a:rPr lang="en-US" dirty="0" smtClean="0"/>
               <a:t>Performance Comparison</a:t>
             </a:r>
-            <a:endParaRPr lang="en-US" dirty="0" smtClean="0"/>
           </a:p>
         </p:txBody>
       </p:sp>
@@ -14344,7 +14324,6 @@
               <a:rPr lang="en-US" dirty="0" smtClean="0"/>
               <a:t>The Legend of Young Carl Gauss</a:t>
             </a:r>
-            <a:endParaRPr lang="en-US" dirty="0" smtClean="0"/>
           </a:p>
         </p:txBody>
       </p:sp>
@@ -14693,7 +14672,6 @@
               <a:rPr lang="en-US" dirty="0" smtClean="0"/>
               <a:t>Triangular Numbers to the Rescue</a:t>
             </a:r>
-            <a:endParaRPr lang="en-US" dirty="0" smtClean="0"/>
           </a:p>
         </p:txBody>
       </p:sp>
@@ -15018,7 +14996,6 @@
               <a:rPr lang="en-US" dirty="0" smtClean="0"/>
               <a:t>Triangular Numbers to the Rescue</a:t>
             </a:r>
-            <a:endParaRPr lang="en-US" dirty="0" smtClean="0"/>
           </a:p>
         </p:txBody>
       </p:sp>
@@ -15379,7 +15356,6 @@
               <a:rPr lang="en-US" dirty="0" smtClean="0"/>
               <a:t>Performance Comparison</a:t>
             </a:r>
-            <a:endParaRPr lang="en-US" dirty="0" smtClean="0"/>
           </a:p>
         </p:txBody>
       </p:sp>
@@ -17230,7 +17206,6 @@
               <a:rPr lang="en-US" dirty="0" smtClean="0"/>
               <a:t>Logistics</a:t>
             </a:r>
-            <a:endParaRPr lang="en-US" dirty="0" smtClean="0"/>
           </a:p>
         </p:txBody>
       </p:sp>
@@ -17446,6 +17421,290 @@
         </p:txBody>
       </p:sp>
     </p:spTree>
+  </p:cSld>
+  <p:clrMapOvr>
+    <a:masterClrMapping/>
+  </p:clrMapOvr>
+  <p:timing>
+    <p:tnLst>
+      <p:par>
+        <p:cTn id="1" dur="indefinite" restart="never" nodeType="tmRoot"/>
+      </p:par>
+    </p:tnLst>
+  </p:timing>
+</p:sld>
+</file>
+
+<file path=ppt/slides/slide30.xml><?xml version="1.0" encoding="utf-8"?>
+<p:sld xmlns:a="http://schemas.openxmlformats.org/drawingml/2006/main" xmlns:r="http://schemas.openxmlformats.org/officeDocument/2006/relationships" xmlns:p="http://schemas.openxmlformats.org/presentationml/2006/main">
+  <p:cSld>
+    <p:spTree>
+      <p:nvGrpSpPr>
+        <p:cNvPr id="1" name=""/>
+        <p:cNvGrpSpPr/>
+        <p:nvPr/>
+      </p:nvGrpSpPr>
+      <p:grpSpPr>
+        <a:xfrm>
+          <a:off x="0" y="0"/>
+          <a:ext cx="0" cy="0"/>
+          <a:chOff x="0" y="0"/>
+          <a:chExt cx="0" cy="0"/>
+        </a:xfrm>
+      </p:grpSpPr>
+      <p:sp>
+        <p:nvSpPr>
+          <p:cNvPr id="2" name="Title 1"/>
+          <p:cNvSpPr>
+            <a:spLocks noGrp="1"/>
+          </p:cNvSpPr>
+          <p:nvPr>
+            <p:ph type="title"/>
+          </p:nvPr>
+        </p:nvSpPr>
+        <p:spPr/>
+        <p:txBody>
+          <a:bodyPr/>
+          <a:lstStyle/>
+          <a:p>
+            <a:r>
+              <a:rPr lang="en-US" dirty="0" smtClean="0"/>
+              <a:t>Further Reading</a:t>
+            </a:r>
+            <a:endParaRPr lang="en-US" dirty="0"/>
+          </a:p>
+        </p:txBody>
+      </p:sp>
+      <p:sp>
+        <p:nvSpPr>
+          <p:cNvPr id="3" name="Content Placeholder 2"/>
+          <p:cNvSpPr>
+            <a:spLocks noGrp="1"/>
+          </p:cNvSpPr>
+          <p:nvPr>
+            <p:ph idx="1"/>
+          </p:nvPr>
+        </p:nvSpPr>
+        <p:spPr>
+          <a:xfrm>
+            <a:off x="172379" y="1595437"/>
+            <a:ext cx="6350620" cy="4929188"/>
+          </a:xfrm>
+        </p:spPr>
+        <p:txBody>
+          <a:bodyPr/>
+          <a:lstStyle/>
+          <a:p>
+            <a:r>
+              <a:rPr lang="en-US" dirty="0" smtClean="0"/>
+              <a:t>C# </a:t>
+            </a:r>
+            <a:r>
+              <a:rPr lang="en-US" dirty="0"/>
+              <a:t>Programming Guide: </a:t>
+            </a:r>
+            <a:r>
+              <a:rPr lang="en-US" dirty="0">
+                <a:hlinkClick r:id="rId2"/>
+              </a:rPr>
+              <a:t>http://msdn.microsoft.com/en-us/library/67ef8sbd(v=vs.100).</a:t>
+            </a:r>
+            <a:r>
+              <a:rPr lang="en-US" dirty="0" smtClean="0">
+                <a:hlinkClick r:id="rId2"/>
+              </a:rPr>
+              <a:t>aspx</a:t>
+            </a:r>
+            <a:endParaRPr lang="en-US" dirty="0" smtClean="0"/>
+          </a:p>
+          <a:p>
+            <a:r>
+              <a:rPr lang="en-US" dirty="0" smtClean="0"/>
+              <a:t>C# In Depth by Jon Skeet</a:t>
+            </a:r>
+          </a:p>
+          <a:p>
+            <a:r>
+              <a:rPr lang="en-US" dirty="0" smtClean="0"/>
+              <a:t>Real-World Functional Programming: With Examples in F# and C# by Tomas </a:t>
+            </a:r>
+            <a:r>
+              <a:rPr lang="en-US" dirty="0" err="1" smtClean="0"/>
+              <a:t>Petricek</a:t>
+            </a:r>
+            <a:r>
+              <a:rPr lang="en-US" dirty="0" smtClean="0"/>
+              <a:t> and Jon Skeet</a:t>
+            </a:r>
+          </a:p>
+          <a:p>
+            <a:endParaRPr lang="en-US" dirty="0" smtClean="0"/>
+          </a:p>
+          <a:p>
+            <a:endParaRPr lang="en-US" dirty="0"/>
+          </a:p>
+        </p:txBody>
+      </p:sp>
+      <p:sp>
+        <p:nvSpPr>
+          <p:cNvPr id="4" name="Footer Placeholder 3"/>
+          <p:cNvSpPr>
+            <a:spLocks noGrp="1"/>
+          </p:cNvSpPr>
+          <p:nvPr>
+            <p:ph type="ftr" sz="quarter" idx="11"/>
+          </p:nvPr>
+        </p:nvSpPr>
+        <p:spPr/>
+        <p:txBody>
+          <a:bodyPr/>
+          <a:lstStyle/>
+          <a:p>
+            <a:pPr>
+              <a:defRPr/>
+            </a:pPr>
+            <a:r>
+              <a:rPr lang="en-US" smtClean="0"/>
+              <a:t>Teradyne Confidential and Proprietary</a:t>
+            </a:r>
+            <a:endParaRPr lang="en-US"/>
+          </a:p>
+        </p:txBody>
+      </p:sp>
+      <p:pic>
+        <p:nvPicPr>
+          <p:cNvPr id="1026" name="Picture 2"/>
+          <p:cNvPicPr>
+            <a:picLocks noChangeAspect="1" noChangeArrowheads="1"/>
+          </p:cNvPicPr>
+          <p:nvPr/>
+        </p:nvPicPr>
+        <p:blipFill>
+          <a:blip r:embed="rId3">
+            <a:extLst>
+              <a:ext uri="{28A0092B-C50C-407E-A947-70E740481C1C}">
+                <a14:useLocalDpi xmlns:a14="http://schemas.microsoft.com/office/drawing/2010/main" val="0"/>
+              </a:ext>
+            </a:extLst>
+          </a:blip>
+          <a:srcRect/>
+          <a:stretch>
+            <a:fillRect/>
+          </a:stretch>
+        </p:blipFill>
+        <p:spPr bwMode="auto">
+          <a:xfrm>
+            <a:off x="6522999" y="163899"/>
+            <a:ext cx="2476500" cy="3095625"/>
+          </a:xfrm>
+          <a:prstGeom prst="rect">
+            <a:avLst/>
+          </a:prstGeom>
+          <a:noFill/>
+          <a:ln>
+            <a:noFill/>
+          </a:ln>
+          <a:effectLst/>
+          <a:extLst>
+            <a:ext uri="{909E8E84-426E-40DD-AFC4-6F175D3DCCD1}">
+              <a14:hiddenFill xmlns:a14="http://schemas.microsoft.com/office/drawing/2010/main">
+                <a:solidFill>
+                  <a:schemeClr val="accent1"/>
+                </a:solidFill>
+              </a14:hiddenFill>
+            </a:ext>
+            <a:ext uri="{91240B29-F687-4F45-9708-019B960494DF}">
+              <a14:hiddenLine xmlns:a14="http://schemas.microsoft.com/office/drawing/2010/main" w="9525">
+                <a:solidFill>
+                  <a:schemeClr val="tx1"/>
+                </a:solidFill>
+                <a:miter lim="800000"/>
+                <a:headEnd/>
+                <a:tailEnd/>
+              </a14:hiddenLine>
+            </a:ext>
+            <a:ext uri="{AF507438-7753-43E0-B8FC-AC1667EBCBE1}">
+              <a14:hiddenEffects xmlns:a14="http://schemas.microsoft.com/office/drawing/2010/main">
+                <a:effectLst>
+                  <a:outerShdw dist="35921" dir="2700000" algn="ctr" rotWithShape="0">
+                    <a:schemeClr val="bg2"/>
+                  </a:outerShdw>
+                </a:effectLst>
+              </a14:hiddenEffects>
+            </a:ext>
+          </a:extLst>
+        </p:spPr>
+      </p:pic>
+      <p:pic>
+        <p:nvPicPr>
+          <p:cNvPr id="1027" name="Picture 3"/>
+          <p:cNvPicPr>
+            <a:picLocks noChangeAspect="1" noChangeArrowheads="1"/>
+          </p:cNvPicPr>
+          <p:nvPr/>
+        </p:nvPicPr>
+        <p:blipFill>
+          <a:blip r:embed="rId4">
+            <a:extLst>
+              <a:ext uri="{28A0092B-C50C-407E-A947-70E740481C1C}">
+                <a14:useLocalDpi xmlns:a14="http://schemas.microsoft.com/office/drawing/2010/main" val="0"/>
+              </a:ext>
+            </a:extLst>
+          </a:blip>
+          <a:srcRect/>
+          <a:stretch>
+            <a:fillRect/>
+          </a:stretch>
+        </p:blipFill>
+        <p:spPr bwMode="auto">
+          <a:xfrm>
+            <a:off x="6522999" y="3429000"/>
+            <a:ext cx="2476500" cy="3095625"/>
+          </a:xfrm>
+          <a:prstGeom prst="rect">
+            <a:avLst/>
+          </a:prstGeom>
+          <a:noFill/>
+          <a:ln>
+            <a:noFill/>
+          </a:ln>
+          <a:effectLst/>
+          <a:extLst>
+            <a:ext uri="{909E8E84-426E-40DD-AFC4-6F175D3DCCD1}">
+              <a14:hiddenFill xmlns:a14="http://schemas.microsoft.com/office/drawing/2010/main">
+                <a:solidFill>
+                  <a:schemeClr val="accent1"/>
+                </a:solidFill>
+              </a14:hiddenFill>
+            </a:ext>
+            <a:ext uri="{91240B29-F687-4F45-9708-019B960494DF}">
+              <a14:hiddenLine xmlns:a14="http://schemas.microsoft.com/office/drawing/2010/main" w="9525">
+                <a:solidFill>
+                  <a:schemeClr val="tx1"/>
+                </a:solidFill>
+                <a:miter lim="800000"/>
+                <a:headEnd/>
+                <a:tailEnd/>
+              </a14:hiddenLine>
+            </a:ext>
+            <a:ext uri="{AF507438-7753-43E0-B8FC-AC1667EBCBE1}">
+              <a14:hiddenEffects xmlns:a14="http://schemas.microsoft.com/office/drawing/2010/main">
+                <a:effectLst>
+                  <a:outerShdw dist="35921" dir="2700000" algn="ctr" rotWithShape="0">
+                    <a:schemeClr val="bg2"/>
+                  </a:outerShdw>
+                </a:effectLst>
+              </a14:hiddenEffects>
+            </a:ext>
+          </a:extLst>
+        </p:spPr>
+      </p:pic>
+    </p:spTree>
+    <p:extLst>
+      <p:ext uri="{BB962C8B-B14F-4D97-AF65-F5344CB8AC3E}">
+        <p14:creationId xmlns:p14="http://schemas.microsoft.com/office/powerpoint/2010/main" val="1593590714"/>
+      </p:ext>
+    </p:extLst>
   </p:cSld>
   <p:clrMapOvr>
     <a:masterClrMapping/>
@@ -17496,7 +17755,6 @@
               <a:rPr lang="en-US" dirty="0" smtClean="0"/>
               <a:t>The First Piece</a:t>
             </a:r>
-            <a:endParaRPr lang="en-US" dirty="0" smtClean="0"/>
           </a:p>
         </p:txBody>
       </p:sp>
@@ -17748,7 +18006,6 @@
               <a:rPr lang="en-US" dirty="0" smtClean="0"/>
               <a:t>The Simplest Thing I Can Think Of</a:t>
             </a:r>
-            <a:endParaRPr lang="en-US" dirty="0" smtClean="0"/>
           </a:p>
         </p:txBody>
       </p:sp>
@@ -18600,7 +18857,6 @@
               <a:rPr lang="en-US" dirty="0" smtClean="0"/>
               <a:t>Functional Programming</a:t>
             </a:r>
-            <a:endParaRPr lang="en-US" dirty="0" smtClean="0"/>
           </a:p>
         </p:txBody>
       </p:sp>
@@ -18865,7 +19121,6 @@
               <a:rPr lang="en-US" dirty="0" smtClean="0"/>
               <a:t>Let’s Get Functional</a:t>
             </a:r>
-            <a:endParaRPr lang="en-US" dirty="0" smtClean="0"/>
           </a:p>
         </p:txBody>
       </p:sp>
@@ -19482,7 +19737,6 @@
               <a:rPr lang="en-US" dirty="0" smtClean="0"/>
               <a:t>Functional C# with LINQ</a:t>
             </a:r>
-            <a:endParaRPr lang="en-US" dirty="0" smtClean="0"/>
           </a:p>
         </p:txBody>
       </p:sp>
@@ -19813,7 +20067,6 @@
               <a:rPr lang="en-US" dirty="0" smtClean="0"/>
               <a:t>Extension Methods</a:t>
             </a:r>
-            <a:endParaRPr lang="en-US" dirty="0" smtClean="0"/>
           </a:p>
         </p:txBody>
       </p:sp>
@@ -19944,7 +20197,11 @@
           <a:p>
             <a:r>
               <a:rPr lang="en-US" sz="2400" dirty="0" smtClean="0"/>
-              <a:t>I can it using either of 2 syntaxes:</a:t>
+              <a:t>Call it </a:t>
+            </a:r>
+            <a:r>
+              <a:rPr lang="en-US" sz="2400" dirty="0" smtClean="0"/>
+              <a:t>using either of 2 syntaxes:</a:t>
             </a:r>
           </a:p>
           <a:p>

</xml_diff>

<commit_message>
Final changes in preparation for first presentation.
</commit_message>
<xml_diff>
--- a/FiveEasyPieces1.pptx
+++ b/FiveEasyPieces1.pptx
@@ -5,10 +5,10 @@
     <p:sldMasterId id="2147483648" r:id="rId1"/>
   </p:sldMasterIdLst>
   <p:notesMasterIdLst>
-    <p:notesMasterId r:id="rId32"/>
+    <p:notesMasterId r:id="rId31"/>
   </p:notesMasterIdLst>
   <p:handoutMasterIdLst>
-    <p:handoutMasterId r:id="rId33"/>
+    <p:handoutMasterId r:id="rId32"/>
   </p:handoutMasterIdLst>
   <p:sldIdLst>
     <p:sldId id="256" r:id="rId2"/>
@@ -28,19 +28,18 @@
     <p:sldId id="370" r:id="rId16"/>
     <p:sldId id="371" r:id="rId17"/>
     <p:sldId id="372" r:id="rId18"/>
-    <p:sldId id="375" r:id="rId19"/>
-    <p:sldId id="373" r:id="rId20"/>
-    <p:sldId id="374" r:id="rId21"/>
-    <p:sldId id="376" r:id="rId22"/>
-    <p:sldId id="377" r:id="rId23"/>
-    <p:sldId id="378" r:id="rId24"/>
-    <p:sldId id="379" r:id="rId25"/>
-    <p:sldId id="380" r:id="rId26"/>
-    <p:sldId id="381" r:id="rId27"/>
-    <p:sldId id="382" r:id="rId28"/>
-    <p:sldId id="383" r:id="rId29"/>
-    <p:sldId id="384" r:id="rId30"/>
-    <p:sldId id="385" r:id="rId31"/>
+    <p:sldId id="373" r:id="rId19"/>
+    <p:sldId id="374" r:id="rId20"/>
+    <p:sldId id="376" r:id="rId21"/>
+    <p:sldId id="377" r:id="rId22"/>
+    <p:sldId id="378" r:id="rId23"/>
+    <p:sldId id="379" r:id="rId24"/>
+    <p:sldId id="380" r:id="rId25"/>
+    <p:sldId id="381" r:id="rId26"/>
+    <p:sldId id="382" r:id="rId27"/>
+    <p:sldId id="383" r:id="rId28"/>
+    <p:sldId id="384" r:id="rId29"/>
+    <p:sldId id="385" r:id="rId30"/>
   </p:sldIdLst>
   <p:sldSz cx="9144000" cy="6858000" type="screen4x3"/>
   <p:notesSz cx="6954838" cy="9240838"/>
@@ -1730,7 +1729,7 @@
               <a:pPr>
                 <a:defRPr/>
               </a:pPr>
-              <a:t>20</a:t>
+              <a:t>22</a:t>
             </a:fld>
             <a:endParaRPr lang="en-US"/>
           </a:p>
@@ -2206,101 +2205,6 @@
                 <a:defRPr/>
               </a:pPr>
               <a:t>26</a:t>
-            </a:fld>
-            <a:endParaRPr lang="en-US"/>
-          </a:p>
-        </p:txBody>
-      </p:sp>
-    </p:spTree>
-    <p:extLst>
-      <p:ext uri="{BB962C8B-B14F-4D97-AF65-F5344CB8AC3E}">
-        <p14:creationId xmlns:p14="http://schemas.microsoft.com/office/powerpoint/2010/main" val="3389556460"/>
-      </p:ext>
-    </p:extLst>
-  </p:cSld>
-  <p:clrMapOvr>
-    <a:masterClrMapping/>
-  </p:clrMapOvr>
-</p:notes>
-</file>
-
-<file path=ppt/notesSlides/notesSlide21.xml><?xml version="1.0" encoding="utf-8"?>
-<p:notes xmlns:a="http://schemas.openxmlformats.org/drawingml/2006/main" xmlns:r="http://schemas.openxmlformats.org/officeDocument/2006/relationships" xmlns:p="http://schemas.openxmlformats.org/presentationml/2006/main">
-  <p:cSld>
-    <p:spTree>
-      <p:nvGrpSpPr>
-        <p:cNvPr id="1" name=""/>
-        <p:cNvGrpSpPr/>
-        <p:nvPr/>
-      </p:nvGrpSpPr>
-      <p:grpSpPr>
-        <a:xfrm>
-          <a:off x="0" y="0"/>
-          <a:ext cx="0" cy="0"/>
-          <a:chOff x="0" y="0"/>
-          <a:chExt cx="0" cy="0"/>
-        </a:xfrm>
-      </p:grpSpPr>
-      <p:sp>
-        <p:nvSpPr>
-          <p:cNvPr id="2" name="Slide Image Placeholder 1"/>
-          <p:cNvSpPr>
-            <a:spLocks noGrp="1" noRot="1" noChangeAspect="1"/>
-          </p:cNvSpPr>
-          <p:nvPr>
-            <p:ph type="sldImg"/>
-          </p:nvPr>
-        </p:nvSpPr>
-        <p:spPr>
-          <a:xfrm>
-            <a:off x="1168400" y="693738"/>
-            <a:ext cx="4619625" cy="3465512"/>
-          </a:xfrm>
-        </p:spPr>
-      </p:sp>
-      <p:sp>
-        <p:nvSpPr>
-          <p:cNvPr id="3" name="Notes Placeholder 2"/>
-          <p:cNvSpPr>
-            <a:spLocks noGrp="1"/>
-          </p:cNvSpPr>
-          <p:nvPr>
-            <p:ph type="body" idx="1"/>
-          </p:nvPr>
-        </p:nvSpPr>
-        <p:spPr/>
-        <p:txBody>
-          <a:bodyPr/>
-          <a:lstStyle/>
-          <a:p>
-            <a:endParaRPr lang="en-US" dirty="0"/>
-          </a:p>
-        </p:txBody>
-      </p:sp>
-      <p:sp>
-        <p:nvSpPr>
-          <p:cNvPr id="4" name="Slide Number Placeholder 3"/>
-          <p:cNvSpPr>
-            <a:spLocks noGrp="1"/>
-          </p:cNvSpPr>
-          <p:nvPr>
-            <p:ph type="sldNum" sz="quarter" idx="10"/>
-          </p:nvPr>
-        </p:nvSpPr>
-        <p:spPr/>
-        <p:txBody>
-          <a:bodyPr/>
-          <a:lstStyle/>
-          <a:p>
-            <a:pPr>
-              <a:defRPr/>
-            </a:pPr>
-            <a:fld id="{4A13476B-BE88-43CF-8796-9E97146DFDA0}" type="slidenum">
-              <a:rPr lang="en-US" smtClean="0"/>
-              <a:pPr>
-                <a:defRPr/>
-              </a:pPr>
-              <a:t>27</a:t>
             </a:fld>
             <a:endParaRPr lang="en-US"/>
           </a:p>
@@ -7402,7 +7306,15 @@
             </a:r>
             <a:r>
               <a:rPr lang="en-US" sz="2400" dirty="0" smtClean="0"/>
-              <a:t>(1, limit - 1)</a:t>
+              <a:t>(1, </a:t>
+            </a:r>
+            <a:r>
+              <a:rPr lang="en-US" sz="2400" dirty="0" smtClean="0"/>
+              <a:t>1000 - </a:t>
+            </a:r>
+            <a:r>
+              <a:rPr lang="en-US" sz="2400" dirty="0" smtClean="0"/>
+              <a:t>1)</a:t>
             </a:r>
           </a:p>
           <a:p>
@@ -7431,7 +7343,15 @@
             </a:r>
             <a:r>
               <a:rPr lang="en-US" sz="2400" dirty="0" smtClean="0"/>
-              <a:t> % x == 0 || </a:t>
+              <a:t> % </a:t>
+            </a:r>
+            <a:r>
+              <a:rPr lang="en-US" sz="2400" dirty="0" smtClean="0"/>
+              <a:t>3 </a:t>
+            </a:r>
+            <a:r>
+              <a:rPr lang="en-US" sz="2400" dirty="0" smtClean="0"/>
+              <a:t>== 0 || </a:t>
             </a:r>
             <a:r>
               <a:rPr lang="en-US" sz="2400" dirty="0" err="1" smtClean="0"/>
@@ -7439,7 +7359,15 @@
             </a:r>
             <a:r>
               <a:rPr lang="en-US" sz="2400" dirty="0" smtClean="0"/>
-              <a:t> % y == 0)</a:t>
+              <a:t> % </a:t>
+            </a:r>
+            <a:r>
+              <a:rPr lang="en-US" sz="2400" dirty="0" smtClean="0"/>
+              <a:t>5 </a:t>
+            </a:r>
+            <a:r>
+              <a:rPr lang="en-US" sz="2400" dirty="0" smtClean="0"/>
+              <a:t>== 0)</a:t>
             </a:r>
           </a:p>
           <a:p>
@@ -7678,7 +7606,7 @@
             <p:ph idx="1"/>
             <p:extLst>
               <p:ext uri="{D42A27DB-BD31-4B8C-83A1-F6EECF244321}">
-                <p14:modId xmlns:p14="http://schemas.microsoft.com/office/powerpoint/2010/main" val="2766448679"/>
+                <p14:modId xmlns:p14="http://schemas.microsoft.com/office/powerpoint/2010/main" val="32421434"/>
               </p:ext>
             </p:extLst>
           </p:nvPr>
@@ -7914,7 +7842,7 @@
                             <a:srgbClr val="FFFF00"/>
                           </a:solidFill>
                         </a:rPr>
-                        <a:t>4.038</a:t>
+                        <a:t>4.1</a:t>
                       </a:r>
                       <a:endParaRPr lang="en-US" dirty="0">
                         <a:ln>
@@ -8049,7 +7977,7 @@
                             <a:srgbClr val="FFFF00"/>
                           </a:solidFill>
                         </a:rPr>
-                        <a:t>15.106</a:t>
+                        <a:t>14.8</a:t>
                       </a:r>
                       <a:endParaRPr lang="en-US" dirty="0">
                         <a:ln>
@@ -8409,12 +8337,12 @@
               <a:t> </a:t>
             </a:r>
             <a:r>
-              <a:rPr lang="en-US" sz="2400" dirty="0" err="1"/>
-              <a:t>IsMultipleOf</a:t>
+              <a:rPr lang="en-US" sz="2400" dirty="0" smtClean="0"/>
+              <a:t>IsMultipleOf3Or5 </a:t>
             </a:r>
             <a:r>
               <a:rPr lang="en-US" sz="2400" dirty="0"/>
-              <a:t> {</a:t>
+              <a:t>{</a:t>
             </a:r>
           </a:p>
           <a:p>
@@ -8447,31 +8375,27 @@
             </a:r>
             <a:r>
               <a:rPr lang="en-US" sz="2400" dirty="0"/>
-              <a:t> x, </a:t>
+              <a:t> </a:t>
+            </a:r>
+            <a:r>
+              <a:rPr lang="en-US" sz="2400" dirty="0" err="1" smtClean="0"/>
+              <a:t>i</a:t>
+            </a:r>
+            <a:r>
+              <a:rPr lang="en-US" sz="2400" dirty="0" smtClean="0"/>
+              <a:t>) </a:t>
             </a:r>
             <a:r>
               <a:rPr lang="en-US" sz="2400" dirty="0" err="1"/>
-              <a:t>int</a:t>
+              <a:t>const</a:t>
             </a:r>
             <a:r>
               <a:rPr lang="en-US" sz="2400" dirty="0"/>
               <a:t> </a:t>
             </a:r>
             <a:r>
-              <a:rPr lang="en-US" sz="2400" dirty="0" err="1"/>
-              <a:t>const</a:t>
-            </a:r>
-            <a:r>
-              <a:rPr lang="en-US" sz="2400" dirty="0"/>
-              <a:t> y) </a:t>
-            </a:r>
-            <a:r>
-              <a:rPr lang="en-US" sz="2400" dirty="0" err="1"/>
-              <a:t>const</a:t>
-            </a:r>
-            <a:r>
-              <a:rPr lang="en-US" sz="2400" dirty="0"/>
-              <a:t> { return x % y == 0; }</a:t>
+              <a:rPr lang="en-US" sz="2400" dirty="0" smtClean="0"/>
+              <a:t>{</a:t>
             </a:r>
           </a:p>
           <a:p>
@@ -8479,9 +8403,42 @@
               <a:buNone/>
             </a:pPr>
             <a:r>
+              <a:rPr lang="en-US" sz="2400" dirty="0" smtClean="0"/>
+              <a:t>    return </a:t>
+            </a:r>
+            <a:r>
+              <a:rPr lang="en-US" sz="2400" dirty="0" err="1" smtClean="0"/>
+              <a:t>i</a:t>
+            </a:r>
+            <a:r>
+              <a:rPr lang="en-US" sz="2400" dirty="0" smtClean="0"/>
+              <a:t> </a:t>
+            </a:r>
+            <a:r>
               <a:rPr lang="en-US" sz="2400" dirty="0"/>
-              <a:t>};</a:t>
-            </a:r>
+              <a:t>% </a:t>
+            </a:r>
+            <a:r>
+              <a:rPr lang="en-US" sz="2400" dirty="0" smtClean="0"/>
+              <a:t>3 </a:t>
+            </a:r>
+            <a:r>
+              <a:rPr lang="en-US" sz="2400" dirty="0"/>
+              <a:t>== </a:t>
+            </a:r>
+            <a:r>
+              <a:rPr lang="en-US" sz="2400" dirty="0" smtClean="0"/>
+              <a:t>0 || </a:t>
+            </a:r>
+            <a:r>
+              <a:rPr lang="en-US" sz="2400" dirty="0" err="1" smtClean="0"/>
+              <a:t>i</a:t>
+            </a:r>
+            <a:r>
+              <a:rPr lang="en-US" sz="2400" dirty="0" smtClean="0"/>
+              <a:t> % 5 == 0; } };</a:t>
+            </a:r>
+            <a:endParaRPr lang="en-US" sz="2400" dirty="0"/>
           </a:p>
           <a:p>
             <a:pPr marL="0" indent="0">
@@ -8504,36 +8461,12 @@
               <a:t>FilterImperative</a:t>
             </a:r>
             <a:r>
-              <a:rPr lang="en-US" sz="2400" dirty="0"/>
-              <a:t>(</a:t>
-            </a:r>
-            <a:r>
-              <a:rPr lang="en-US" sz="2400" dirty="0" err="1"/>
-              <a:t>int</a:t>
-            </a:r>
-            <a:r>
-              <a:rPr lang="en-US" sz="2400" dirty="0"/>
-              <a:t> limit, </a:t>
-            </a:r>
-            <a:r>
-              <a:rPr lang="en-US" sz="2400" dirty="0" err="1"/>
-              <a:t>int</a:t>
-            </a:r>
-            <a:r>
-              <a:rPr lang="en-US" sz="2400" dirty="0"/>
-              <a:t> x, </a:t>
-            </a:r>
-            <a:r>
-              <a:rPr lang="en-US" sz="2400" dirty="0" err="1"/>
-              <a:t>int</a:t>
-            </a:r>
-            <a:r>
-              <a:rPr lang="en-US" sz="2400" dirty="0"/>
-              <a:t> y</a:t>
-            </a:r>
-            <a:r>
               <a:rPr lang="en-US" sz="2400" dirty="0" smtClean="0"/>
-              <a:t>) {</a:t>
+              <a:t>() </a:t>
+            </a:r>
+            <a:r>
+              <a:rPr lang="en-US" sz="2400" dirty="0" smtClean="0"/>
+              <a:t>{</a:t>
             </a:r>
             <a:endParaRPr lang="en-US" sz="2400" dirty="0"/>
           </a:p>
@@ -8568,7 +8501,15 @@
             </a:r>
             <a:r>
               <a:rPr lang="en-US" sz="2400" dirty="0"/>
-              <a:t> &lt; limit; ++</a:t>
+              <a:t> &lt; </a:t>
+            </a:r>
+            <a:r>
+              <a:rPr lang="en-US" sz="2400" dirty="0" smtClean="0"/>
+              <a:t>1000; </a:t>
+            </a:r>
+            <a:r>
+              <a:rPr lang="en-US" sz="2400" dirty="0"/>
+              <a:t>++</a:t>
             </a:r>
             <a:r>
               <a:rPr lang="en-US" sz="2400" dirty="0" err="1"/>
@@ -8588,37 +8529,18 @@
               <a:t>    if (</a:t>
             </a:r>
             <a:r>
-              <a:rPr lang="en-US" sz="2400" dirty="0" err="1"/>
-              <a:t>IsMultipleOf</a:t>
-            </a:r>
-            <a:r>
-              <a:rPr lang="en-US" sz="2400" dirty="0"/>
-              <a:t>()(</a:t>
-            </a:r>
-            <a:r>
-              <a:rPr lang="en-US" sz="2400" dirty="0" err="1"/>
+              <a:rPr lang="en-US" sz="2400" dirty="0" smtClean="0"/>
+              <a:t>IsMultipleOf3Or5()(</a:t>
+            </a:r>
+            <a:r>
+              <a:rPr lang="en-US" sz="2400" dirty="0" err="1" smtClean="0"/>
               <a:t>i</a:t>
             </a:r>
             <a:r>
-              <a:rPr lang="en-US" sz="2400" dirty="0"/>
-              <a:t>, x) || </a:t>
-            </a:r>
-            <a:r>
-              <a:rPr lang="en-US" sz="2400" dirty="0" err="1"/>
-              <a:t>IsMultipleOf</a:t>
-            </a:r>
-            <a:r>
-              <a:rPr lang="en-US" sz="2400" dirty="0"/>
-              <a:t>()(</a:t>
-            </a:r>
-            <a:r>
-              <a:rPr lang="en-US" sz="2400" dirty="0" err="1"/>
-              <a:t>i</a:t>
-            </a:r>
-            <a:r>
-              <a:rPr lang="en-US" sz="2400" dirty="0"/>
-              <a:t>, y))</a:t>
-            </a:r>
+              <a:rPr lang="en-US" sz="2400" dirty="0" smtClean="0"/>
+              <a:t>))</a:t>
+            </a:r>
+            <a:endParaRPr lang="en-US" sz="2400" dirty="0"/>
           </a:p>
           <a:p>
             <a:pPr marL="0" indent="0">
@@ -8643,17 +8565,13 @@
             </a:pPr>
             <a:r>
               <a:rPr lang="en-US" sz="2400" dirty="0"/>
-              <a:t>  return sum;</a:t>
-            </a:r>
-          </a:p>
-          <a:p>
-            <a:pPr marL="0" indent="0">
-              <a:buNone/>
-            </a:pPr>
-            <a:r>
-              <a:rPr lang="en-US" sz="2400" dirty="0"/>
-              <a:t>}</a:t>
-            </a:r>
+              <a:t>  return sum</a:t>
+            </a:r>
+            <a:r>
+              <a:rPr lang="en-US" sz="2400" dirty="0" smtClean="0"/>
+              <a:t>; }</a:t>
+            </a:r>
+            <a:endParaRPr lang="en-US" sz="2400" dirty="0"/>
           </a:p>
           <a:p>
             <a:pPr marL="0" indent="0">
@@ -8903,40 +8821,16 @@
               <a:t> </a:t>
             </a:r>
             <a:r>
-              <a:rPr lang="en-US" sz="2400" dirty="0" err="1"/>
+              <a:rPr lang="en-US" sz="2400" dirty="0" err="1" smtClean="0"/>
               <a:t>FilterFunctional</a:t>
             </a:r>
             <a:r>
-              <a:rPr lang="en-US" sz="2400" dirty="0"/>
-              <a:t>(</a:t>
-            </a:r>
-            <a:r>
-              <a:rPr lang="en-US" sz="2400" dirty="0" err="1"/>
-              <a:t>int</a:t>
-            </a:r>
-            <a:r>
-              <a:rPr lang="en-US" sz="2400" dirty="0"/>
-              <a:t> limit, </a:t>
-            </a:r>
-            <a:r>
-              <a:rPr lang="en-US" sz="2400" dirty="0" err="1"/>
-              <a:t>int</a:t>
-            </a:r>
-            <a:r>
-              <a:rPr lang="en-US" sz="2400" dirty="0"/>
-              <a:t> x, </a:t>
-            </a:r>
-            <a:r>
-              <a:rPr lang="en-US" sz="2400" dirty="0" err="1"/>
-              <a:t>int</a:t>
-            </a:r>
-            <a:r>
-              <a:rPr lang="en-US" sz="2400" dirty="0"/>
-              <a:t> y</a:t>
-            </a:r>
-            <a:r>
               <a:rPr lang="en-US" sz="2400" dirty="0" smtClean="0"/>
-              <a:t>) {</a:t>
+              <a:t>() </a:t>
+            </a:r>
+            <a:r>
+              <a:rPr lang="en-US" sz="2400" dirty="0" smtClean="0"/>
+              <a:t>{</a:t>
             </a:r>
             <a:endParaRPr lang="en-US" sz="2400" dirty="0"/>
           </a:p>
@@ -8945,52 +8839,32 @@
               <a:buNone/>
             </a:pPr>
             <a:r>
+              <a:rPr lang="en-US" sz="2400" dirty="0" smtClean="0"/>
+              <a:t>return </a:t>
+            </a:r>
+            <a:r>
               <a:rPr lang="en-US" sz="2400" dirty="0"/>
-              <a:t>  auto </a:t>
+              <a:t>boost::accumulate(boost::</a:t>
             </a:r>
             <a:r>
               <a:rPr lang="en-US" sz="2400" dirty="0" err="1"/>
-              <a:t>const</a:t>
+              <a:t>irange</a:t>
             </a:r>
             <a:r>
               <a:rPr lang="en-US" sz="2400" dirty="0"/>
-              <a:t> </a:t>
-            </a:r>
-            <a:r>
-              <a:rPr lang="en-US" sz="2400" dirty="0" err="1"/>
-              <a:t>isMultipleOfXOrY</a:t>
-            </a:r>
-            <a:r>
-              <a:rPr lang="en-US" sz="2400" dirty="0"/>
-              <a:t> = [x, y](</a:t>
-            </a:r>
-            <a:r>
-              <a:rPr lang="en-US" sz="2400" dirty="0" err="1"/>
-              <a:t>int</a:t>
-            </a:r>
-            <a:r>
-              <a:rPr lang="en-US" sz="2400" dirty="0"/>
-              <a:t> </a:t>
-            </a:r>
-            <a:r>
-              <a:rPr lang="en-US" sz="2400" dirty="0" err="1"/>
-              <a:t>const</a:t>
-            </a:r>
-            <a:r>
-              <a:rPr lang="en-US" sz="2400" dirty="0"/>
-              <a:t> </a:t>
-            </a:r>
-            <a:r>
-              <a:rPr lang="en-US" sz="2400" dirty="0" err="1"/>
-              <a:t>i</a:t>
-            </a:r>
-            <a:r>
-              <a:rPr lang="en-US" sz="2400" dirty="0"/>
+              <a:t>(1, </a:t>
+            </a:r>
+            <a:r>
+              <a:rPr lang="en-US" sz="2400" dirty="0" smtClean="0"/>
+              <a:t>1000</a:t>
+            </a:r>
+            <a:r>
+              <a:rPr lang="en-US" sz="2400" dirty="0" smtClean="0"/>
               <a:t>) </a:t>
             </a:r>
             <a:r>
               <a:rPr lang="en-US" sz="2400" dirty="0" smtClean="0"/>
-              <a:t>{</a:t>
+              <a:t>|</a:t>
             </a:r>
           </a:p>
           <a:p>
@@ -8998,44 +8872,24 @@
               <a:buNone/>
             </a:pPr>
             <a:r>
+              <a:rPr lang="en-US" sz="2400" dirty="0"/>
+              <a:t> </a:t>
+            </a:r>
+            <a:r>
               <a:rPr lang="en-US" sz="2400" dirty="0" smtClean="0"/>
-              <a:t>    return </a:t>
-            </a:r>
-            <a:r>
-              <a:rPr lang="en-US" sz="2400" dirty="0" err="1"/>
-              <a:t>IsMultipleOf</a:t>
+              <a:t>   boost</a:t>
             </a:r>
             <a:r>
               <a:rPr lang="en-US" sz="2400" dirty="0"/>
-              <a:t>()(</a:t>
-            </a:r>
-            <a:r>
-              <a:rPr lang="en-US" sz="2400" dirty="0" err="1"/>
-              <a:t>i</a:t>
+              <a:t>::adaptors::</a:t>
+            </a:r>
+            <a:r>
+              <a:rPr lang="en-US" sz="2400" dirty="0" smtClean="0"/>
+              <a:t>filtered(IsMultipleOf3Or5()), </a:t>
             </a:r>
             <a:r>
               <a:rPr lang="en-US" sz="2400" dirty="0"/>
-              <a:t>, x) || </a:t>
-            </a:r>
-            <a:r>
-              <a:rPr lang="en-US" sz="2400" dirty="0" err="1"/>
-              <a:t>IsMultipleOf</a:t>
-            </a:r>
-            <a:r>
-              <a:rPr lang="en-US" sz="2400" dirty="0"/>
-              <a:t>()(</a:t>
-            </a:r>
-            <a:r>
-              <a:rPr lang="en-US" sz="2400" dirty="0" err="1"/>
-              <a:t>i</a:t>
-            </a:r>
-            <a:r>
-              <a:rPr lang="en-US" sz="2400" dirty="0"/>
-              <a:t>, y); </a:t>
-            </a:r>
-            <a:r>
-              <a:rPr lang="en-US" sz="2400" dirty="0" smtClean="0"/>
-              <a:t>};</a:t>
+              <a:t>0);</a:t>
             </a:r>
           </a:p>
           <a:p>
@@ -9044,63 +8898,7 @@
             </a:pPr>
             <a:r>
               <a:rPr lang="en-US" sz="2400" dirty="0" smtClean="0"/>
-              <a:t>  </a:t>
-            </a:r>
-            <a:r>
-              <a:rPr lang="en-US" sz="2400" dirty="0"/>
-              <a:t>return boost::accumulate(boost::</a:t>
-            </a:r>
-            <a:r>
-              <a:rPr lang="en-US" sz="2400" dirty="0" err="1"/>
-              <a:t>irange</a:t>
-            </a:r>
-            <a:r>
-              <a:rPr lang="en-US" sz="2400" dirty="0"/>
-              <a:t>(1, limit) </a:t>
-            </a:r>
-            <a:r>
-              <a:rPr lang="en-US" sz="2400" dirty="0" smtClean="0"/>
-              <a:t>|</a:t>
-            </a:r>
-          </a:p>
-          <a:p>
-            <a:pPr marL="0" indent="0">
-              <a:buNone/>
-            </a:pPr>
-            <a:r>
-              <a:rPr lang="en-US" sz="2400" dirty="0"/>
-              <a:t> </a:t>
-            </a:r>
-            <a:r>
-              <a:rPr lang="en-US" sz="2400" dirty="0" smtClean="0"/>
-              <a:t>   boost</a:t>
-            </a:r>
-            <a:r>
-              <a:rPr lang="en-US" sz="2400" dirty="0"/>
-              <a:t>::adaptors::filtered(</a:t>
-            </a:r>
-            <a:r>
-              <a:rPr lang="en-US" sz="2400" dirty="0" err="1"/>
-              <a:t>isMultipleOfXOrY</a:t>
-            </a:r>
-            <a:r>
-              <a:rPr lang="en-US" sz="2400" dirty="0"/>
-              <a:t>), 0);</a:t>
-            </a:r>
-          </a:p>
-          <a:p>
-            <a:pPr marL="0" indent="0">
-              <a:buNone/>
-            </a:pPr>
-            <a:r>
-              <a:rPr lang="en-US" sz="2400" dirty="0" smtClean="0"/>
               <a:t>}</a:t>
-            </a:r>
-          </a:p>
-          <a:p>
-            <a:r>
-              <a:rPr lang="en-US" sz="2400" dirty="0" smtClean="0"/>
-              <a:t>C++11 has lambdas, too.</a:t>
             </a:r>
           </a:p>
           <a:p>
@@ -9110,7 +8908,11 @@
             </a:r>
             <a:r>
               <a:rPr lang="en-US" sz="2400" dirty="0" smtClean="0"/>
-              <a:t> = boost::</a:t>
+              <a:t> </a:t>
+            </a:r>
+            <a:r>
+              <a:rPr lang="en-US" sz="2400" dirty="0" smtClean="0"/>
+              <a:t>= boost::</a:t>
             </a:r>
             <a:r>
               <a:rPr lang="en-US" sz="2400" dirty="0" err="1" smtClean="0"/>
@@ -9355,7 +9157,7 @@
             <p:ph idx="1"/>
             <p:extLst>
               <p:ext uri="{D42A27DB-BD31-4B8C-83A1-F6EECF244321}">
-                <p14:modId xmlns:p14="http://schemas.microsoft.com/office/powerpoint/2010/main" val="2662321863"/>
+                <p14:modId xmlns:p14="http://schemas.microsoft.com/office/powerpoint/2010/main" val="1099940442"/>
               </p:ext>
             </p:extLst>
           </p:nvPr>
@@ -9656,17 +9458,17 @@
                             <a:noFill/>
                           </a:ln>
                           <a:solidFill>
-                            <a:srgbClr val="FFC000"/>
+                            <a:srgbClr val="FFFF00"/>
                           </a:solidFill>
                         </a:rPr>
-                        <a:t>4.0</a:t>
+                        <a:t>4.1</a:t>
                       </a:r>
                       <a:endParaRPr lang="en-US" dirty="0">
                         <a:ln>
                           <a:noFill/>
                         </a:ln>
                         <a:solidFill>
-                          <a:srgbClr val="FFC000"/>
+                          <a:srgbClr val="FFFF00"/>
                         </a:solidFill>
                       </a:endParaRPr>
                     </a:p>
@@ -9723,17 +9525,17 @@
                             <a:noFill/>
                           </a:ln>
                           <a:solidFill>
-                            <a:srgbClr val="FFC000"/>
+                            <a:srgbClr val="FFFF00"/>
                           </a:solidFill>
                         </a:rPr>
-                        <a:t>4.0</a:t>
+                        <a:t>1.6</a:t>
                       </a:r>
                       <a:endParaRPr lang="en-US" dirty="0">
                         <a:ln>
                           <a:noFill/>
                         </a:ln>
                         <a:solidFill>
-                          <a:srgbClr val="FFC000"/>
+                          <a:srgbClr val="FFFF00"/>
                         </a:solidFill>
                       </a:endParaRPr>
                     </a:p>
@@ -9861,7 +9663,7 @@
                             <a:srgbClr val="FFFF00"/>
                           </a:solidFill>
                         </a:rPr>
-                        <a:t>15.1</a:t>
+                        <a:t>14.8</a:t>
                       </a:r>
                       <a:endParaRPr lang="en-US" dirty="0">
                         <a:ln>
@@ -9925,17 +9727,17 @@
                             <a:noFill/>
                           </a:ln>
                           <a:solidFill>
-                            <a:srgbClr val="FFC000"/>
+                            <a:srgbClr val="FFFF00"/>
                           </a:solidFill>
                         </a:rPr>
-                        <a:t>4.2</a:t>
+                        <a:t>1.9</a:t>
                       </a:r>
                       <a:endParaRPr lang="en-US" dirty="0">
                         <a:ln>
                           <a:noFill/>
                         </a:ln>
                         <a:solidFill>
-                          <a:srgbClr val="FFC000"/>
+                          <a:srgbClr val="FFFF00"/>
                         </a:solidFill>
                       </a:endParaRPr>
                     </a:p>
@@ -10139,7 +9941,7 @@
         <p:spPr>
           <a:xfrm>
             <a:off x="680224" y="2732049"/>
-            <a:ext cx="7861610" cy="1815882"/>
+            <a:ext cx="7861610" cy="2246769"/>
           </a:xfrm>
           <a:prstGeom prst="rect">
             <a:avLst/>
@@ -10162,8 +9964,13 @@
                   <a:srgbClr val="FFFF00"/>
                 </a:solidFill>
               </a:rPr>
-              <a:t>The imperative performance is comparable between C# and C++</a:t>
-            </a:r>
+              <a:t>The imperative C++ code is more than 2x faster than the imperative C# code</a:t>
+            </a:r>
+            <a:endParaRPr lang="en-US" b="0" dirty="0" smtClean="0">
+              <a:solidFill>
+                <a:srgbClr val="FFFF00"/>
+              </a:solidFill>
+            </a:endParaRPr>
           </a:p>
           <a:p>
             <a:pPr marL="457200" indent="-457200">
@@ -10176,7 +9983,31 @@
                   <a:srgbClr val="FFFF00"/>
                 </a:solidFill>
               </a:rPr>
-              <a:t>There is no performance penalty for using a functional style vs. an imperative style in C++</a:t>
+              <a:t>There is </a:t>
+            </a:r>
+            <a:r>
+              <a:rPr lang="en-US" b="0" dirty="0" smtClean="0">
+                <a:solidFill>
+                  <a:srgbClr val="FFFF00"/>
+                </a:solidFill>
+              </a:rPr>
+              <a:t>less of a performance </a:t>
+            </a:r>
+            <a:r>
+              <a:rPr lang="en-US" b="0" dirty="0" smtClean="0">
+                <a:solidFill>
+                  <a:srgbClr val="FFFF00"/>
+                </a:solidFill>
+              </a:rPr>
+              <a:t>penalty </a:t>
+            </a:r>
+            <a:r>
+              <a:rPr lang="en-US" b="0" dirty="0" smtClean="0">
+                <a:solidFill>
+                  <a:srgbClr val="FFFF00"/>
+                </a:solidFill>
+              </a:rPr>
+              <a:t>for using a functional style vs. an imperative style in C++</a:t>
             </a:r>
           </a:p>
         </p:txBody>
@@ -10271,8 +10102,13 @@
             </a:pPr>
             <a:r>
               <a:rPr lang="en-US" sz="2400" dirty="0"/>
-              <a:t>// Sum multiples of x</a:t>
-            </a:r>
+              <a:t>// Sum multiples of </a:t>
+            </a:r>
+            <a:r>
+              <a:rPr lang="en-US" sz="2400" dirty="0" smtClean="0"/>
+              <a:t>3</a:t>
+            </a:r>
+            <a:endParaRPr lang="en-US" sz="2400" dirty="0"/>
           </a:p>
           <a:p>
             <a:pPr marL="0" indent="0">
@@ -10290,8 +10126,13 @@
             </a:r>
             <a:r>
               <a:rPr lang="en-US" sz="2400" dirty="0"/>
-              <a:t>Sum multiples of y</a:t>
-            </a:r>
+              <a:t>Sum multiples of </a:t>
+            </a:r>
+            <a:r>
+              <a:rPr lang="en-US" sz="2400" dirty="0" smtClean="0"/>
+              <a:t>5</a:t>
+            </a:r>
+            <a:endParaRPr lang="en-US" sz="2400" dirty="0"/>
           </a:p>
           <a:p>
             <a:pPr marL="0" indent="0">
@@ -10309,7 +10150,23 @@
             </a:r>
             <a:r>
               <a:rPr lang="en-US" sz="2400" dirty="0"/>
-              <a:t>Subtract multiples of x * y to eliminate duplicates</a:t>
+              <a:t>Subtract multiples of </a:t>
+            </a:r>
+            <a:r>
+              <a:rPr lang="en-US" sz="2400" dirty="0" smtClean="0"/>
+              <a:t>3 </a:t>
+            </a:r>
+            <a:r>
+              <a:rPr lang="en-US" sz="2400" dirty="0"/>
+              <a:t>* </a:t>
+            </a:r>
+            <a:r>
+              <a:rPr lang="en-US" sz="2400" dirty="0" smtClean="0"/>
+              <a:t>5 </a:t>
+            </a:r>
+            <a:r>
+              <a:rPr lang="en-US" sz="2400" dirty="0"/>
+              <a:t>to eliminate duplicates</a:t>
             </a:r>
           </a:p>
           <a:p>
@@ -10339,36 +10196,12 @@
               <a:t>generateMultiplesImperative</a:t>
             </a:r>
             <a:r>
-              <a:rPr lang="en-US" sz="2400" dirty="0"/>
-              <a:t>(</a:t>
-            </a:r>
-            <a:r>
-              <a:rPr lang="en-US" sz="2400" dirty="0" err="1"/>
-              <a:t>int</a:t>
-            </a:r>
-            <a:r>
-              <a:rPr lang="en-US" sz="2400" dirty="0"/>
-              <a:t> limit, </a:t>
-            </a:r>
-            <a:r>
-              <a:rPr lang="en-US" sz="2400" dirty="0" err="1"/>
-              <a:t>int</a:t>
-            </a:r>
-            <a:r>
-              <a:rPr lang="en-US" sz="2400" dirty="0"/>
-              <a:t> x, </a:t>
-            </a:r>
-            <a:r>
-              <a:rPr lang="en-US" sz="2400" dirty="0" err="1"/>
-              <a:t>int</a:t>
-            </a:r>
-            <a:r>
-              <a:rPr lang="en-US" sz="2400" dirty="0"/>
-              <a:t> y</a:t>
-            </a:r>
-            <a:r>
               <a:rPr lang="en-US" sz="2400" dirty="0" smtClean="0"/>
-              <a:t>) {</a:t>
+              <a:t>() </a:t>
+            </a:r>
+            <a:r>
+              <a:rPr lang="en-US" sz="2400" dirty="0" smtClean="0"/>
+              <a:t>{</a:t>
             </a:r>
             <a:endParaRPr lang="en-US" sz="2400" dirty="0"/>
           </a:p>
@@ -10419,7 +10252,31 @@
             </a:r>
             <a:r>
               <a:rPr lang="nn-NO" sz="2400" dirty="0"/>
-              <a:t>(var i = x; i &lt; limit; i += x) sum += i;</a:t>
+              <a:t>(var i = </a:t>
+            </a:r>
+            <a:r>
+              <a:rPr lang="nn-NO" sz="2400" dirty="0" smtClean="0"/>
+              <a:t>3; </a:t>
+            </a:r>
+            <a:r>
+              <a:rPr lang="nn-NO" sz="2400" dirty="0"/>
+              <a:t>i &lt; </a:t>
+            </a:r>
+            <a:r>
+              <a:rPr lang="nn-NO" sz="2400" dirty="0" smtClean="0"/>
+              <a:t>1000; </a:t>
+            </a:r>
+            <a:r>
+              <a:rPr lang="nn-NO" sz="2400" dirty="0"/>
+              <a:t>i += </a:t>
+            </a:r>
+            <a:r>
+              <a:rPr lang="nn-NO" sz="2400" dirty="0" smtClean="0"/>
+              <a:t>3) </a:t>
+            </a:r>
+            <a:r>
+              <a:rPr lang="nn-NO" sz="2400" dirty="0"/>
+              <a:t>sum += i;</a:t>
             </a:r>
           </a:p>
           <a:p>
@@ -10442,7 +10299,31 @@
             </a:r>
             <a:r>
               <a:rPr lang="nn-NO" sz="2400" dirty="0"/>
-              <a:t>(var i = y; i &lt; limit; i += y) sum += i;</a:t>
+              <a:t>(var i = </a:t>
+            </a:r>
+            <a:r>
+              <a:rPr lang="nn-NO" sz="2400" dirty="0" smtClean="0"/>
+              <a:t>5; </a:t>
+            </a:r>
+            <a:r>
+              <a:rPr lang="nn-NO" sz="2400" dirty="0"/>
+              <a:t>i &lt; </a:t>
+            </a:r>
+            <a:r>
+              <a:rPr lang="nn-NO" sz="2400" dirty="0" smtClean="0"/>
+              <a:t>1000; </a:t>
+            </a:r>
+            <a:r>
+              <a:rPr lang="nn-NO" sz="2400" dirty="0"/>
+              <a:t>i += </a:t>
+            </a:r>
+            <a:r>
+              <a:rPr lang="nn-NO" sz="2400" dirty="0" smtClean="0"/>
+              <a:t>5) </a:t>
+            </a:r>
+            <a:r>
+              <a:rPr lang="nn-NO" sz="2400" dirty="0"/>
+              <a:t>sum += i;</a:t>
             </a:r>
           </a:p>
           <a:p>
@@ -10455,56 +10336,41 @@
               </a:spcBef>
               <a:buNone/>
             </a:pPr>
-            <a:endParaRPr lang="en-US" sz="2400" dirty="0"/>
-          </a:p>
-          <a:p>
-            <a:pPr marL="0" indent="0">
-              <a:lnSpc>
-                <a:spcPct val="100000"/>
-              </a:lnSpc>
-              <a:spcBef>
-                <a:spcPts val="0"/>
-              </a:spcBef>
-              <a:buNone/>
-            </a:pPr>
-            <a:r>
-              <a:rPr lang="en-US" sz="2400" dirty="0"/>
-              <a:t>  </a:t>
-            </a:r>
-            <a:r>
-              <a:rPr lang="en-US" sz="2400" dirty="0" err="1" smtClean="0"/>
-              <a:t>var</a:t>
-            </a:r>
-            <a:r>
-              <a:rPr lang="en-US" sz="2400" dirty="0" smtClean="0"/>
-              <a:t> </a:t>
-            </a:r>
-            <a:r>
-              <a:rPr lang="en-US" sz="2400" dirty="0"/>
-              <a:t>product = x * y;</a:t>
-            </a:r>
-          </a:p>
-          <a:p>
-            <a:pPr marL="0" indent="0">
-              <a:lnSpc>
-                <a:spcPct val="100000"/>
-              </a:lnSpc>
-              <a:spcBef>
-                <a:spcPts val="0"/>
-              </a:spcBef>
-              <a:buNone/>
-            </a:pPr>
+            <a:r>
+              <a:rPr lang="nn-NO" sz="2400" dirty="0" smtClean="0"/>
+              <a:t>  for </a:t>
+            </a:r>
             <a:r>
               <a:rPr lang="nn-NO" sz="2400" dirty="0"/>
-              <a:t>  </a:t>
+              <a:t>(var i = </a:t>
             </a:r>
             <a:r>
               <a:rPr lang="nn-NO" sz="2400" dirty="0" smtClean="0"/>
-              <a:t>for </a:t>
+              <a:t>15</a:t>
+            </a:r>
+            <a:r>
+              <a:rPr lang="nn-NO" sz="2400" dirty="0" smtClean="0"/>
+              <a:t>; </a:t>
             </a:r>
             <a:r>
               <a:rPr lang="nn-NO" sz="2400" dirty="0"/>
-              <a:t>(var i = product; i &lt; limit; i += product) sum -= i;</a:t>
+              <a:t>i &lt; </a:t>
+            </a:r>
+            <a:r>
+              <a:rPr lang="nn-NO" sz="2400" dirty="0" smtClean="0"/>
+              <a:t>1000; </a:t>
+            </a:r>
+            <a:r>
+              <a:rPr lang="nn-NO" sz="2400" dirty="0"/>
+              <a:t>i += </a:t>
+            </a:r>
+            <a:r>
+              <a:rPr lang="nn-NO" sz="2400" dirty="0" smtClean="0"/>
+              <a:t>15) </a:t>
+            </a:r>
+            <a:r>
+              <a:rPr lang="nn-NO" sz="2400" dirty="0"/>
+              <a:t>sum -= i;</a:t>
             </a:r>
           </a:p>
           <a:p>
@@ -10980,26 +10846,39 @@
                                   </p:childTnLst>
                                 </p:cTn>
                               </p:par>
-                            </p:childTnLst>
-                          </p:cTn>
-                        </p:par>
-                      </p:childTnLst>
-                    </p:cTn>
-                  </p:par>
-                  <p:par>
-                    <p:cTn id="23" fill="hold">
-                      <p:stCondLst>
-                        <p:cond delay="indefinite"/>
-                      </p:stCondLst>
-                      <p:childTnLst>
-                        <p:par>
-                          <p:cTn id="24" fill="hold">
-                            <p:stCondLst>
-                              <p:cond delay="0"/>
-                            </p:stCondLst>
-                            <p:childTnLst>
                               <p:par>
-                                <p:cTn id="25" presetID="1" presetClass="entr" presetSubtype="0" fill="hold" nodeType="clickEffect">
+                                <p:cTn id="23" presetID="1" presetClass="entr" presetSubtype="0" fill="hold" nodeType="withEffect">
+                                  <p:stCondLst>
+                                    <p:cond delay="0"/>
+                                  </p:stCondLst>
+                                  <p:childTnLst>
+                                    <p:set>
+                                      <p:cBhvr>
+                                        <p:cTn id="24" dur="1" fill="hold">
+                                          <p:stCondLst>
+                                            <p:cond delay="0"/>
+                                          </p:stCondLst>
+                                        </p:cTn>
+                                        <p:tgtEl>
+                                          <p:spTgt spid="6147">
+                                            <p:txEl>
+                                              <p:pRg st="7" end="7"/>
+                                            </p:txEl>
+                                          </p:spTgt>
+                                        </p:tgtEl>
+                                        <p:attrNameLst>
+                                          <p:attrName>style.visibility</p:attrName>
+                                        </p:attrNameLst>
+                                      </p:cBhvr>
+                                      <p:to>
+                                        <p:strVal val="visible"/>
+                                      </p:to>
+                                    </p:set>
+                                  </p:childTnLst>
+                                </p:cTn>
+                              </p:par>
+                              <p:par>
+                                <p:cTn id="25" presetID="1" presetClass="entr" presetSubtype="0" fill="hold" nodeType="withEffect">
                                   <p:stCondLst>
                                     <p:cond delay="0"/>
                                   </p:stCondLst>
@@ -11046,68 +10925,6 @@
                                           <p:spTgt spid="6147">
                                             <p:txEl>
                                               <p:pRg st="9" end="9"/>
-                                            </p:txEl>
-                                          </p:spTgt>
-                                        </p:tgtEl>
-                                        <p:attrNameLst>
-                                          <p:attrName>style.visibility</p:attrName>
-                                        </p:attrNameLst>
-                                      </p:cBhvr>
-                                      <p:to>
-                                        <p:strVal val="visible"/>
-                                      </p:to>
-                                    </p:set>
-                                  </p:childTnLst>
-                                </p:cTn>
-                              </p:par>
-                              <p:par>
-                                <p:cTn id="29" presetID="1" presetClass="entr" presetSubtype="0" fill="hold" nodeType="withEffect">
-                                  <p:stCondLst>
-                                    <p:cond delay="0"/>
-                                  </p:stCondLst>
-                                  <p:childTnLst>
-                                    <p:set>
-                                      <p:cBhvr>
-                                        <p:cTn id="30" dur="1" fill="hold">
-                                          <p:stCondLst>
-                                            <p:cond delay="0"/>
-                                          </p:stCondLst>
-                                        </p:cTn>
-                                        <p:tgtEl>
-                                          <p:spTgt spid="6147">
-                                            <p:txEl>
-                                              <p:pRg st="10" end="10"/>
-                                            </p:txEl>
-                                          </p:spTgt>
-                                        </p:tgtEl>
-                                        <p:attrNameLst>
-                                          <p:attrName>style.visibility</p:attrName>
-                                        </p:attrNameLst>
-                                      </p:cBhvr>
-                                      <p:to>
-                                        <p:strVal val="visible"/>
-                                      </p:to>
-                                    </p:set>
-                                  </p:childTnLst>
-                                </p:cTn>
-                              </p:par>
-                              <p:par>
-                                <p:cTn id="31" presetID="1" presetClass="entr" presetSubtype="0" fill="hold" nodeType="withEffect">
-                                  <p:stCondLst>
-                                    <p:cond delay="0"/>
-                                  </p:stCondLst>
-                                  <p:childTnLst>
-                                    <p:set>
-                                      <p:cBhvr>
-                                        <p:cTn id="32" dur="1" fill="hold">
-                                          <p:stCondLst>
-                                            <p:cond delay="0"/>
-                                          </p:stCondLst>
-                                        </p:cTn>
-                                        <p:tgtEl>
-                                          <p:spTgt spid="6147">
-                                            <p:txEl>
-                                              <p:pRg st="11" end="11"/>
                                             </p:txEl>
                                           </p:spTgt>
                                         </p:tgtEl>
@@ -11187,7 +11004,7 @@
           <a:p>
             <a:r>
               <a:rPr lang="en-US" dirty="0" smtClean="0"/>
-              <a:t>Imperative C++</a:t>
+              <a:t>Iterator Methods</a:t>
             </a:r>
           </a:p>
         </p:txBody>
@@ -11217,51 +11034,11 @@
             </a:pPr>
             <a:r>
               <a:rPr lang="en-US" sz="2400" dirty="0"/>
-              <a:t>static </a:t>
-            </a:r>
-            <a:r>
-              <a:rPr lang="en-US" sz="2400" dirty="0" err="1"/>
-              <a:t>int</a:t>
-            </a:r>
-            <a:r>
-              <a:rPr lang="en-US" sz="2400" dirty="0"/>
-              <a:t> </a:t>
-            </a:r>
-            <a:r>
-              <a:rPr lang="en-US" sz="2400" dirty="0" err="1"/>
-              <a:t>GenerateMultiplesImperative</a:t>
-            </a:r>
-            <a:r>
-              <a:rPr lang="en-US" sz="2400" dirty="0"/>
-              <a:t>(</a:t>
-            </a:r>
-            <a:r>
-              <a:rPr lang="en-US" sz="2400" dirty="0" err="1"/>
-              <a:t>int</a:t>
-            </a:r>
-            <a:r>
-              <a:rPr lang="en-US" sz="2400" dirty="0"/>
-              <a:t> limit, </a:t>
-            </a:r>
-            <a:r>
-              <a:rPr lang="en-US" sz="2400" dirty="0" err="1"/>
-              <a:t>int</a:t>
-            </a:r>
-            <a:r>
-              <a:rPr lang="en-US" sz="2400" dirty="0"/>
-              <a:t> x, </a:t>
-            </a:r>
-            <a:r>
-              <a:rPr lang="en-US" sz="2400" dirty="0" err="1"/>
-              <a:t>int</a:t>
-            </a:r>
-            <a:r>
-              <a:rPr lang="en-US" sz="2400" dirty="0"/>
-              <a:t> y</a:t>
+              <a:t>// Generate multiples of x up to but not including </a:t>
             </a:r>
             <a:r>
               <a:rPr lang="en-US" sz="2400" dirty="0" smtClean="0"/>
-              <a:t>) {</a:t>
+              <a:t>1000</a:t>
             </a:r>
             <a:endParaRPr lang="en-US" sz="2400" dirty="0"/>
           </a:p>
@@ -11270,17 +11047,78 @@
               <a:buNone/>
             </a:pPr>
             <a:r>
+              <a:rPr lang="en-US" sz="2400" dirty="0" smtClean="0"/>
+              <a:t>public </a:t>
+            </a:r>
+            <a:r>
               <a:rPr lang="en-US" sz="2400" dirty="0"/>
-              <a:t>  auto sum = 0;</a:t>
-            </a:r>
+              <a:t>static </a:t>
+            </a:r>
+            <a:r>
+              <a:rPr lang="en-US" sz="2400" dirty="0" err="1"/>
+              <a:t>IEnumerable</a:t>
+            </a:r>
+            <a:r>
+              <a:rPr lang="en-US" sz="2400" dirty="0"/>
+              <a:t>&lt;</a:t>
+            </a:r>
+            <a:r>
+              <a:rPr lang="en-US" sz="2400" dirty="0" err="1"/>
+              <a:t>int</a:t>
+            </a:r>
+            <a:r>
+              <a:rPr lang="en-US" sz="2400" dirty="0"/>
+              <a:t>&gt; </a:t>
+            </a:r>
+            <a:r>
+              <a:rPr lang="en-US" sz="2400" dirty="0" err="1"/>
+              <a:t>multiplesOf</a:t>
+            </a:r>
+            <a:r>
+              <a:rPr lang="en-US" sz="2400" dirty="0"/>
+              <a:t>(</a:t>
+            </a:r>
+            <a:r>
+              <a:rPr lang="en-US" sz="2400" dirty="0" err="1"/>
+              <a:t>int</a:t>
+            </a:r>
+            <a:r>
+              <a:rPr lang="en-US" sz="2400" dirty="0"/>
+              <a:t> </a:t>
+            </a:r>
+            <a:r>
+              <a:rPr lang="en-US" sz="2400" dirty="0" smtClean="0"/>
+              <a:t>x) </a:t>
+            </a:r>
+            <a:r>
+              <a:rPr lang="en-US" sz="2400" dirty="0" smtClean="0"/>
+              <a:t>{</a:t>
+            </a:r>
+            <a:endParaRPr lang="en-US" sz="2400" dirty="0"/>
           </a:p>
           <a:p>
             <a:pPr marL="0" indent="0">
               <a:buNone/>
             </a:pPr>
             <a:r>
+              <a:rPr lang="nn-NO" sz="2400" dirty="0" smtClean="0"/>
+              <a:t>  </a:t>
+            </a:r>
+            <a:r>
               <a:rPr lang="nn-NO" sz="2400" dirty="0"/>
-              <a:t>  for (auto i = x; i &lt; limit; i += x) sum += i;</a:t>
+              <a:t>for (var i = x; i &lt; </a:t>
+            </a:r>
+            <a:r>
+              <a:rPr lang="nn-NO" sz="2400" dirty="0" smtClean="0"/>
+              <a:t>1000</a:t>
+            </a:r>
+            <a:r>
+              <a:rPr lang="nn-NO" sz="2400" dirty="0" smtClean="0"/>
+              <a:t>; </a:t>
+            </a:r>
+            <a:r>
+              <a:rPr lang="nn-NO" sz="2400" dirty="0"/>
+              <a:t>i += x) yield return i;</a:t>
             </a:r>
           </a:p>
           <a:p>
@@ -11288,35 +11126,56 @@
               <a:buNone/>
             </a:pPr>
             <a:r>
-              <a:rPr lang="nn-NO" sz="2400" dirty="0"/>
-              <a:t>  for (auto i = y; i &lt; limit; i += y) sum += i;</a:t>
-            </a:r>
-          </a:p>
-          <a:p>
-            <a:pPr marL="0" indent="0">
-              <a:buNone/>
-            </a:pPr>
-            <a:r>
-              <a:rPr lang="nn-NO" sz="2400" dirty="0"/>
-              <a:t>  for (auto i = x * y; i &lt; limit; i += x * y) sum -= i;</a:t>
-            </a:r>
-          </a:p>
-          <a:p>
-            <a:pPr marL="0" indent="0">
-              <a:buNone/>
-            </a:pPr>
-            <a:r>
-              <a:rPr lang="en-US" sz="2400" dirty="0"/>
-              <a:t>  return sum;</a:t>
-            </a:r>
-          </a:p>
-          <a:p>
-            <a:pPr marL="0" indent="0">
-              <a:buNone/>
-            </a:pPr>
-            <a:r>
               <a:rPr lang="en-US" sz="2400" dirty="0" smtClean="0"/>
               <a:t>}</a:t>
+            </a:r>
+          </a:p>
+          <a:p>
+            <a:r>
+              <a:rPr lang="en-US" sz="2400" dirty="0" smtClean="0"/>
+              <a:t>An iterator method contains the “yield” keyword</a:t>
+            </a:r>
+          </a:p>
+          <a:p>
+            <a:r>
+              <a:rPr lang="en-US" sz="2400" dirty="0" smtClean="0"/>
+              <a:t>An iterator method typically returns </a:t>
+            </a:r>
+            <a:r>
+              <a:rPr lang="en-US" sz="2400" dirty="0" err="1" smtClean="0"/>
+              <a:t>IEnumerable</a:t>
+            </a:r>
+            <a:r>
+              <a:rPr lang="en-US" sz="2400" dirty="0" smtClean="0"/>
+              <a:t>&lt;T&gt;</a:t>
+            </a:r>
+          </a:p>
+          <a:p>
+            <a:r>
+              <a:rPr lang="en-US" sz="2400" dirty="0" smtClean="0"/>
+              <a:t>This method represents a lazy sequence</a:t>
+            </a:r>
+          </a:p>
+          <a:p>
+            <a:r>
+              <a:rPr lang="en-US" sz="2400" dirty="0" smtClean="0"/>
+              <a:t>Every time you call </a:t>
+            </a:r>
+            <a:r>
+              <a:rPr lang="en-US" sz="2400" dirty="0" err="1" smtClean="0"/>
+              <a:t>MoveNext</a:t>
+            </a:r>
+            <a:r>
+              <a:rPr lang="en-US" sz="2400" dirty="0" smtClean="0"/>
+              <a:t> on the underlying </a:t>
+            </a:r>
+            <a:r>
+              <a:rPr lang="en-US" sz="2400" dirty="0" err="1" smtClean="0"/>
+              <a:t>IEnumerator</a:t>
+            </a:r>
+            <a:r>
+              <a:rPr lang="en-US" sz="2400" dirty="0" smtClean="0"/>
+              <a:t>&lt;T&gt; interface, the state machine yields the next item</a:t>
             </a:r>
             <a:endParaRPr lang="en-US" sz="2400" dirty="0"/>
           </a:p>
@@ -11470,7 +11329,7 @@
     </p:spTree>
     <p:extLst>
       <p:ext uri="{BB962C8B-B14F-4D97-AF65-F5344CB8AC3E}">
-        <p14:creationId xmlns:p14="http://schemas.microsoft.com/office/powerpoint/2010/main" val="3357475423"/>
+        <p14:creationId xmlns:p14="http://schemas.microsoft.com/office/powerpoint/2010/main" val="616167563"/>
       </p:ext>
     </p:extLst>
   </p:cSld>
@@ -11521,7 +11380,7 @@
           <a:p>
             <a:r>
               <a:rPr lang="en-US" dirty="0" smtClean="0"/>
-              <a:t>Iterator Methods</a:t>
+              <a:t>More Functional C#</a:t>
             </a:r>
           </a:p>
         </p:txBody>
@@ -11551,8 +11410,13 @@
             </a:pPr>
             <a:r>
               <a:rPr lang="en-US" sz="2400" dirty="0"/>
-              <a:t>// Generate multiples of x up to but not including limit</a:t>
-            </a:r>
+              <a:t>// Sum multiples of </a:t>
+            </a:r>
+            <a:r>
+              <a:rPr lang="en-US" sz="2400" dirty="0" smtClean="0"/>
+              <a:t>3</a:t>
+            </a:r>
+            <a:endParaRPr lang="en-US" sz="2400" dirty="0"/>
           </a:p>
           <a:p>
             <a:pPr marL="0" indent="0">
@@ -11560,55 +11424,15 @@
             </a:pPr>
             <a:r>
               <a:rPr lang="en-US" sz="2400" dirty="0" smtClean="0"/>
-              <a:t>public </a:t>
+              <a:t>// </a:t>
             </a:r>
             <a:r>
               <a:rPr lang="en-US" sz="2400" dirty="0"/>
-              <a:t>static </a:t>
-            </a:r>
-            <a:r>
-              <a:rPr lang="en-US" sz="2400" dirty="0" err="1"/>
-              <a:t>IEnumerable</a:t>
-            </a:r>
-            <a:r>
-              <a:rPr lang="en-US" sz="2400" dirty="0"/>
-              <a:t>&lt;</a:t>
-            </a:r>
-            <a:r>
-              <a:rPr lang="en-US" sz="2400" dirty="0" err="1"/>
-              <a:t>int</a:t>
-            </a:r>
-            <a:r>
-              <a:rPr lang="en-US" sz="2400" dirty="0"/>
-              <a:t>&gt; </a:t>
-            </a:r>
-            <a:r>
-              <a:rPr lang="en-US" sz="2400" dirty="0" err="1"/>
-              <a:t>multiplesOf</a:t>
-            </a:r>
-            <a:r>
-              <a:rPr lang="en-US" sz="2400" dirty="0"/>
-              <a:t>(</a:t>
-            </a:r>
-            <a:r>
-              <a:rPr lang="en-US" sz="2400" dirty="0" err="1"/>
-              <a:t>int</a:t>
-            </a:r>
-            <a:r>
-              <a:rPr lang="en-US" sz="2400" dirty="0"/>
-              <a:t> x, </a:t>
-            </a:r>
-            <a:r>
-              <a:rPr lang="en-US" sz="2400" dirty="0" err="1"/>
-              <a:t>int</a:t>
-            </a:r>
-            <a:r>
-              <a:rPr lang="en-US" sz="2400" dirty="0"/>
-              <a:t> limit</a:t>
+              <a:t>Sum multiples of </a:t>
             </a:r>
             <a:r>
               <a:rPr lang="en-US" sz="2400" dirty="0" smtClean="0"/>
-              <a:t>) {</a:t>
+              <a:t>5</a:t>
             </a:r>
             <a:endParaRPr lang="en-US" sz="2400" dirty="0"/>
           </a:p>
@@ -11617,12 +11441,28 @@
               <a:buNone/>
             </a:pPr>
             <a:r>
-              <a:rPr lang="nn-NO" sz="2400" dirty="0" smtClean="0"/>
-              <a:t>  </a:t>
-            </a:r>
-            <a:r>
-              <a:rPr lang="nn-NO" sz="2400" dirty="0"/>
-              <a:t>for (var i = x; i &lt; limit; i += x) yield return i;</a:t>
+              <a:rPr lang="en-US" sz="2400" dirty="0" smtClean="0"/>
+              <a:t>// </a:t>
+            </a:r>
+            <a:r>
+              <a:rPr lang="en-US" sz="2400" dirty="0"/>
+              <a:t>Subtract multiples of </a:t>
+            </a:r>
+            <a:r>
+              <a:rPr lang="en-US" sz="2400" dirty="0" smtClean="0"/>
+              <a:t>3 </a:t>
+            </a:r>
+            <a:r>
+              <a:rPr lang="en-US" sz="2400" dirty="0"/>
+              <a:t>* </a:t>
+            </a:r>
+            <a:r>
+              <a:rPr lang="en-US" sz="2400" dirty="0" smtClean="0"/>
+              <a:t>5 </a:t>
+            </a:r>
+            <a:r>
+              <a:rPr lang="en-US" sz="2400" dirty="0"/>
+              <a:t>to eliminate duplicates</a:t>
             </a:r>
           </a:p>
           <a:p>
@@ -11631,55 +11471,116 @@
             </a:pPr>
             <a:r>
               <a:rPr lang="en-US" sz="2400" dirty="0" smtClean="0"/>
+              <a:t>static </a:t>
+            </a:r>
+            <a:r>
+              <a:rPr lang="en-US" sz="2400" dirty="0" err="1"/>
+              <a:t>int</a:t>
+            </a:r>
+            <a:r>
+              <a:rPr lang="en-US" sz="2400" dirty="0"/>
+              <a:t> </a:t>
+            </a:r>
+            <a:r>
+              <a:rPr lang="en-US" sz="2400" dirty="0" err="1"/>
+              <a:t>generateMultiplesFunctional</a:t>
+            </a:r>
+            <a:r>
+              <a:rPr lang="en-US" sz="2400" dirty="0" smtClean="0"/>
+              <a:t>() </a:t>
+            </a:r>
+            <a:r>
+              <a:rPr lang="en-US" sz="2400" dirty="0" smtClean="0"/>
+              <a:t>{</a:t>
+            </a:r>
+            <a:endParaRPr lang="en-US" sz="2400" dirty="0"/>
+          </a:p>
+          <a:p>
+            <a:pPr marL="0" indent="0">
+              <a:buNone/>
+            </a:pPr>
+            <a:r>
+              <a:rPr lang="en-US" sz="2400" dirty="0" smtClean="0"/>
+              <a:t>  return </a:t>
+            </a:r>
+            <a:r>
+              <a:rPr lang="en-US" sz="2400" dirty="0" err="1" smtClean="0"/>
+              <a:t>multiplesOf</a:t>
+            </a:r>
+            <a:r>
+              <a:rPr lang="en-US" sz="2400" dirty="0" smtClean="0"/>
+              <a:t>(3).</a:t>
+            </a:r>
+            <a:r>
+              <a:rPr lang="en-US" sz="2400" dirty="0"/>
+              <a:t>Sum() </a:t>
+            </a:r>
+            <a:r>
+              <a:rPr lang="en-US" sz="2400" dirty="0" smtClean="0"/>
+              <a:t>+</a:t>
+            </a:r>
+          </a:p>
+          <a:p>
+            <a:pPr marL="0" indent="0">
+              <a:buNone/>
+            </a:pPr>
+            <a:r>
+              <a:rPr lang="en-US" sz="2400" dirty="0"/>
+              <a:t> </a:t>
+            </a:r>
+            <a:r>
+              <a:rPr lang="en-US" sz="2400" dirty="0" smtClean="0"/>
+              <a:t>           </a:t>
+            </a:r>
+            <a:r>
+              <a:rPr lang="en-US" sz="2400" dirty="0" err="1" smtClean="0"/>
+              <a:t>multiplesOf</a:t>
+            </a:r>
+            <a:r>
+              <a:rPr lang="en-US" sz="2400" dirty="0" smtClean="0"/>
+              <a:t>(5).</a:t>
+            </a:r>
+            <a:r>
+              <a:rPr lang="en-US" sz="2400" dirty="0"/>
+              <a:t>Sum() </a:t>
+            </a:r>
+            <a:r>
+              <a:rPr lang="en-US" sz="2400" dirty="0" smtClean="0"/>
+              <a:t>–</a:t>
+            </a:r>
+          </a:p>
+          <a:p>
+            <a:pPr marL="0" indent="0">
+              <a:buNone/>
+            </a:pPr>
+            <a:r>
+              <a:rPr lang="en-US" sz="2400" dirty="0"/>
+              <a:t> </a:t>
+            </a:r>
+            <a:r>
+              <a:rPr lang="en-US" sz="2400" dirty="0" smtClean="0"/>
+              <a:t>           </a:t>
+            </a:r>
+            <a:r>
+              <a:rPr lang="en-US" sz="2400" dirty="0" err="1" smtClean="0"/>
+              <a:t>multiplesOf</a:t>
+            </a:r>
+            <a:r>
+              <a:rPr lang="en-US" sz="2400" dirty="0" smtClean="0"/>
+              <a:t>(3 * 5).</a:t>
+            </a:r>
+            <a:r>
+              <a:rPr lang="en-US" sz="2400" dirty="0"/>
+              <a:t>Sum();</a:t>
+            </a:r>
+          </a:p>
+          <a:p>
+            <a:pPr marL="0" indent="0">
+              <a:buNone/>
+            </a:pPr>
+            <a:r>
+              <a:rPr lang="en-US" sz="2400" dirty="0" smtClean="0"/>
               <a:t>}</a:t>
-            </a:r>
-          </a:p>
-          <a:p>
-            <a:r>
-              <a:rPr lang="en-US" sz="2400" dirty="0" smtClean="0"/>
-              <a:t>An iterator method contains the “yield” keyword</a:t>
-            </a:r>
-          </a:p>
-          <a:p>
-            <a:r>
-              <a:rPr lang="en-US" sz="2400" dirty="0" smtClean="0"/>
-              <a:t>An iterator method typically returns </a:t>
-            </a:r>
-            <a:r>
-              <a:rPr lang="en-US" sz="2400" dirty="0" err="1" smtClean="0"/>
-              <a:t>IEnumerable</a:t>
-            </a:r>
-            <a:r>
-              <a:rPr lang="en-US" sz="2400" dirty="0" smtClean="0"/>
-              <a:t>&lt;T&gt;</a:t>
-            </a:r>
-          </a:p>
-          <a:p>
-            <a:r>
-              <a:rPr lang="en-US" sz="2400" dirty="0" smtClean="0"/>
-              <a:t>This method represents a lazy sequence</a:t>
-            </a:r>
-          </a:p>
-          <a:p>
-            <a:r>
-              <a:rPr lang="en-US" sz="2400" dirty="0" smtClean="0"/>
-              <a:t>Every time you call </a:t>
-            </a:r>
-            <a:r>
-              <a:rPr lang="en-US" sz="2400" dirty="0" err="1" smtClean="0"/>
-              <a:t>MoveNext</a:t>
-            </a:r>
-            <a:r>
-              <a:rPr lang="en-US" sz="2400" dirty="0" smtClean="0"/>
-              <a:t> on the underlying </a:t>
-            </a:r>
-            <a:r>
-              <a:rPr lang="en-US" sz="2400" dirty="0" err="1" smtClean="0"/>
-              <a:t>IEnumerator</a:t>
-            </a:r>
-            <a:r>
-              <a:rPr lang="en-US" sz="2400" dirty="0" smtClean="0"/>
-              <a:t>&lt;T&gt; interface, the state machine yields the next item</a:t>
             </a:r>
             <a:endParaRPr lang="en-US" sz="2400" dirty="0"/>
           </a:p>
@@ -11833,7 +11734,7 @@
     </p:spTree>
     <p:extLst>
       <p:ext uri="{BB962C8B-B14F-4D97-AF65-F5344CB8AC3E}">
-        <p14:creationId xmlns:p14="http://schemas.microsoft.com/office/powerpoint/2010/main" val="616167563"/>
+        <p14:creationId xmlns:p14="http://schemas.microsoft.com/office/powerpoint/2010/main" val="3759550029"/>
       </p:ext>
     </p:extLst>
   </p:cSld>
@@ -12117,7 +12018,7 @@
       </p:grpSpPr>
       <p:sp>
         <p:nvSpPr>
-          <p:cNvPr id="6146" name="Title 1"/>
+          <p:cNvPr id="2" name="Title 1"/>
           <p:cNvSpPr>
             <a:spLocks noGrp="1"/>
           </p:cNvSpPr>
@@ -12132,14 +12033,15 @@
           <a:p>
             <a:r>
               <a:rPr lang="en-US" dirty="0" smtClean="0"/>
-              <a:t>More Functional C#</a:t>
-            </a:r>
+              <a:t>Functional C++</a:t>
+            </a:r>
+            <a:endParaRPr lang="en-US" dirty="0"/>
           </a:p>
         </p:txBody>
       </p:sp>
       <p:sp>
         <p:nvSpPr>
-          <p:cNvPr id="6147" name="Content Placeholder 2"/>
+          <p:cNvPr id="3" name="Content Placeholder 2"/>
           <p:cNvSpPr>
             <a:spLocks noGrp="1"/>
           </p:cNvSpPr>
@@ -12149,8 +12051,8 @@
         </p:nvSpPr>
         <p:spPr>
           <a:xfrm>
-            <a:off x="0" y="1085385"/>
-            <a:ext cx="9144000" cy="5215054"/>
+            <a:off x="0" y="1219200"/>
+            <a:ext cx="9144000" cy="4929188"/>
           </a:xfrm>
         </p:spPr>
         <p:txBody>
@@ -12161,21 +12063,38 @@
               <a:buNone/>
             </a:pPr>
             <a:r>
-              <a:rPr lang="en-US" sz="2400" dirty="0"/>
-              <a:t>// Sum multiples of x</a:t>
-            </a:r>
+              <a:rPr lang="en-US" dirty="0"/>
+              <a:t>// Generate multiples of x up to but not including </a:t>
+            </a:r>
+            <a:r>
+              <a:rPr lang="en-US" dirty="0" smtClean="0"/>
+              <a:t>1000</a:t>
+            </a:r>
+            <a:endParaRPr lang="en-US" dirty="0"/>
           </a:p>
           <a:p>
             <a:pPr marL="0" indent="0">
               <a:buNone/>
             </a:pPr>
             <a:r>
-              <a:rPr lang="en-US" sz="2400" dirty="0" smtClean="0"/>
-              <a:t>// </a:t>
-            </a:r>
-            <a:r>
-              <a:rPr lang="en-US" sz="2400" dirty="0"/>
-              <a:t>Sum multiples of y</a:t>
+              <a:rPr lang="en-US" dirty="0"/>
+              <a:t>static boost::</a:t>
+            </a:r>
+            <a:r>
+              <a:rPr lang="en-US" dirty="0" err="1"/>
+              <a:t>strided_integer_range</a:t>
+            </a:r>
+            <a:r>
+              <a:rPr lang="en-US" dirty="0"/>
+              <a:t>&lt;</a:t>
+            </a:r>
+            <a:r>
+              <a:rPr lang="en-US" dirty="0" err="1"/>
+              <a:t>int</a:t>
+            </a:r>
+            <a:r>
+              <a:rPr lang="en-US" dirty="0" smtClean="0"/>
+              <a:t>&gt;</a:t>
             </a:r>
           </a:p>
           <a:p>
@@ -12183,150 +12102,107 @@
               <a:buNone/>
             </a:pPr>
             <a:r>
-              <a:rPr lang="en-US" sz="2400" dirty="0" smtClean="0"/>
-              <a:t>// </a:t>
-            </a:r>
-            <a:r>
-              <a:rPr lang="en-US" sz="2400" dirty="0"/>
-              <a:t>Subtract multiples of x * y to eliminate duplicates</a:t>
-            </a:r>
+              <a:rPr lang="en-US" dirty="0" err="1" smtClean="0"/>
+              <a:t>MultiplesOf</a:t>
+            </a:r>
+            <a:r>
+              <a:rPr lang="en-US" dirty="0" smtClean="0"/>
+              <a:t>(</a:t>
+            </a:r>
+            <a:r>
+              <a:rPr lang="en-US" dirty="0" err="1" smtClean="0"/>
+              <a:t>int</a:t>
+            </a:r>
+            <a:r>
+              <a:rPr lang="en-US" dirty="0" smtClean="0"/>
+              <a:t> </a:t>
+            </a:r>
+            <a:r>
+              <a:rPr lang="en-US" dirty="0" smtClean="0"/>
+              <a:t>x) </a:t>
+            </a:r>
+            <a:r>
+              <a:rPr lang="en-US" dirty="0" smtClean="0"/>
+              <a:t>{</a:t>
+            </a:r>
+            <a:endParaRPr lang="en-US" dirty="0"/>
           </a:p>
           <a:p>
             <a:pPr marL="0" indent="0">
               <a:buNone/>
             </a:pPr>
             <a:r>
-              <a:rPr lang="en-US" sz="2400" dirty="0" smtClean="0"/>
-              <a:t>static </a:t>
-            </a:r>
-            <a:r>
-              <a:rPr lang="en-US" sz="2400" dirty="0" err="1"/>
-              <a:t>int</a:t>
-            </a:r>
-            <a:r>
-              <a:rPr lang="en-US" sz="2400" dirty="0"/>
-              <a:t> </a:t>
-            </a:r>
-            <a:r>
-              <a:rPr lang="en-US" sz="2400" dirty="0" err="1"/>
-              <a:t>generateMultiplesFunctional</a:t>
-            </a:r>
-            <a:r>
-              <a:rPr lang="en-US" sz="2400" dirty="0"/>
-              <a:t>(</a:t>
-            </a:r>
-            <a:r>
-              <a:rPr lang="en-US" sz="2400" dirty="0" err="1"/>
-              <a:t>int</a:t>
-            </a:r>
-            <a:r>
-              <a:rPr lang="en-US" sz="2400" dirty="0"/>
-              <a:t> limit, </a:t>
-            </a:r>
-            <a:r>
-              <a:rPr lang="en-US" sz="2400" dirty="0" err="1"/>
-              <a:t>int</a:t>
-            </a:r>
-            <a:r>
-              <a:rPr lang="en-US" sz="2400" dirty="0"/>
-              <a:t> x, </a:t>
-            </a:r>
-            <a:r>
-              <a:rPr lang="en-US" sz="2400" dirty="0" err="1"/>
-              <a:t>int</a:t>
-            </a:r>
-            <a:r>
-              <a:rPr lang="en-US" sz="2400" dirty="0"/>
-              <a:t> y</a:t>
-            </a:r>
-            <a:r>
-              <a:rPr lang="en-US" sz="2400" dirty="0" smtClean="0"/>
-              <a:t>) {</a:t>
-            </a:r>
-            <a:endParaRPr lang="en-US" sz="2400" dirty="0"/>
+              <a:rPr lang="en-US" dirty="0"/>
+              <a:t>  return boost::</a:t>
+            </a:r>
+            <a:r>
+              <a:rPr lang="en-US" dirty="0" err="1"/>
+              <a:t>irange</a:t>
+            </a:r>
+            <a:r>
+              <a:rPr lang="en-US" dirty="0"/>
+              <a:t>(x, </a:t>
+            </a:r>
+            <a:r>
+              <a:rPr lang="en-US" dirty="0" smtClean="0"/>
+              <a:t>1000, </a:t>
+            </a:r>
+            <a:r>
+              <a:rPr lang="en-US" dirty="0"/>
+              <a:t>x);</a:t>
+            </a:r>
           </a:p>
           <a:p>
             <a:pPr marL="0" indent="0">
               <a:buNone/>
             </a:pPr>
             <a:r>
-              <a:rPr lang="en-US" sz="2400" dirty="0" smtClean="0"/>
-              <a:t>  return </a:t>
-            </a:r>
-            <a:r>
-              <a:rPr lang="en-US" sz="2400" dirty="0" err="1"/>
-              <a:t>multiplesOf</a:t>
-            </a:r>
-            <a:r>
-              <a:rPr lang="en-US" sz="2400" dirty="0"/>
-              <a:t>(x, limit).Sum() </a:t>
-            </a:r>
-            <a:r>
-              <a:rPr lang="en-US" sz="2400" dirty="0" smtClean="0"/>
-              <a:t>+</a:t>
-            </a:r>
-          </a:p>
-          <a:p>
-            <a:pPr marL="0" indent="0">
-              <a:buNone/>
-            </a:pPr>
-            <a:r>
-              <a:rPr lang="en-US" sz="2400" dirty="0"/>
-              <a:t> </a:t>
-            </a:r>
-            <a:r>
-              <a:rPr lang="en-US" sz="2400" dirty="0" smtClean="0"/>
-              <a:t>           </a:t>
-            </a:r>
-            <a:r>
-              <a:rPr lang="en-US" sz="2400" dirty="0" err="1"/>
-              <a:t>multiplesOf</a:t>
-            </a:r>
-            <a:r>
-              <a:rPr lang="en-US" sz="2400" dirty="0"/>
-              <a:t>(y, limit).Sum() </a:t>
-            </a:r>
-            <a:r>
-              <a:rPr lang="en-US" sz="2400" dirty="0" smtClean="0"/>
-              <a:t>–</a:t>
-            </a:r>
-          </a:p>
-          <a:p>
-            <a:pPr marL="0" indent="0">
-              <a:buNone/>
-            </a:pPr>
-            <a:r>
-              <a:rPr lang="en-US" sz="2400" dirty="0"/>
-              <a:t> </a:t>
-            </a:r>
-            <a:r>
-              <a:rPr lang="en-US" sz="2400" dirty="0" smtClean="0"/>
-              <a:t>           </a:t>
-            </a:r>
-            <a:r>
-              <a:rPr lang="en-US" sz="2400" dirty="0" err="1"/>
-              <a:t>multiplesOf</a:t>
-            </a:r>
-            <a:r>
-              <a:rPr lang="en-US" sz="2400" dirty="0"/>
-              <a:t>(x * y, limit).Sum();</a:t>
-            </a:r>
-          </a:p>
-          <a:p>
-            <a:pPr marL="0" indent="0">
-              <a:buNone/>
-            </a:pPr>
-            <a:r>
-              <a:rPr lang="en-US" sz="2400" dirty="0" smtClean="0"/>
+              <a:rPr lang="en-US" dirty="0" smtClean="0"/>
               <a:t>}</a:t>
             </a:r>
-            <a:endParaRPr lang="en-US" sz="2400" dirty="0"/>
+          </a:p>
+          <a:p>
+            <a:r>
+              <a:rPr lang="en-US" dirty="0" smtClean="0"/>
+              <a:t>boost::</a:t>
+            </a:r>
+            <a:r>
+              <a:rPr lang="en-US" dirty="0" err="1" smtClean="0"/>
+              <a:t>irange</a:t>
+            </a:r>
+            <a:r>
+              <a:rPr lang="en-US" dirty="0" smtClean="0"/>
+              <a:t> allows us to specify a step size, but </a:t>
+            </a:r>
+            <a:r>
+              <a:rPr lang="en-US" dirty="0" err="1" smtClean="0"/>
+              <a:t>Enumerable.Range</a:t>
+            </a:r>
+            <a:r>
+              <a:rPr lang="en-US" dirty="0" smtClean="0"/>
+              <a:t> did not</a:t>
+            </a:r>
+          </a:p>
+          <a:p>
+            <a:r>
+              <a:rPr lang="en-US" dirty="0" smtClean="0"/>
+              <a:t>There is a bug in boost::</a:t>
+            </a:r>
+            <a:r>
+              <a:rPr lang="en-US" dirty="0" err="1" smtClean="0"/>
+              <a:t>irange</a:t>
+            </a:r>
+            <a:r>
+              <a:rPr lang="en-US" dirty="0" smtClean="0"/>
+              <a:t> version 1.50 that’s fixed in some later version</a:t>
+            </a:r>
+            <a:endParaRPr lang="en-US" dirty="0"/>
           </a:p>
         </p:txBody>
       </p:sp>
       <p:sp>
         <p:nvSpPr>
-          <p:cNvPr id="6148" name="Footer Placeholder 3"/>
+          <p:cNvPr id="4" name="Footer Placeholder 3"/>
           <p:cNvSpPr>
             <a:spLocks noGrp="1"/>
           </p:cNvSpPr>
@@ -12334,145 +12210,26 @@
             <p:ph type="ftr" sz="quarter" idx="11"/>
           </p:nvPr>
         </p:nvSpPr>
-        <p:spPr>
-          <a:noFill/>
-          <a:ln/>
-          <a:extLst>
-            <a:ext uri="{909E8E84-426E-40DD-AFC4-6F175D3DCCD1}">
-              <a14:hiddenFill xmlns:a14="http://schemas.microsoft.com/office/drawing/2010/main">
-                <a:solidFill>
-                  <a:srgbClr val="FFFFFF"/>
-                </a:solidFill>
-              </a14:hiddenFill>
-            </a:ext>
-            <a:ext uri="{91240B29-F687-4F45-9708-019B960494DF}">
-              <a14:hiddenLine xmlns:a14="http://schemas.microsoft.com/office/drawing/2010/main" w="9525">
-                <a:solidFill>
-                  <a:srgbClr val="000000"/>
-                </a:solidFill>
-                <a:miter lim="800000"/>
-                <a:headEnd/>
-                <a:tailEnd/>
-              </a14:hiddenLine>
-            </a:ext>
-          </a:extLst>
-        </p:spPr>
+        <p:spPr/>
         <p:txBody>
           <a:bodyPr/>
-          <a:lstStyle>
-            <a:lvl1pPr eaLnBrk="0" hangingPunct="0">
-              <a:defRPr sz="2800" b="1">
-                <a:solidFill>
-                  <a:schemeClr val="tx1"/>
-                </a:solidFill>
-                <a:latin typeface="Arial" charset="0"/>
-              </a:defRPr>
-            </a:lvl1pPr>
-            <a:lvl2pPr marL="742950" indent="-285750" eaLnBrk="0" hangingPunct="0">
-              <a:defRPr sz="2800" b="1">
-                <a:solidFill>
-                  <a:schemeClr val="tx1"/>
-                </a:solidFill>
-                <a:latin typeface="Arial" charset="0"/>
-              </a:defRPr>
-            </a:lvl2pPr>
-            <a:lvl3pPr marL="1143000" indent="-228600" eaLnBrk="0" hangingPunct="0">
-              <a:defRPr sz="2800" b="1">
-                <a:solidFill>
-                  <a:schemeClr val="tx1"/>
-                </a:solidFill>
-                <a:latin typeface="Arial" charset="0"/>
-              </a:defRPr>
-            </a:lvl3pPr>
-            <a:lvl4pPr marL="1600200" indent="-228600" eaLnBrk="0" hangingPunct="0">
-              <a:defRPr sz="2800" b="1">
-                <a:solidFill>
-                  <a:schemeClr val="tx1"/>
-                </a:solidFill>
-                <a:latin typeface="Arial" charset="0"/>
-              </a:defRPr>
-            </a:lvl4pPr>
-            <a:lvl5pPr marL="2057400" indent="-228600" eaLnBrk="0" hangingPunct="0">
-              <a:defRPr sz="2800" b="1">
-                <a:solidFill>
-                  <a:schemeClr val="tx1"/>
-                </a:solidFill>
-                <a:latin typeface="Arial" charset="0"/>
-              </a:defRPr>
-            </a:lvl5pPr>
-            <a:lvl6pPr marL="2514600" indent="-228600" eaLnBrk="0" fontAlgn="base" hangingPunct="0">
-              <a:spcBef>
-                <a:spcPct val="0"/>
-              </a:spcBef>
-              <a:spcAft>
-                <a:spcPct val="0"/>
-              </a:spcAft>
-              <a:defRPr sz="2800" b="1">
-                <a:solidFill>
-                  <a:schemeClr val="tx1"/>
-                </a:solidFill>
-                <a:latin typeface="Arial" charset="0"/>
-              </a:defRPr>
-            </a:lvl6pPr>
-            <a:lvl7pPr marL="2971800" indent="-228600" eaLnBrk="0" fontAlgn="base" hangingPunct="0">
-              <a:spcBef>
-                <a:spcPct val="0"/>
-              </a:spcBef>
-              <a:spcAft>
-                <a:spcPct val="0"/>
-              </a:spcAft>
-              <a:defRPr sz="2800" b="1">
-                <a:solidFill>
-                  <a:schemeClr val="tx1"/>
-                </a:solidFill>
-                <a:latin typeface="Arial" charset="0"/>
-              </a:defRPr>
-            </a:lvl7pPr>
-            <a:lvl8pPr marL="3429000" indent="-228600" eaLnBrk="0" fontAlgn="base" hangingPunct="0">
-              <a:spcBef>
-                <a:spcPct val="0"/>
-              </a:spcBef>
-              <a:spcAft>
-                <a:spcPct val="0"/>
-              </a:spcAft>
-              <a:defRPr sz="2800" b="1">
-                <a:solidFill>
-                  <a:schemeClr val="tx1"/>
-                </a:solidFill>
-                <a:latin typeface="Arial" charset="0"/>
-              </a:defRPr>
-            </a:lvl8pPr>
-            <a:lvl9pPr marL="3886200" indent="-228600" eaLnBrk="0" fontAlgn="base" hangingPunct="0">
-              <a:spcBef>
-                <a:spcPct val="0"/>
-              </a:spcBef>
-              <a:spcAft>
-                <a:spcPct val="0"/>
-              </a:spcAft>
-              <a:defRPr sz="2800" b="1">
-                <a:solidFill>
-                  <a:schemeClr val="tx1"/>
-                </a:solidFill>
-                <a:latin typeface="Arial" charset="0"/>
-              </a:defRPr>
-            </a:lvl9pPr>
-          </a:lstStyle>
-          <a:p>
-            <a:r>
-              <a:rPr lang="en-US" sz="1400" b="0" smtClean="0">
-                <a:solidFill>
-                  <a:srgbClr val="FFFFFF"/>
-                </a:solidFill>
-              </a:rPr>
+          <a:lstStyle/>
+          <a:p>
+            <a:pPr>
+              <a:defRPr/>
+            </a:pPr>
+            <a:r>
+              <a:rPr lang="en-US" smtClean="0"/>
               <a:t>Teradyne Confidential and Proprietary</a:t>
             </a:r>
+            <a:endParaRPr lang="en-US"/>
           </a:p>
         </p:txBody>
       </p:sp>
     </p:spTree>
     <p:extLst>
       <p:ext uri="{BB962C8B-B14F-4D97-AF65-F5344CB8AC3E}">
-        <p14:creationId xmlns:p14="http://schemas.microsoft.com/office/powerpoint/2010/main" val="3759550029"/>
+        <p14:creationId xmlns:p14="http://schemas.microsoft.com/office/powerpoint/2010/main" val="3377776425"/>
       </p:ext>
     </p:extLst>
   </p:cSld>
@@ -12553,72 +12310,57 @@
               <a:buNone/>
             </a:pPr>
             <a:r>
-              <a:rPr lang="en-US" dirty="0"/>
-              <a:t>// Generate multiples of x up to but not including limit</a:t>
-            </a:r>
+              <a:rPr lang="en-US" dirty="0" smtClean="0"/>
+              <a:t>static </a:t>
+            </a:r>
+            <a:r>
+              <a:rPr lang="en-US" dirty="0" err="1" smtClean="0"/>
+              <a:t>int</a:t>
+            </a:r>
+            <a:endParaRPr lang="en-US" dirty="0" smtClean="0"/>
           </a:p>
           <a:p>
             <a:pPr marL="0" indent="0">
               <a:buNone/>
             </a:pPr>
             <a:r>
-              <a:rPr lang="en-US" dirty="0"/>
-              <a:t>static boost::</a:t>
-            </a:r>
-            <a:r>
-              <a:rPr lang="en-US" dirty="0" err="1"/>
-              <a:t>strided_integer_range</a:t>
-            </a:r>
-            <a:r>
-              <a:rPr lang="en-US" dirty="0"/>
-              <a:t>&lt;</a:t>
-            </a:r>
-            <a:r>
-              <a:rPr lang="en-US" dirty="0" err="1"/>
-              <a:t>int</a:t>
+              <a:rPr lang="en-US" dirty="0" err="1" smtClean="0"/>
+              <a:t>GenerateMultiplesFunctional</a:t>
             </a:r>
             <a:r>
               <a:rPr lang="en-US" dirty="0" smtClean="0"/>
-              <a:t>&gt;</a:t>
-            </a:r>
+              <a:t>() </a:t>
+            </a:r>
+            <a:r>
+              <a:rPr lang="en-US" dirty="0" smtClean="0"/>
+              <a:t>{</a:t>
+            </a:r>
+            <a:endParaRPr lang="en-US" dirty="0"/>
           </a:p>
           <a:p>
             <a:pPr marL="0" indent="0">
               <a:buNone/>
             </a:pPr>
             <a:r>
+              <a:rPr lang="en-US" dirty="0"/>
+              <a:t>  return boost::</a:t>
+            </a:r>
+            <a:r>
+              <a:rPr lang="en-US" dirty="0" smtClean="0"/>
+              <a:t>accumulate(</a:t>
+            </a:r>
+            <a:r>
               <a:rPr lang="en-US" dirty="0" err="1" smtClean="0"/>
               <a:t>MultiplesOf</a:t>
             </a:r>
             <a:r>
               <a:rPr lang="en-US" dirty="0" smtClean="0"/>
-              <a:t>(</a:t>
-            </a:r>
-            <a:r>
-              <a:rPr lang="en-US" dirty="0" err="1" smtClean="0"/>
-              <a:t>int</a:t>
-            </a:r>
-            <a:r>
-              <a:rPr lang="en-US" dirty="0" smtClean="0"/>
-              <a:t> </a:t>
+              <a:t>(3), </a:t>
             </a:r>
             <a:r>
               <a:rPr lang="en-US" dirty="0"/>
-              <a:t>x, </a:t>
-            </a:r>
-            <a:r>
-              <a:rPr lang="en-US" dirty="0" err="1"/>
-              <a:t>int</a:t>
-            </a:r>
-            <a:r>
-              <a:rPr lang="en-US" dirty="0"/>
-              <a:t> limit</a:t>
-            </a:r>
-            <a:r>
-              <a:rPr lang="en-US" dirty="0" smtClean="0"/>
-              <a:t>) {</a:t>
-            </a:r>
-            <a:endParaRPr lang="en-US" dirty="0"/>
+              <a:t>0) +</a:t>
+            </a:r>
           </a:p>
           <a:p>
             <a:pPr marL="0" indent="0">
@@ -12626,15 +12368,31 @@
             </a:pPr>
             <a:r>
               <a:rPr lang="en-US" dirty="0"/>
-              <a:t>  return boost::</a:t>
-            </a:r>
-            <a:r>
-              <a:rPr lang="en-US" dirty="0" err="1"/>
-              <a:t>irange</a:t>
+              <a:t>  </a:t>
+            </a:r>
+            <a:r>
+              <a:rPr lang="en-US" dirty="0" smtClean="0"/>
+              <a:t>           </a:t>
             </a:r>
             <a:r>
               <a:rPr lang="en-US" dirty="0"/>
-              <a:t>(x, limit, x);</a:t>
+              <a:t>boost::</a:t>
+            </a:r>
+            <a:r>
+              <a:rPr lang="en-US" dirty="0" smtClean="0"/>
+              <a:t>accumulate(</a:t>
+            </a:r>
+            <a:r>
+              <a:rPr lang="en-US" dirty="0" err="1" smtClean="0"/>
+              <a:t>MultiplesOf</a:t>
+            </a:r>
+            <a:r>
+              <a:rPr lang="en-US" dirty="0" smtClean="0"/>
+              <a:t>(5), </a:t>
+            </a:r>
+            <a:r>
+              <a:rPr lang="en-US" dirty="0"/>
+              <a:t>0) -</a:t>
             </a:r>
           </a:p>
           <a:p>
@@ -12642,44 +12400,49 @@
               <a:buNone/>
             </a:pPr>
             <a:r>
+              <a:rPr lang="en-US" dirty="0"/>
+              <a:t>      </a:t>
+            </a:r>
+            <a:r>
+              <a:rPr lang="en-US" dirty="0" smtClean="0"/>
+              <a:t>       </a:t>
+            </a:r>
+            <a:r>
+              <a:rPr lang="en-US" dirty="0"/>
+              <a:t>boost::</a:t>
+            </a:r>
+            <a:r>
+              <a:rPr lang="en-US" dirty="0" smtClean="0"/>
+              <a:t>accumulate(</a:t>
+            </a:r>
+            <a:r>
+              <a:rPr lang="en-US" dirty="0" err="1" smtClean="0"/>
+              <a:t>MultiplesOf</a:t>
+            </a:r>
+            <a:r>
+              <a:rPr lang="en-US" dirty="0" smtClean="0"/>
+              <a:t>(3 </a:t>
+            </a:r>
+            <a:r>
+              <a:rPr lang="en-US" dirty="0"/>
+              <a:t>* </a:t>
+            </a:r>
+            <a:r>
+              <a:rPr lang="en-US" dirty="0" smtClean="0"/>
+              <a:t>5), </a:t>
+            </a:r>
+            <a:r>
+              <a:rPr lang="en-US" dirty="0"/>
+              <a:t>0);</a:t>
+            </a:r>
+          </a:p>
+          <a:p>
+            <a:pPr marL="0" indent="0">
+              <a:buNone/>
+            </a:pPr>
+            <a:r>
               <a:rPr lang="en-US" dirty="0" smtClean="0"/>
               <a:t>}</a:t>
-            </a:r>
-          </a:p>
-          <a:p>
-            <a:r>
-              <a:rPr lang="en-US" dirty="0" smtClean="0"/>
-              <a:t>boost::</a:t>
-            </a:r>
-            <a:r>
-              <a:rPr lang="en-US" dirty="0" err="1" smtClean="0"/>
-              <a:t>irange</a:t>
-            </a:r>
-            <a:r>
-              <a:rPr lang="en-US" dirty="0" smtClean="0"/>
-              <a:t> allows us to specify a step size, but </a:t>
-            </a:r>
-            <a:r>
-              <a:rPr lang="en-US" dirty="0" err="1" smtClean="0"/>
-              <a:t>Enumerable.Range</a:t>
-            </a:r>
-            <a:r>
-              <a:rPr lang="en-US" dirty="0" smtClean="0"/>
-              <a:t> did not</a:t>
-            </a:r>
-          </a:p>
-          <a:p>
-            <a:r>
-              <a:rPr lang="en-US" dirty="0" smtClean="0"/>
-              <a:t>There is a bug in boost::</a:t>
-            </a:r>
-            <a:r>
-              <a:rPr lang="en-US" dirty="0" err="1" smtClean="0"/>
-              <a:t>irange</a:t>
-            </a:r>
-            <a:r>
-              <a:rPr lang="en-US" dirty="0" smtClean="0"/>
-              <a:t> version 1.50 that’s fixed in some later version</a:t>
             </a:r>
             <a:endParaRPr lang="en-US" dirty="0"/>
           </a:p>
@@ -12714,7 +12477,7 @@
     </p:spTree>
     <p:extLst>
       <p:ext uri="{BB962C8B-B14F-4D97-AF65-F5344CB8AC3E}">
-        <p14:creationId xmlns:p14="http://schemas.microsoft.com/office/powerpoint/2010/main" val="3377776425"/>
+        <p14:creationId xmlns:p14="http://schemas.microsoft.com/office/powerpoint/2010/main" val="104627754"/>
       </p:ext>
     </p:extLst>
   </p:cSld>
@@ -12750,250 +12513,6 @@
       </p:grpSpPr>
       <p:sp>
         <p:nvSpPr>
-          <p:cNvPr id="2" name="Title 1"/>
-          <p:cNvSpPr>
-            <a:spLocks noGrp="1"/>
-          </p:cNvSpPr>
-          <p:nvPr>
-            <p:ph type="title"/>
-          </p:nvPr>
-        </p:nvSpPr>
-        <p:spPr/>
-        <p:txBody>
-          <a:bodyPr/>
-          <a:lstStyle/>
-          <a:p>
-            <a:r>
-              <a:rPr lang="en-US" dirty="0" smtClean="0"/>
-              <a:t>Functional C++</a:t>
-            </a:r>
-            <a:endParaRPr lang="en-US" dirty="0"/>
-          </a:p>
-        </p:txBody>
-      </p:sp>
-      <p:sp>
-        <p:nvSpPr>
-          <p:cNvPr id="3" name="Content Placeholder 2"/>
-          <p:cNvSpPr>
-            <a:spLocks noGrp="1"/>
-          </p:cNvSpPr>
-          <p:nvPr>
-            <p:ph idx="1"/>
-          </p:nvPr>
-        </p:nvSpPr>
-        <p:spPr>
-          <a:xfrm>
-            <a:off x="0" y="1219200"/>
-            <a:ext cx="9144000" cy="4929188"/>
-          </a:xfrm>
-        </p:spPr>
-        <p:txBody>
-          <a:bodyPr/>
-          <a:lstStyle/>
-          <a:p>
-            <a:pPr marL="0" indent="0">
-              <a:buNone/>
-            </a:pPr>
-            <a:r>
-              <a:rPr lang="en-US" dirty="0" smtClean="0"/>
-              <a:t>static </a:t>
-            </a:r>
-            <a:r>
-              <a:rPr lang="en-US" dirty="0" err="1" smtClean="0"/>
-              <a:t>int</a:t>
-            </a:r>
-            <a:endParaRPr lang="en-US" dirty="0" smtClean="0"/>
-          </a:p>
-          <a:p>
-            <a:pPr marL="0" indent="0">
-              <a:buNone/>
-            </a:pPr>
-            <a:r>
-              <a:rPr lang="en-US" dirty="0" err="1" smtClean="0"/>
-              <a:t>GenerateMultiplesFunctional</a:t>
-            </a:r>
-            <a:r>
-              <a:rPr lang="en-US" dirty="0" smtClean="0"/>
-              <a:t>(</a:t>
-            </a:r>
-            <a:r>
-              <a:rPr lang="en-US" dirty="0" err="1" smtClean="0"/>
-              <a:t>int</a:t>
-            </a:r>
-            <a:r>
-              <a:rPr lang="en-US" dirty="0" smtClean="0"/>
-              <a:t> </a:t>
-            </a:r>
-            <a:r>
-              <a:rPr lang="en-US" dirty="0"/>
-              <a:t>limit, </a:t>
-            </a:r>
-            <a:r>
-              <a:rPr lang="en-US" dirty="0" err="1"/>
-              <a:t>int</a:t>
-            </a:r>
-            <a:r>
-              <a:rPr lang="en-US" dirty="0"/>
-              <a:t> x, </a:t>
-            </a:r>
-            <a:r>
-              <a:rPr lang="en-US" dirty="0" err="1"/>
-              <a:t>int</a:t>
-            </a:r>
-            <a:r>
-              <a:rPr lang="en-US" dirty="0"/>
-              <a:t> y</a:t>
-            </a:r>
-            <a:r>
-              <a:rPr lang="en-US" dirty="0" smtClean="0"/>
-              <a:t>) {</a:t>
-            </a:r>
-            <a:endParaRPr lang="en-US" dirty="0"/>
-          </a:p>
-          <a:p>
-            <a:pPr marL="0" indent="0">
-              <a:buNone/>
-            </a:pPr>
-            <a:r>
-              <a:rPr lang="en-US" dirty="0"/>
-              <a:t>  return boost::accumulate(</a:t>
-            </a:r>
-            <a:r>
-              <a:rPr lang="en-US" dirty="0" err="1"/>
-              <a:t>MultiplesOf</a:t>
-            </a:r>
-            <a:r>
-              <a:rPr lang="en-US" dirty="0"/>
-              <a:t>(x, limit), 0) +</a:t>
-            </a:r>
-          </a:p>
-          <a:p>
-            <a:pPr marL="0" indent="0">
-              <a:buNone/>
-            </a:pPr>
-            <a:r>
-              <a:rPr lang="en-US" dirty="0"/>
-              <a:t>  </a:t>
-            </a:r>
-            <a:r>
-              <a:rPr lang="en-US" dirty="0" smtClean="0"/>
-              <a:t>           </a:t>
-            </a:r>
-            <a:r>
-              <a:rPr lang="en-US" dirty="0"/>
-              <a:t>boost::accumulate(</a:t>
-            </a:r>
-            <a:r>
-              <a:rPr lang="en-US" dirty="0" err="1"/>
-              <a:t>MultiplesOf</a:t>
-            </a:r>
-            <a:r>
-              <a:rPr lang="en-US" dirty="0"/>
-              <a:t>(y, limit), 0) -</a:t>
-            </a:r>
-          </a:p>
-          <a:p>
-            <a:pPr marL="0" indent="0">
-              <a:buNone/>
-            </a:pPr>
-            <a:r>
-              <a:rPr lang="en-US" dirty="0"/>
-              <a:t>      </a:t>
-            </a:r>
-            <a:r>
-              <a:rPr lang="en-US" dirty="0" smtClean="0"/>
-              <a:t>       </a:t>
-            </a:r>
-            <a:r>
-              <a:rPr lang="en-US" dirty="0"/>
-              <a:t>boost::accumulate(</a:t>
-            </a:r>
-            <a:r>
-              <a:rPr lang="en-US" dirty="0" err="1"/>
-              <a:t>MultiplesOf</a:t>
-            </a:r>
-            <a:r>
-              <a:rPr lang="en-US" dirty="0"/>
-              <a:t>(x * y, limit), 0);</a:t>
-            </a:r>
-          </a:p>
-          <a:p>
-            <a:pPr marL="0" indent="0">
-              <a:buNone/>
-            </a:pPr>
-            <a:r>
-              <a:rPr lang="en-US" dirty="0" smtClean="0"/>
-              <a:t>}</a:t>
-            </a:r>
-            <a:endParaRPr lang="en-US" dirty="0"/>
-          </a:p>
-        </p:txBody>
-      </p:sp>
-      <p:sp>
-        <p:nvSpPr>
-          <p:cNvPr id="4" name="Footer Placeholder 3"/>
-          <p:cNvSpPr>
-            <a:spLocks noGrp="1"/>
-          </p:cNvSpPr>
-          <p:nvPr>
-            <p:ph type="ftr" sz="quarter" idx="11"/>
-          </p:nvPr>
-        </p:nvSpPr>
-        <p:spPr/>
-        <p:txBody>
-          <a:bodyPr/>
-          <a:lstStyle/>
-          <a:p>
-            <a:pPr>
-              <a:defRPr/>
-            </a:pPr>
-            <a:r>
-              <a:rPr lang="en-US" smtClean="0"/>
-              <a:t>Teradyne Confidential and Proprietary</a:t>
-            </a:r>
-            <a:endParaRPr lang="en-US"/>
-          </a:p>
-        </p:txBody>
-      </p:sp>
-    </p:spTree>
-    <p:extLst>
-      <p:ext uri="{BB962C8B-B14F-4D97-AF65-F5344CB8AC3E}">
-        <p14:creationId xmlns:p14="http://schemas.microsoft.com/office/powerpoint/2010/main" val="104627754"/>
-      </p:ext>
-    </p:extLst>
-  </p:cSld>
-  <p:clrMapOvr>
-    <a:masterClrMapping/>
-  </p:clrMapOvr>
-  <p:timing>
-    <p:tnLst>
-      <p:par>
-        <p:cTn id="1" dur="indefinite" restart="never" nodeType="tmRoot"/>
-      </p:par>
-    </p:tnLst>
-  </p:timing>
-</p:sld>
-</file>
-
-<file path=ppt/slides/slide23.xml><?xml version="1.0" encoding="utf-8"?>
-<p:sld xmlns:a="http://schemas.openxmlformats.org/drawingml/2006/main" xmlns:r="http://schemas.openxmlformats.org/officeDocument/2006/relationships" xmlns:p="http://schemas.openxmlformats.org/presentationml/2006/main">
-  <p:cSld>
-    <p:spTree>
-      <p:nvGrpSpPr>
-        <p:cNvPr id="1" name=""/>
-        <p:cNvGrpSpPr/>
-        <p:nvPr/>
-      </p:nvGrpSpPr>
-      <p:grpSpPr>
-        <a:xfrm>
-          <a:off x="0" y="0"/>
-          <a:ext cx="0" cy="0"/>
-          <a:chOff x="0" y="0"/>
-          <a:chExt cx="0" cy="0"/>
-        </a:xfrm>
-      </p:grpSpPr>
-      <p:sp>
-        <p:nvSpPr>
           <p:cNvPr id="6146" name="Title 1"/>
           <p:cNvSpPr>
             <a:spLocks noGrp="1"/>
@@ -13024,7 +12543,7 @@
             <p:ph idx="1"/>
             <p:extLst>
               <p:ext uri="{D42A27DB-BD31-4B8C-83A1-F6EECF244321}">
-                <p14:modId xmlns:p14="http://schemas.microsoft.com/office/powerpoint/2010/main" val="2406360519"/>
+                <p14:modId xmlns:p14="http://schemas.microsoft.com/office/powerpoint/2010/main" val="1251952064"/>
               </p:ext>
             </p:extLst>
           </p:nvPr>
@@ -13325,17 +12844,17 @@
                             <a:noFill/>
                           </a:ln>
                           <a:solidFill>
-                            <a:srgbClr val="FFC000"/>
+                            <a:srgbClr val="FFFF00"/>
                           </a:solidFill>
                         </a:rPr>
-                        <a:t>0.31</a:t>
+                        <a:t>0.33</a:t>
                       </a:r>
                       <a:endParaRPr lang="en-US" dirty="0">
                         <a:ln>
                           <a:noFill/>
                         </a:ln>
                         <a:solidFill>
-                          <a:srgbClr val="FFC000"/>
+                          <a:srgbClr val="FFFF00"/>
                         </a:solidFill>
                       </a:endParaRPr>
                     </a:p>
@@ -13392,17 +12911,17 @@
                             <a:noFill/>
                           </a:ln>
                           <a:solidFill>
-                            <a:srgbClr val="FFC000"/>
+                            <a:srgbClr val="FFFF00"/>
                           </a:solidFill>
                         </a:rPr>
-                        <a:t>0.34</a:t>
+                        <a:t>0.19</a:t>
                       </a:r>
                       <a:endParaRPr lang="en-US" dirty="0">
                         <a:ln>
                           <a:noFill/>
                         </a:ln>
                         <a:solidFill>
-                          <a:srgbClr val="FFC000"/>
+                          <a:srgbClr val="FFFF00"/>
                         </a:solidFill>
                       </a:endParaRPr>
                     </a:p>
@@ -13530,7 +13049,7 @@
                             <a:srgbClr val="FFFF00"/>
                           </a:solidFill>
                         </a:rPr>
-                        <a:t>5.0</a:t>
+                        <a:t>5.1</a:t>
                       </a:r>
                       <a:endParaRPr lang="en-US" dirty="0">
                         <a:ln>
@@ -13594,7 +13113,7 @@
                             <a:noFill/>
                           </a:ln>
                           <a:solidFill>
-                            <a:srgbClr val="FFC000"/>
+                            <a:srgbClr val="FFFF00"/>
                           </a:solidFill>
                         </a:rPr>
                         <a:t>0.28</a:t>
@@ -13604,7 +13123,7 @@
                           <a:noFill/>
                         </a:ln>
                         <a:solidFill>
-                          <a:srgbClr val="FFC000"/>
+                          <a:srgbClr val="FFFF00"/>
                         </a:solidFill>
                       </a:endParaRPr>
                     </a:p>
@@ -13732,7 +13251,7 @@
                             <a:srgbClr val="FFFF00"/>
                           </a:solidFill>
                         </a:rPr>
-                        <a:t>4.0</a:t>
+                        <a:t>4.1</a:t>
                       </a:r>
                       <a:endParaRPr lang="en-US" dirty="0">
                         <a:ln>
@@ -13799,7 +13318,7 @@
                             <a:srgbClr val="FFFF00"/>
                           </a:solidFill>
                         </a:rPr>
-                        <a:t>4.0</a:t>
+                        <a:t>1.6</a:t>
                       </a:r>
                       <a:endParaRPr lang="en-US" dirty="0">
                         <a:ln>
@@ -13934,7 +13453,7 @@
                             <a:srgbClr val="FFFF00"/>
                           </a:solidFill>
                         </a:rPr>
-                        <a:t>15.1</a:t>
+                        <a:t>14.8</a:t>
                       </a:r>
                       <a:endParaRPr lang="en-US" dirty="0">
                         <a:ln>
@@ -14001,7 +13520,7 @@
                             <a:srgbClr val="FFFF00"/>
                           </a:solidFill>
                         </a:rPr>
-                        <a:t>4.2</a:t>
+                        <a:t>1.9</a:t>
                       </a:r>
                       <a:endParaRPr lang="en-US" dirty="0">
                         <a:ln>
@@ -14212,7 +13731,7 @@
         <p:spPr>
           <a:xfrm>
             <a:off x="680224" y="3182790"/>
-            <a:ext cx="7861610" cy="3108543"/>
+            <a:ext cx="7861610" cy="1815882"/>
           </a:xfrm>
           <a:prstGeom prst="rect">
             <a:avLst/>
@@ -14249,22 +13768,13 @@
                   <a:srgbClr val="FFFF00"/>
                 </a:solidFill>
               </a:rPr>
-              <a:t>The imperative performance is comparable between C# and C++</a:t>
-            </a:r>
-          </a:p>
-          <a:p>
-            <a:pPr marL="457200" indent="-457200">
-              <a:buFont typeface="Arial" pitchFamily="34" charset="0"/>
-              <a:buChar char="•"/>
-            </a:pPr>
-            <a:r>
-              <a:rPr lang="en-US" b="0" dirty="0" smtClean="0">
-                <a:solidFill>
-                  <a:srgbClr val="FFFF00"/>
-                </a:solidFill>
-              </a:rPr>
-              <a:t>There is no performance penalty for using a functional style vs. an imperative style in C++</a:t>
-            </a:r>
+              <a:t>C++ is still significantly faster than C#</a:t>
+            </a:r>
+            <a:endParaRPr lang="en-US" b="0" dirty="0" smtClean="0">
+              <a:solidFill>
+                <a:srgbClr val="FFFF00"/>
+              </a:solidFill>
+            </a:endParaRPr>
           </a:p>
         </p:txBody>
       </p:sp>
@@ -14288,7 +13798,7 @@
 </p:sld>
 </file>
 
-<file path=ppt/slides/slide24.xml><?xml version="1.0" encoding="utf-8"?>
+<file path=ppt/slides/slide23.xml><?xml version="1.0" encoding="utf-8"?>
 <p:sld xmlns:a="http://schemas.openxmlformats.org/drawingml/2006/main" xmlns:r="http://schemas.openxmlformats.org/officeDocument/2006/relationships" xmlns:p="http://schemas.openxmlformats.org/presentationml/2006/main">
   <p:cSld>
     <p:spTree>
@@ -14636,6 +14146,346 @@
 </p:sld>
 </file>
 
+<file path=ppt/slides/slide24.xml><?xml version="1.0" encoding="utf-8"?>
+<p:sld xmlns:a="http://schemas.openxmlformats.org/drawingml/2006/main" xmlns:r="http://schemas.openxmlformats.org/officeDocument/2006/relationships" xmlns:p="http://schemas.openxmlformats.org/presentationml/2006/main">
+  <p:cSld>
+    <p:spTree>
+      <p:nvGrpSpPr>
+        <p:cNvPr id="1" name=""/>
+        <p:cNvGrpSpPr/>
+        <p:nvPr/>
+      </p:nvGrpSpPr>
+      <p:grpSpPr>
+        <a:xfrm>
+          <a:off x="0" y="0"/>
+          <a:ext cx="0" cy="0"/>
+          <a:chOff x="0" y="0"/>
+          <a:chExt cx="0" cy="0"/>
+        </a:xfrm>
+      </p:grpSpPr>
+      <p:sp>
+        <p:nvSpPr>
+          <p:cNvPr id="6146" name="Title 1"/>
+          <p:cNvSpPr>
+            <a:spLocks noGrp="1"/>
+          </p:cNvSpPr>
+          <p:nvPr>
+            <p:ph type="title"/>
+          </p:nvPr>
+        </p:nvSpPr>
+        <p:spPr/>
+        <p:txBody>
+          <a:bodyPr/>
+          <a:lstStyle/>
+          <a:p>
+            <a:r>
+              <a:rPr lang="en-US" dirty="0" smtClean="0"/>
+              <a:t>Triangular Numbers to the Rescue</a:t>
+            </a:r>
+          </a:p>
+        </p:txBody>
+      </p:sp>
+      <p:sp>
+        <p:nvSpPr>
+          <p:cNvPr id="6148" name="Footer Placeholder 3"/>
+          <p:cNvSpPr>
+            <a:spLocks noGrp="1"/>
+          </p:cNvSpPr>
+          <p:nvPr>
+            <p:ph type="ftr" sz="quarter" idx="11"/>
+          </p:nvPr>
+        </p:nvSpPr>
+        <p:spPr>
+          <a:noFill/>
+          <a:ln/>
+          <a:extLst>
+            <a:ext uri="{909E8E84-426E-40DD-AFC4-6F175D3DCCD1}">
+              <a14:hiddenFill xmlns:a14="http://schemas.microsoft.com/office/drawing/2010/main">
+                <a:solidFill>
+                  <a:srgbClr val="FFFFFF"/>
+                </a:solidFill>
+              </a14:hiddenFill>
+            </a:ext>
+            <a:ext uri="{91240B29-F687-4F45-9708-019B960494DF}">
+              <a14:hiddenLine xmlns:a14="http://schemas.microsoft.com/office/drawing/2010/main" w="9525">
+                <a:solidFill>
+                  <a:srgbClr val="000000"/>
+                </a:solidFill>
+                <a:miter lim="800000"/>
+                <a:headEnd/>
+                <a:tailEnd/>
+              </a14:hiddenLine>
+            </a:ext>
+          </a:extLst>
+        </p:spPr>
+        <p:txBody>
+          <a:bodyPr/>
+          <a:lstStyle>
+            <a:lvl1pPr eaLnBrk="0" hangingPunct="0">
+              <a:defRPr sz="2800" b="1">
+                <a:solidFill>
+                  <a:schemeClr val="tx1"/>
+                </a:solidFill>
+                <a:latin typeface="Arial" charset="0"/>
+              </a:defRPr>
+            </a:lvl1pPr>
+            <a:lvl2pPr marL="742950" indent="-285750" eaLnBrk="0" hangingPunct="0">
+              <a:defRPr sz="2800" b="1">
+                <a:solidFill>
+                  <a:schemeClr val="tx1"/>
+                </a:solidFill>
+                <a:latin typeface="Arial" charset="0"/>
+              </a:defRPr>
+            </a:lvl2pPr>
+            <a:lvl3pPr marL="1143000" indent="-228600" eaLnBrk="0" hangingPunct="0">
+              <a:defRPr sz="2800" b="1">
+                <a:solidFill>
+                  <a:schemeClr val="tx1"/>
+                </a:solidFill>
+                <a:latin typeface="Arial" charset="0"/>
+              </a:defRPr>
+            </a:lvl3pPr>
+            <a:lvl4pPr marL="1600200" indent="-228600" eaLnBrk="0" hangingPunct="0">
+              <a:defRPr sz="2800" b="1">
+                <a:solidFill>
+                  <a:schemeClr val="tx1"/>
+                </a:solidFill>
+                <a:latin typeface="Arial" charset="0"/>
+              </a:defRPr>
+            </a:lvl4pPr>
+            <a:lvl5pPr marL="2057400" indent="-228600" eaLnBrk="0" hangingPunct="0">
+              <a:defRPr sz="2800" b="1">
+                <a:solidFill>
+                  <a:schemeClr val="tx1"/>
+                </a:solidFill>
+                <a:latin typeface="Arial" charset="0"/>
+              </a:defRPr>
+            </a:lvl5pPr>
+            <a:lvl6pPr marL="2514600" indent="-228600" eaLnBrk="0" fontAlgn="base" hangingPunct="0">
+              <a:spcBef>
+                <a:spcPct val="0"/>
+              </a:spcBef>
+              <a:spcAft>
+                <a:spcPct val="0"/>
+              </a:spcAft>
+              <a:defRPr sz="2800" b="1">
+                <a:solidFill>
+                  <a:schemeClr val="tx1"/>
+                </a:solidFill>
+                <a:latin typeface="Arial" charset="0"/>
+              </a:defRPr>
+            </a:lvl6pPr>
+            <a:lvl7pPr marL="2971800" indent="-228600" eaLnBrk="0" fontAlgn="base" hangingPunct="0">
+              <a:spcBef>
+                <a:spcPct val="0"/>
+              </a:spcBef>
+              <a:spcAft>
+                <a:spcPct val="0"/>
+              </a:spcAft>
+              <a:defRPr sz="2800" b="1">
+                <a:solidFill>
+                  <a:schemeClr val="tx1"/>
+                </a:solidFill>
+                <a:latin typeface="Arial" charset="0"/>
+              </a:defRPr>
+            </a:lvl7pPr>
+            <a:lvl8pPr marL="3429000" indent="-228600" eaLnBrk="0" fontAlgn="base" hangingPunct="0">
+              <a:spcBef>
+                <a:spcPct val="0"/>
+              </a:spcBef>
+              <a:spcAft>
+                <a:spcPct val="0"/>
+              </a:spcAft>
+              <a:defRPr sz="2800" b="1">
+                <a:solidFill>
+                  <a:schemeClr val="tx1"/>
+                </a:solidFill>
+                <a:latin typeface="Arial" charset="0"/>
+              </a:defRPr>
+            </a:lvl8pPr>
+            <a:lvl9pPr marL="3886200" indent="-228600" eaLnBrk="0" fontAlgn="base" hangingPunct="0">
+              <a:spcBef>
+                <a:spcPct val="0"/>
+              </a:spcBef>
+              <a:spcAft>
+                <a:spcPct val="0"/>
+              </a:spcAft>
+              <a:defRPr sz="2800" b="1">
+                <a:solidFill>
+                  <a:schemeClr val="tx1"/>
+                </a:solidFill>
+                <a:latin typeface="Arial" charset="0"/>
+              </a:defRPr>
+            </a:lvl9pPr>
+          </a:lstStyle>
+          <a:p>
+            <a:r>
+              <a:rPr lang="en-US" sz="1400" b="0" smtClean="0">
+                <a:solidFill>
+                  <a:srgbClr val="FFFFFF"/>
+                </a:solidFill>
+              </a:rPr>
+              <a:t>Teradyne Confidential and Proprietary</a:t>
+            </a:r>
+          </a:p>
+        </p:txBody>
+      </p:sp>
+      <p:sp>
+        <p:nvSpPr>
+          <p:cNvPr id="4" name="Content Placeholder 3"/>
+          <p:cNvSpPr>
+            <a:spLocks noGrp="1"/>
+          </p:cNvSpPr>
+          <p:nvPr>
+            <p:ph idx="1"/>
+          </p:nvPr>
+        </p:nvSpPr>
+        <p:spPr>
+          <a:xfrm>
+            <a:off x="0" y="1219200"/>
+            <a:ext cx="9144000" cy="4929188"/>
+          </a:xfrm>
+        </p:spPr>
+        <p:txBody>
+          <a:bodyPr/>
+          <a:lstStyle/>
+          <a:p>
+            <a:pPr marL="0" indent="0">
+              <a:buNone/>
+            </a:pPr>
+            <a:r>
+              <a:rPr lang="en-US" dirty="0" smtClean="0"/>
+              <a:t>// Compute the sum of [x, </a:t>
+            </a:r>
+            <a:r>
+              <a:rPr lang="en-US" dirty="0" smtClean="0"/>
+              <a:t>1000) </a:t>
+            </a:r>
+            <a:r>
+              <a:rPr lang="en-US" dirty="0" smtClean="0"/>
+              <a:t>step x using </a:t>
+            </a:r>
+          </a:p>
+          <a:p>
+            <a:pPr marL="0" indent="0">
+              <a:buNone/>
+            </a:pPr>
+            <a:r>
+              <a:rPr lang="en-US" dirty="0" smtClean="0"/>
+              <a:t>// triangular numbers</a:t>
+            </a:r>
+          </a:p>
+          <a:p>
+            <a:pPr marL="0" indent="0">
+              <a:buNone/>
+            </a:pPr>
+            <a:r>
+              <a:rPr lang="en-US" dirty="0" smtClean="0"/>
+              <a:t>public static </a:t>
+            </a:r>
+            <a:r>
+              <a:rPr lang="en-US" dirty="0" err="1" smtClean="0"/>
+              <a:t>int</a:t>
+            </a:r>
+            <a:r>
+              <a:rPr lang="en-US" dirty="0" smtClean="0"/>
+              <a:t> </a:t>
+            </a:r>
+            <a:r>
+              <a:rPr lang="en-US" dirty="0" err="1" smtClean="0"/>
+              <a:t>sumOfMultiplesOf</a:t>
+            </a:r>
+            <a:r>
+              <a:rPr lang="en-US" dirty="0" smtClean="0"/>
+              <a:t>(</a:t>
+            </a:r>
+            <a:r>
+              <a:rPr lang="en-US" dirty="0" err="1" smtClean="0"/>
+              <a:t>int</a:t>
+            </a:r>
+            <a:r>
+              <a:rPr lang="en-US" dirty="0" smtClean="0"/>
+              <a:t> </a:t>
+            </a:r>
+            <a:r>
+              <a:rPr lang="en-US" dirty="0" smtClean="0"/>
+              <a:t>x) </a:t>
+            </a:r>
+            <a:r>
+              <a:rPr lang="en-US" dirty="0" smtClean="0"/>
+              <a:t>{</a:t>
+            </a:r>
+          </a:p>
+          <a:p>
+            <a:pPr marL="0" indent="0">
+              <a:buNone/>
+            </a:pPr>
+            <a:r>
+              <a:rPr lang="en-US" dirty="0"/>
+              <a:t> </a:t>
+            </a:r>
+            <a:r>
+              <a:rPr lang="en-US" dirty="0" smtClean="0"/>
+              <a:t> </a:t>
+            </a:r>
+            <a:r>
+              <a:rPr lang="en-US" dirty="0" err="1" smtClean="0"/>
+              <a:t>var</a:t>
+            </a:r>
+            <a:r>
+              <a:rPr lang="en-US" dirty="0" smtClean="0"/>
+              <a:t> p = </a:t>
+            </a:r>
+            <a:r>
+              <a:rPr lang="en-US" dirty="0" smtClean="0"/>
+              <a:t>(1000 </a:t>
+            </a:r>
+            <a:r>
+              <a:rPr lang="en-US" dirty="0" smtClean="0"/>
+              <a:t>- 1) / x;</a:t>
+            </a:r>
+          </a:p>
+          <a:p>
+            <a:pPr marL="0" indent="0">
+              <a:buNone/>
+            </a:pPr>
+            <a:r>
+              <a:rPr lang="en-US" dirty="0" smtClean="0"/>
+              <a:t>  return x * p * (p + 1) / 2;</a:t>
+            </a:r>
+          </a:p>
+          <a:p>
+            <a:pPr marL="0" indent="0">
+              <a:buNone/>
+            </a:pPr>
+            <a:r>
+              <a:rPr lang="en-US" dirty="0" smtClean="0"/>
+              <a:t>}</a:t>
+            </a:r>
+            <a:endParaRPr lang="en-US" dirty="0"/>
+          </a:p>
+        </p:txBody>
+      </p:sp>
+    </p:spTree>
+    <p:extLst>
+      <p:ext uri="{BB962C8B-B14F-4D97-AF65-F5344CB8AC3E}">
+        <p14:creationId xmlns:p14="http://schemas.microsoft.com/office/powerpoint/2010/main" val="1493186292"/>
+      </p:ext>
+    </p:extLst>
+  </p:cSld>
+  <p:clrMapOvr>
+    <a:masterClrMapping/>
+  </p:clrMapOvr>
+  <p:timing>
+    <p:tnLst>
+      <p:par>
+        <p:cTn id="1" dur="indefinite" restart="never" nodeType="tmRoot"/>
+      </p:par>
+    </p:tnLst>
+  </p:timing>
+</p:sld>
+</file>
+
 <file path=ppt/slides/slide25.xml><?xml version="1.0" encoding="utf-8"?>
 <p:sld xmlns:a="http://schemas.openxmlformats.org/drawingml/2006/main" xmlns:r="http://schemas.openxmlformats.org/officeDocument/2006/relationships" xmlns:p="http://schemas.openxmlformats.org/presentationml/2006/main">
   <p:cSld>
@@ -14845,8 +14695,29 @@
             </a:pPr>
             <a:r>
               <a:rPr lang="en-US" dirty="0" smtClean="0"/>
-              <a:t>// Compute the sum of [x, limit) step x using </a:t>
-            </a:r>
+              <a:t>static </a:t>
+            </a:r>
+            <a:r>
+              <a:rPr lang="en-US" dirty="0" err="1"/>
+              <a:t>int</a:t>
+            </a:r>
+            <a:r>
+              <a:rPr lang="en-US" dirty="0"/>
+              <a:t> </a:t>
+            </a:r>
+            <a:r>
+              <a:rPr lang="en-US" dirty="0" err="1"/>
+              <a:t>sumOfMultiples</a:t>
+            </a:r>
+            <a:r>
+              <a:rPr lang="en-US" dirty="0" smtClean="0"/>
+              <a:t>() </a:t>
+            </a:r>
+            <a:r>
+              <a:rPr lang="en-US" dirty="0" smtClean="0"/>
+              <a:t>{</a:t>
+            </a:r>
+            <a:endParaRPr lang="en-US" dirty="0"/>
           </a:p>
           <a:p>
             <a:pPr marL="0" indent="0">
@@ -14854,7 +14725,19 @@
             </a:pPr>
             <a:r>
               <a:rPr lang="en-US" dirty="0" smtClean="0"/>
-              <a:t>// triangular numbers</a:t>
+              <a:t>  return </a:t>
+            </a:r>
+            <a:r>
+              <a:rPr lang="en-US" dirty="0" err="1" smtClean="0"/>
+              <a:t>sumOfMultiplesOf</a:t>
+            </a:r>
+            <a:r>
+              <a:rPr lang="en-US" dirty="0" smtClean="0"/>
+              <a:t>(3) </a:t>
+            </a:r>
+            <a:r>
+              <a:rPr lang="en-US" dirty="0" smtClean="0"/>
+              <a:t>+</a:t>
             </a:r>
           </a:p>
           <a:p>
@@ -14862,16 +14745,12 @@
               <a:buNone/>
             </a:pPr>
             <a:r>
+              <a:rPr lang="en-US" dirty="0"/>
+              <a:t> </a:t>
+            </a:r>
+            <a:r>
               <a:rPr lang="en-US" dirty="0" smtClean="0"/>
-              <a:t>public static </a:t>
-            </a:r>
-            <a:r>
-              <a:rPr lang="en-US" dirty="0" err="1" smtClean="0"/>
-              <a:t>int</a:t>
-            </a:r>
-            <a:r>
-              <a:rPr lang="en-US" dirty="0" smtClean="0"/>
-              <a:t> </a:t>
+              <a:t>           </a:t>
             </a:r>
             <a:r>
               <a:rPr lang="en-US" dirty="0" err="1" smtClean="0"/>
@@ -14879,23 +14758,11 @@
             </a:r>
             <a:r>
               <a:rPr lang="en-US" dirty="0" smtClean="0"/>
-              <a:t>(</a:t>
-            </a:r>
-            <a:r>
-              <a:rPr lang="en-US" dirty="0" err="1" smtClean="0"/>
-              <a:t>int</a:t>
+              <a:t>(5) </a:t>
             </a:r>
             <a:r>
               <a:rPr lang="en-US" dirty="0" smtClean="0"/>
-              <a:t> x, </a:t>
-            </a:r>
-            <a:r>
-              <a:rPr lang="en-US" dirty="0" err="1" smtClean="0"/>
-              <a:t>int</a:t>
-            </a:r>
-            <a:r>
-              <a:rPr lang="en-US" dirty="0" smtClean="0"/>
-              <a:t> limit) {</a:t>
+              <a:t>–</a:t>
             </a:r>
           </a:p>
           <a:p>
@@ -14908,16 +14775,25 @@
             </a:r>
             <a:r>
               <a:rPr lang="en-US" dirty="0" smtClean="0"/>
-              <a:t> </a:t>
+              <a:t>           </a:t>
             </a:r>
             <a:r>
               <a:rPr lang="en-US" dirty="0" err="1" smtClean="0"/>
-              <a:t>var</a:t>
+              <a:t>sumOfMultiplesOf</a:t>
             </a:r>
             <a:r>
               <a:rPr lang="en-US" dirty="0" smtClean="0"/>
-              <a:t> p = (limit - 1) / x;</a:t>
-            </a:r>
+              <a:t>(3 </a:t>
+            </a:r>
+            <a:r>
+              <a:rPr lang="en-US" dirty="0"/>
+              <a:t>* </a:t>
+            </a:r>
+            <a:r>
+              <a:rPr lang="en-US" dirty="0" smtClean="0"/>
+              <a:t>5);</a:t>
+            </a:r>
+            <a:endParaRPr lang="en-US" dirty="0"/>
           </a:p>
           <a:p>
             <a:pPr marL="0" indent="0">
@@ -14925,15 +14801,6 @@
             </a:pPr>
             <a:r>
               <a:rPr lang="en-US" dirty="0" smtClean="0"/>
-              <a:t>  return x * p * (p + 1) / 2;</a:t>
-            </a:r>
-          </a:p>
-          <a:p>
-            <a:pPr marL="0" indent="0">
-              <a:buNone/>
-            </a:pPr>
-            <a:r>
-              <a:rPr lang="en-US" dirty="0" smtClean="0"/>
               <a:t>}</a:t>
             </a:r>
             <a:endParaRPr lang="en-US" dirty="0"/>
@@ -14943,7 +14810,7 @@
     </p:spTree>
     <p:extLst>
       <p:ext uri="{BB962C8B-B14F-4D97-AF65-F5344CB8AC3E}">
-        <p14:creationId xmlns:p14="http://schemas.microsoft.com/office/powerpoint/2010/main" val="1493186292"/>
+        <p14:creationId xmlns:p14="http://schemas.microsoft.com/office/powerpoint/2010/main" val="3477282544"/>
       </p:ext>
     </p:extLst>
   </p:cSld>
@@ -14994,366 +14861,6 @@
           <a:p>
             <a:r>
               <a:rPr lang="en-US" dirty="0" smtClean="0"/>
-              <a:t>Triangular Numbers to the Rescue</a:t>
-            </a:r>
-          </a:p>
-        </p:txBody>
-      </p:sp>
-      <p:sp>
-        <p:nvSpPr>
-          <p:cNvPr id="6148" name="Footer Placeholder 3"/>
-          <p:cNvSpPr>
-            <a:spLocks noGrp="1"/>
-          </p:cNvSpPr>
-          <p:nvPr>
-            <p:ph type="ftr" sz="quarter" idx="11"/>
-          </p:nvPr>
-        </p:nvSpPr>
-        <p:spPr>
-          <a:noFill/>
-          <a:ln/>
-          <a:extLst>
-            <a:ext uri="{909E8E84-426E-40DD-AFC4-6F175D3DCCD1}">
-              <a14:hiddenFill xmlns:a14="http://schemas.microsoft.com/office/drawing/2010/main">
-                <a:solidFill>
-                  <a:srgbClr val="FFFFFF"/>
-                </a:solidFill>
-              </a14:hiddenFill>
-            </a:ext>
-            <a:ext uri="{91240B29-F687-4F45-9708-019B960494DF}">
-              <a14:hiddenLine xmlns:a14="http://schemas.microsoft.com/office/drawing/2010/main" w="9525">
-                <a:solidFill>
-                  <a:srgbClr val="000000"/>
-                </a:solidFill>
-                <a:miter lim="800000"/>
-                <a:headEnd/>
-                <a:tailEnd/>
-              </a14:hiddenLine>
-            </a:ext>
-          </a:extLst>
-        </p:spPr>
-        <p:txBody>
-          <a:bodyPr/>
-          <a:lstStyle>
-            <a:lvl1pPr eaLnBrk="0" hangingPunct="0">
-              <a:defRPr sz="2800" b="1">
-                <a:solidFill>
-                  <a:schemeClr val="tx1"/>
-                </a:solidFill>
-                <a:latin typeface="Arial" charset="0"/>
-              </a:defRPr>
-            </a:lvl1pPr>
-            <a:lvl2pPr marL="742950" indent="-285750" eaLnBrk="0" hangingPunct="0">
-              <a:defRPr sz="2800" b="1">
-                <a:solidFill>
-                  <a:schemeClr val="tx1"/>
-                </a:solidFill>
-                <a:latin typeface="Arial" charset="0"/>
-              </a:defRPr>
-            </a:lvl2pPr>
-            <a:lvl3pPr marL="1143000" indent="-228600" eaLnBrk="0" hangingPunct="0">
-              <a:defRPr sz="2800" b="1">
-                <a:solidFill>
-                  <a:schemeClr val="tx1"/>
-                </a:solidFill>
-                <a:latin typeface="Arial" charset="0"/>
-              </a:defRPr>
-            </a:lvl3pPr>
-            <a:lvl4pPr marL="1600200" indent="-228600" eaLnBrk="0" hangingPunct="0">
-              <a:defRPr sz="2800" b="1">
-                <a:solidFill>
-                  <a:schemeClr val="tx1"/>
-                </a:solidFill>
-                <a:latin typeface="Arial" charset="0"/>
-              </a:defRPr>
-            </a:lvl4pPr>
-            <a:lvl5pPr marL="2057400" indent="-228600" eaLnBrk="0" hangingPunct="0">
-              <a:defRPr sz="2800" b="1">
-                <a:solidFill>
-                  <a:schemeClr val="tx1"/>
-                </a:solidFill>
-                <a:latin typeface="Arial" charset="0"/>
-              </a:defRPr>
-            </a:lvl5pPr>
-            <a:lvl6pPr marL="2514600" indent="-228600" eaLnBrk="0" fontAlgn="base" hangingPunct="0">
-              <a:spcBef>
-                <a:spcPct val="0"/>
-              </a:spcBef>
-              <a:spcAft>
-                <a:spcPct val="0"/>
-              </a:spcAft>
-              <a:defRPr sz="2800" b="1">
-                <a:solidFill>
-                  <a:schemeClr val="tx1"/>
-                </a:solidFill>
-                <a:latin typeface="Arial" charset="0"/>
-              </a:defRPr>
-            </a:lvl6pPr>
-            <a:lvl7pPr marL="2971800" indent="-228600" eaLnBrk="0" fontAlgn="base" hangingPunct="0">
-              <a:spcBef>
-                <a:spcPct val="0"/>
-              </a:spcBef>
-              <a:spcAft>
-                <a:spcPct val="0"/>
-              </a:spcAft>
-              <a:defRPr sz="2800" b="1">
-                <a:solidFill>
-                  <a:schemeClr val="tx1"/>
-                </a:solidFill>
-                <a:latin typeface="Arial" charset="0"/>
-              </a:defRPr>
-            </a:lvl7pPr>
-            <a:lvl8pPr marL="3429000" indent="-228600" eaLnBrk="0" fontAlgn="base" hangingPunct="0">
-              <a:spcBef>
-                <a:spcPct val="0"/>
-              </a:spcBef>
-              <a:spcAft>
-                <a:spcPct val="0"/>
-              </a:spcAft>
-              <a:defRPr sz="2800" b="1">
-                <a:solidFill>
-                  <a:schemeClr val="tx1"/>
-                </a:solidFill>
-                <a:latin typeface="Arial" charset="0"/>
-              </a:defRPr>
-            </a:lvl8pPr>
-            <a:lvl9pPr marL="3886200" indent="-228600" eaLnBrk="0" fontAlgn="base" hangingPunct="0">
-              <a:spcBef>
-                <a:spcPct val="0"/>
-              </a:spcBef>
-              <a:spcAft>
-                <a:spcPct val="0"/>
-              </a:spcAft>
-              <a:defRPr sz="2800" b="1">
-                <a:solidFill>
-                  <a:schemeClr val="tx1"/>
-                </a:solidFill>
-                <a:latin typeface="Arial" charset="0"/>
-              </a:defRPr>
-            </a:lvl9pPr>
-          </a:lstStyle>
-          <a:p>
-            <a:r>
-              <a:rPr lang="en-US" sz="1400" b="0" smtClean="0">
-                <a:solidFill>
-                  <a:srgbClr val="FFFFFF"/>
-                </a:solidFill>
-              </a:rPr>
-              <a:t>Teradyne Confidential and Proprietary</a:t>
-            </a:r>
-          </a:p>
-        </p:txBody>
-      </p:sp>
-      <p:sp>
-        <p:nvSpPr>
-          <p:cNvPr id="4" name="Content Placeholder 3"/>
-          <p:cNvSpPr>
-            <a:spLocks noGrp="1"/>
-          </p:cNvSpPr>
-          <p:nvPr>
-            <p:ph idx="1"/>
-          </p:nvPr>
-        </p:nvSpPr>
-        <p:spPr>
-          <a:xfrm>
-            <a:off x="0" y="1219200"/>
-            <a:ext cx="9144000" cy="4929188"/>
-          </a:xfrm>
-        </p:spPr>
-        <p:txBody>
-          <a:bodyPr/>
-          <a:lstStyle/>
-          <a:p>
-            <a:pPr marL="0" indent="0">
-              <a:buNone/>
-            </a:pPr>
-            <a:r>
-              <a:rPr lang="en-US" dirty="0" smtClean="0"/>
-              <a:t>static </a:t>
-            </a:r>
-            <a:r>
-              <a:rPr lang="en-US" dirty="0" err="1"/>
-              <a:t>int</a:t>
-            </a:r>
-            <a:r>
-              <a:rPr lang="en-US" dirty="0"/>
-              <a:t> </a:t>
-            </a:r>
-            <a:r>
-              <a:rPr lang="en-US" dirty="0" err="1"/>
-              <a:t>sumOfMultiples</a:t>
-            </a:r>
-            <a:r>
-              <a:rPr lang="en-US" dirty="0"/>
-              <a:t>(</a:t>
-            </a:r>
-            <a:r>
-              <a:rPr lang="en-US" dirty="0" err="1"/>
-              <a:t>int</a:t>
-            </a:r>
-            <a:r>
-              <a:rPr lang="en-US" dirty="0"/>
-              <a:t> limit, </a:t>
-            </a:r>
-            <a:r>
-              <a:rPr lang="en-US" dirty="0" err="1"/>
-              <a:t>int</a:t>
-            </a:r>
-            <a:r>
-              <a:rPr lang="en-US" dirty="0"/>
-              <a:t> x, </a:t>
-            </a:r>
-            <a:r>
-              <a:rPr lang="en-US" dirty="0" err="1"/>
-              <a:t>int</a:t>
-            </a:r>
-            <a:r>
-              <a:rPr lang="en-US" dirty="0"/>
-              <a:t> y</a:t>
-            </a:r>
-            <a:r>
-              <a:rPr lang="en-US" dirty="0" smtClean="0"/>
-              <a:t>) {</a:t>
-            </a:r>
-            <a:endParaRPr lang="en-US" dirty="0"/>
-          </a:p>
-          <a:p>
-            <a:pPr marL="0" indent="0">
-              <a:buNone/>
-            </a:pPr>
-            <a:r>
-              <a:rPr lang="en-US" dirty="0" smtClean="0"/>
-              <a:t>  return </a:t>
-            </a:r>
-            <a:r>
-              <a:rPr lang="en-US" dirty="0" err="1"/>
-              <a:t>sumOfMultiplesOf</a:t>
-            </a:r>
-            <a:r>
-              <a:rPr lang="en-US" dirty="0"/>
-              <a:t>(x, limit) </a:t>
-            </a:r>
-            <a:r>
-              <a:rPr lang="en-US" dirty="0" smtClean="0"/>
-              <a:t>+</a:t>
-            </a:r>
-          </a:p>
-          <a:p>
-            <a:pPr marL="0" indent="0">
-              <a:buNone/>
-            </a:pPr>
-            <a:r>
-              <a:rPr lang="en-US" dirty="0"/>
-              <a:t> </a:t>
-            </a:r>
-            <a:r>
-              <a:rPr lang="en-US" dirty="0" smtClean="0"/>
-              <a:t>           </a:t>
-            </a:r>
-            <a:r>
-              <a:rPr lang="en-US" dirty="0" err="1" smtClean="0"/>
-              <a:t>sumOfMultiplesOf</a:t>
-            </a:r>
-            <a:r>
-              <a:rPr lang="en-US" dirty="0" smtClean="0"/>
-              <a:t>(y</a:t>
-            </a:r>
-            <a:r>
-              <a:rPr lang="en-US" dirty="0"/>
-              <a:t>, limit) </a:t>
-            </a:r>
-            <a:r>
-              <a:rPr lang="en-US" dirty="0" smtClean="0"/>
-              <a:t>–</a:t>
-            </a:r>
-          </a:p>
-          <a:p>
-            <a:pPr marL="0" indent="0">
-              <a:buNone/>
-            </a:pPr>
-            <a:r>
-              <a:rPr lang="en-US" dirty="0"/>
-              <a:t> </a:t>
-            </a:r>
-            <a:r>
-              <a:rPr lang="en-US" dirty="0" smtClean="0"/>
-              <a:t>           </a:t>
-            </a:r>
-            <a:r>
-              <a:rPr lang="en-US" dirty="0" err="1"/>
-              <a:t>sumOfMultiplesOf</a:t>
-            </a:r>
-            <a:r>
-              <a:rPr lang="en-US" dirty="0"/>
-              <a:t>(x * y, limit);</a:t>
-            </a:r>
-          </a:p>
-          <a:p>
-            <a:pPr marL="0" indent="0">
-              <a:buNone/>
-            </a:pPr>
-            <a:r>
-              <a:rPr lang="en-US" dirty="0" smtClean="0"/>
-              <a:t>}</a:t>
-            </a:r>
-            <a:endParaRPr lang="en-US" dirty="0"/>
-          </a:p>
-        </p:txBody>
-      </p:sp>
-    </p:spTree>
-    <p:extLst>
-      <p:ext uri="{BB962C8B-B14F-4D97-AF65-F5344CB8AC3E}">
-        <p14:creationId xmlns:p14="http://schemas.microsoft.com/office/powerpoint/2010/main" val="3477282544"/>
-      </p:ext>
-    </p:extLst>
-  </p:cSld>
-  <p:clrMapOvr>
-    <a:masterClrMapping/>
-  </p:clrMapOvr>
-  <p:timing>
-    <p:tnLst>
-      <p:par>
-        <p:cTn id="1" dur="indefinite" restart="never" nodeType="tmRoot"/>
-      </p:par>
-    </p:tnLst>
-  </p:timing>
-</p:sld>
-</file>
-
-<file path=ppt/slides/slide27.xml><?xml version="1.0" encoding="utf-8"?>
-<p:sld xmlns:a="http://schemas.openxmlformats.org/drawingml/2006/main" xmlns:r="http://schemas.openxmlformats.org/officeDocument/2006/relationships" xmlns:p="http://schemas.openxmlformats.org/presentationml/2006/main">
-  <p:cSld>
-    <p:spTree>
-      <p:nvGrpSpPr>
-        <p:cNvPr id="1" name=""/>
-        <p:cNvGrpSpPr/>
-        <p:nvPr/>
-      </p:nvGrpSpPr>
-      <p:grpSpPr>
-        <a:xfrm>
-          <a:off x="0" y="0"/>
-          <a:ext cx="0" cy="0"/>
-          <a:chOff x="0" y="0"/>
-          <a:chExt cx="0" cy="0"/>
-        </a:xfrm>
-      </p:grpSpPr>
-      <p:sp>
-        <p:nvSpPr>
-          <p:cNvPr id="6146" name="Title 1"/>
-          <p:cNvSpPr>
-            <a:spLocks noGrp="1"/>
-          </p:cNvSpPr>
-          <p:nvPr>
-            <p:ph type="title"/>
-          </p:nvPr>
-        </p:nvSpPr>
-        <p:spPr/>
-        <p:txBody>
-          <a:bodyPr/>
-          <a:lstStyle/>
-          <a:p>
-            <a:r>
-              <a:rPr lang="en-US" dirty="0" smtClean="0"/>
               <a:t>Performance Comparison</a:t>
             </a:r>
           </a:p>
@@ -15369,7 +14876,7 @@
             <p:ph idx="1"/>
             <p:extLst>
               <p:ext uri="{D42A27DB-BD31-4B8C-83A1-F6EECF244321}">
-                <p14:modId xmlns:p14="http://schemas.microsoft.com/office/powerpoint/2010/main" val="3509779787"/>
+                <p14:modId xmlns:p14="http://schemas.microsoft.com/office/powerpoint/2010/main" val="633648291"/>
               </p:ext>
             </p:extLst>
           </p:nvPr>
@@ -15673,7 +15180,7 @@
                             <a:srgbClr val="FFFF00"/>
                           </a:solidFill>
                         </a:rPr>
-                        <a:t>0.011</a:t>
+                        <a:t>0.012</a:t>
                       </a:r>
                       <a:endParaRPr lang="en-US" dirty="0">
                         <a:ln>
@@ -15740,7 +15247,7 @@
                             <a:srgbClr val="FFFF00"/>
                           </a:solidFill>
                         </a:rPr>
-                        <a:t>0.011</a:t>
+                        <a:t>0.0019</a:t>
                       </a:r>
                       <a:endParaRPr lang="en-US" dirty="0">
                         <a:ln>
@@ -15875,7 +15382,7 @@
                             <a:srgbClr val="FFFF00"/>
                           </a:solidFill>
                         </a:rPr>
-                        <a:t>0.31</a:t>
+                        <a:t>0.33</a:t>
                       </a:r>
                       <a:endParaRPr lang="en-US" dirty="0">
                         <a:ln>
@@ -15942,7 +15449,7 @@
                             <a:srgbClr val="FFFF00"/>
                           </a:solidFill>
                         </a:rPr>
-                        <a:t>0.34</a:t>
+                        <a:t>0.19</a:t>
                       </a:r>
                       <a:endParaRPr lang="en-US" dirty="0">
                         <a:ln>
@@ -16077,7 +15584,7 @@
                             <a:srgbClr val="FFFF00"/>
                           </a:solidFill>
                         </a:rPr>
-                        <a:t>5.0</a:t>
+                        <a:t>5.1</a:t>
                       </a:r>
                       <a:endParaRPr lang="en-US" dirty="0">
                         <a:ln>
@@ -16279,7 +15786,7 @@
                             <a:srgbClr val="FFFF00"/>
                           </a:solidFill>
                         </a:rPr>
-                        <a:t>4.0</a:t>
+                        <a:t>4.1</a:t>
                       </a:r>
                       <a:endParaRPr lang="en-US" dirty="0">
                         <a:ln>
@@ -16346,7 +15853,7 @@
                             <a:srgbClr val="FFFF00"/>
                           </a:solidFill>
                         </a:rPr>
-                        <a:t>4.0</a:t>
+                        <a:t>1.6</a:t>
                       </a:r>
                       <a:endParaRPr lang="en-US" dirty="0">
                         <a:ln>
@@ -16481,7 +15988,7 @@
                             <a:srgbClr val="FFFF00"/>
                           </a:solidFill>
                         </a:rPr>
-                        <a:t>15.1</a:t>
+                        <a:t>14.8</a:t>
                       </a:r>
                       <a:endParaRPr lang="en-US" dirty="0">
                         <a:ln>
@@ -16548,7 +16055,7 @@
                             <a:srgbClr val="FFFF00"/>
                           </a:solidFill>
                         </a:rPr>
-                        <a:t>4.2</a:t>
+                        <a:t>1.9</a:t>
                       </a:r>
                       <a:endParaRPr lang="en-US" dirty="0">
                         <a:ln>
@@ -16879,7 +16386,7 @@
 </p:sld>
 </file>
 
-<file path=ppt/slides/slide28.xml><?xml version="1.0" encoding="utf-8"?>
+<file path=ppt/slides/slide27.xml><?xml version="1.0" encoding="utf-8"?>
 <p:sld xmlns:a="http://schemas.openxmlformats.org/drawingml/2006/main" xmlns:r="http://schemas.openxmlformats.org/officeDocument/2006/relationships" xmlns:p="http://schemas.openxmlformats.org/presentationml/2006/main">
   <p:cSld>
     <p:spTree>
@@ -16942,19 +16449,22 @@
           <a:p>
             <a:r>
               <a:rPr lang="en-US" dirty="0" smtClean="0"/>
-              <a:t>Be wary of functional code in inner loops in high-performance C# code</a:t>
-            </a:r>
-          </a:p>
-          <a:p>
+              <a:t>Be wary of functional code in inner loops in high-performance </a:t>
+            </a:r>
             <a:r>
               <a:rPr lang="en-US" dirty="0" smtClean="0"/>
-              <a:t>There is no measurable penalty for using a functional style in C++ code</a:t>
-            </a:r>
+              <a:t>code</a:t>
+            </a:r>
+            <a:endParaRPr lang="en-US" dirty="0" smtClean="0"/>
           </a:p>
           <a:p>
             <a:r>
               <a:rPr lang="en-US" dirty="0" smtClean="0"/>
-              <a:t>Write it both ways and measure!</a:t>
+              <a:t>Write </a:t>
+            </a:r>
+            <a:r>
+              <a:rPr lang="en-US" dirty="0" smtClean="0"/>
+              <a:t>it both ways and measure!</a:t>
             </a:r>
           </a:p>
           <a:p>
@@ -17012,7 +16522,7 @@
 </p:sld>
 </file>
 
-<file path=ppt/slides/slide29.xml><?xml version="1.0" encoding="utf-8"?>
+<file path=ppt/slides/slide28.xml><?xml version="1.0" encoding="utf-8"?>
 <p:sld xmlns:a="http://schemas.openxmlformats.org/drawingml/2006/main" xmlns:r="http://schemas.openxmlformats.org/officeDocument/2006/relationships" xmlns:p="http://schemas.openxmlformats.org/presentationml/2006/main">
   <p:cSld>
     <p:spTree>
@@ -17170,272 +16680,7 @@
 </p:sld>
 </file>
 
-<file path=ppt/slides/slide3.xml><?xml version="1.0" encoding="utf-8"?>
-<p:sld xmlns:a="http://schemas.openxmlformats.org/drawingml/2006/main" xmlns:r="http://schemas.openxmlformats.org/officeDocument/2006/relationships" xmlns:p="http://schemas.openxmlformats.org/presentationml/2006/main">
-  <p:cSld>
-    <p:spTree>
-      <p:nvGrpSpPr>
-        <p:cNvPr id="1" name=""/>
-        <p:cNvGrpSpPr/>
-        <p:nvPr/>
-      </p:nvGrpSpPr>
-      <p:grpSpPr>
-        <a:xfrm>
-          <a:off x="0" y="0"/>
-          <a:ext cx="0" cy="0"/>
-          <a:chOff x="0" y="0"/>
-          <a:chExt cx="0" cy="0"/>
-        </a:xfrm>
-      </p:grpSpPr>
-      <p:sp>
-        <p:nvSpPr>
-          <p:cNvPr id="4098" name="Title 1"/>
-          <p:cNvSpPr>
-            <a:spLocks noGrp="1"/>
-          </p:cNvSpPr>
-          <p:nvPr>
-            <p:ph type="title"/>
-          </p:nvPr>
-        </p:nvSpPr>
-        <p:spPr/>
-        <p:txBody>
-          <a:bodyPr/>
-          <a:lstStyle/>
-          <a:p>
-            <a:r>
-              <a:rPr lang="en-US" dirty="0" smtClean="0"/>
-              <a:t>Logistics</a:t>
-            </a:r>
-          </a:p>
-        </p:txBody>
-      </p:sp>
-      <p:sp>
-        <p:nvSpPr>
-          <p:cNvPr id="4099" name="Content Placeholder 2"/>
-          <p:cNvSpPr>
-            <a:spLocks noGrp="1"/>
-          </p:cNvSpPr>
-          <p:nvPr>
-            <p:ph idx="1"/>
-          </p:nvPr>
-        </p:nvSpPr>
-        <p:spPr/>
-        <p:txBody>
-          <a:bodyPr/>
-          <a:lstStyle/>
-          <a:p>
-            <a:r>
-              <a:rPr lang="en-US" dirty="0" smtClean="0"/>
-              <a:t>5 week commitment, including homework</a:t>
-            </a:r>
-          </a:p>
-          <a:p>
-            <a:r>
-              <a:rPr lang="en-US" dirty="0" smtClean="0"/>
-              <a:t>Sign up for a Project Euler account: </a:t>
-            </a:r>
-            <a:r>
-              <a:rPr lang="en-US" dirty="0" smtClean="0">
-                <a:hlinkClick r:id="rId2"/>
-              </a:rPr>
-              <a:t>https://projecteuler.net/</a:t>
-            </a:r>
-            <a:endParaRPr lang="en-US" dirty="0" smtClean="0"/>
-          </a:p>
-          <a:p>
-            <a:r>
-              <a:rPr lang="en-US" dirty="0" smtClean="0"/>
-              <a:t>Code and slides are available at </a:t>
-            </a:r>
-            <a:r>
-              <a:rPr lang="en-US" dirty="0" smtClean="0">
-                <a:hlinkClick r:id="rId3"/>
-              </a:rPr>
-              <a:t>https://github.com/insideoutclub/Euler.git</a:t>
-            </a:r>
-            <a:endParaRPr lang="en-US" dirty="0" smtClean="0"/>
-          </a:p>
-          <a:p>
-            <a:r>
-              <a:rPr lang="en-US" dirty="0" smtClean="0"/>
-              <a:t>I’ll show solutions &amp; performance in C++ &amp; C#</a:t>
-            </a:r>
-          </a:p>
-          <a:p>
-            <a:r>
-              <a:rPr lang="en-US" dirty="0" smtClean="0"/>
-              <a:t>Use language of your choice and show us how beautiful/fast your solution is.</a:t>
-            </a:r>
-          </a:p>
-          <a:p>
-            <a:pPr marL="0" indent="0">
-              <a:buNone/>
-            </a:pPr>
-            <a:endParaRPr lang="en-US" dirty="0" smtClean="0"/>
-          </a:p>
-        </p:txBody>
-      </p:sp>
-      <p:sp>
-        <p:nvSpPr>
-          <p:cNvPr id="4100" name="Footer Placeholder 3"/>
-          <p:cNvSpPr>
-            <a:spLocks noGrp="1"/>
-          </p:cNvSpPr>
-          <p:nvPr>
-            <p:ph type="ftr" sz="quarter" idx="11"/>
-          </p:nvPr>
-        </p:nvSpPr>
-        <p:spPr>
-          <a:noFill/>
-          <a:ln/>
-          <a:extLst>
-            <a:ext uri="{909E8E84-426E-40DD-AFC4-6F175D3DCCD1}">
-              <a14:hiddenFill xmlns:a14="http://schemas.microsoft.com/office/drawing/2010/main">
-                <a:solidFill>
-                  <a:srgbClr val="FFFFFF"/>
-                </a:solidFill>
-              </a14:hiddenFill>
-            </a:ext>
-            <a:ext uri="{91240B29-F687-4F45-9708-019B960494DF}">
-              <a14:hiddenLine xmlns:a14="http://schemas.microsoft.com/office/drawing/2010/main" w="9525">
-                <a:solidFill>
-                  <a:srgbClr val="000000"/>
-                </a:solidFill>
-                <a:miter lim="800000"/>
-                <a:headEnd/>
-                <a:tailEnd/>
-              </a14:hiddenLine>
-            </a:ext>
-          </a:extLst>
-        </p:spPr>
-        <p:txBody>
-          <a:bodyPr/>
-          <a:lstStyle>
-            <a:lvl1pPr eaLnBrk="0" hangingPunct="0">
-              <a:defRPr sz="2800" b="1">
-                <a:solidFill>
-                  <a:schemeClr val="tx1"/>
-                </a:solidFill>
-                <a:latin typeface="Arial" charset="0"/>
-              </a:defRPr>
-            </a:lvl1pPr>
-            <a:lvl2pPr marL="742950" indent="-285750" eaLnBrk="0" hangingPunct="0">
-              <a:defRPr sz="2800" b="1">
-                <a:solidFill>
-                  <a:schemeClr val="tx1"/>
-                </a:solidFill>
-                <a:latin typeface="Arial" charset="0"/>
-              </a:defRPr>
-            </a:lvl2pPr>
-            <a:lvl3pPr marL="1143000" indent="-228600" eaLnBrk="0" hangingPunct="0">
-              <a:defRPr sz="2800" b="1">
-                <a:solidFill>
-                  <a:schemeClr val="tx1"/>
-                </a:solidFill>
-                <a:latin typeface="Arial" charset="0"/>
-              </a:defRPr>
-            </a:lvl3pPr>
-            <a:lvl4pPr marL="1600200" indent="-228600" eaLnBrk="0" hangingPunct="0">
-              <a:defRPr sz="2800" b="1">
-                <a:solidFill>
-                  <a:schemeClr val="tx1"/>
-                </a:solidFill>
-                <a:latin typeface="Arial" charset="0"/>
-              </a:defRPr>
-            </a:lvl4pPr>
-            <a:lvl5pPr marL="2057400" indent="-228600" eaLnBrk="0" hangingPunct="0">
-              <a:defRPr sz="2800" b="1">
-                <a:solidFill>
-                  <a:schemeClr val="tx1"/>
-                </a:solidFill>
-                <a:latin typeface="Arial" charset="0"/>
-              </a:defRPr>
-            </a:lvl5pPr>
-            <a:lvl6pPr marL="2514600" indent="-228600" eaLnBrk="0" fontAlgn="base" hangingPunct="0">
-              <a:spcBef>
-                <a:spcPct val="0"/>
-              </a:spcBef>
-              <a:spcAft>
-                <a:spcPct val="0"/>
-              </a:spcAft>
-              <a:defRPr sz="2800" b="1">
-                <a:solidFill>
-                  <a:schemeClr val="tx1"/>
-                </a:solidFill>
-                <a:latin typeface="Arial" charset="0"/>
-              </a:defRPr>
-            </a:lvl6pPr>
-            <a:lvl7pPr marL="2971800" indent="-228600" eaLnBrk="0" fontAlgn="base" hangingPunct="0">
-              <a:spcBef>
-                <a:spcPct val="0"/>
-              </a:spcBef>
-              <a:spcAft>
-                <a:spcPct val="0"/>
-              </a:spcAft>
-              <a:defRPr sz="2800" b="1">
-                <a:solidFill>
-                  <a:schemeClr val="tx1"/>
-                </a:solidFill>
-                <a:latin typeface="Arial" charset="0"/>
-              </a:defRPr>
-            </a:lvl7pPr>
-            <a:lvl8pPr marL="3429000" indent="-228600" eaLnBrk="0" fontAlgn="base" hangingPunct="0">
-              <a:spcBef>
-                <a:spcPct val="0"/>
-              </a:spcBef>
-              <a:spcAft>
-                <a:spcPct val="0"/>
-              </a:spcAft>
-              <a:defRPr sz="2800" b="1">
-                <a:solidFill>
-                  <a:schemeClr val="tx1"/>
-                </a:solidFill>
-                <a:latin typeface="Arial" charset="0"/>
-              </a:defRPr>
-            </a:lvl8pPr>
-            <a:lvl9pPr marL="3886200" indent="-228600" eaLnBrk="0" fontAlgn="base" hangingPunct="0">
-              <a:spcBef>
-                <a:spcPct val="0"/>
-              </a:spcBef>
-              <a:spcAft>
-                <a:spcPct val="0"/>
-              </a:spcAft>
-              <a:defRPr sz="2800" b="1">
-                <a:solidFill>
-                  <a:schemeClr val="tx1"/>
-                </a:solidFill>
-                <a:latin typeface="Arial" charset="0"/>
-              </a:defRPr>
-            </a:lvl9pPr>
-          </a:lstStyle>
-          <a:p>
-            <a:r>
-              <a:rPr lang="en-US" sz="1400" b="0" smtClean="0">
-                <a:solidFill>
-                  <a:srgbClr val="FFFFFF"/>
-                </a:solidFill>
-              </a:rPr>
-              <a:t>Teradyne Confidential and Proprietary</a:t>
-            </a:r>
-          </a:p>
-        </p:txBody>
-      </p:sp>
-    </p:spTree>
-  </p:cSld>
-  <p:clrMapOvr>
-    <a:masterClrMapping/>
-  </p:clrMapOvr>
-  <p:timing>
-    <p:tnLst>
-      <p:par>
-        <p:cTn id="1" dur="indefinite" restart="never" nodeType="tmRoot"/>
-      </p:par>
-    </p:tnLst>
-  </p:timing>
-</p:sld>
-</file>
-
-<file path=ppt/slides/slide30.xml><?xml version="1.0" encoding="utf-8"?>
+<file path=ppt/slides/slide29.xml><?xml version="1.0" encoding="utf-8"?>
 <p:sld xmlns:a="http://schemas.openxmlformats.org/drawingml/2006/main" xmlns:r="http://schemas.openxmlformats.org/officeDocument/2006/relationships" xmlns:p="http://schemas.openxmlformats.org/presentationml/2006/main">
   <p:cSld>
     <p:spTree>
@@ -17719,6 +16964,271 @@
 </p:sld>
 </file>
 
+<file path=ppt/slides/slide3.xml><?xml version="1.0" encoding="utf-8"?>
+<p:sld xmlns:a="http://schemas.openxmlformats.org/drawingml/2006/main" xmlns:r="http://schemas.openxmlformats.org/officeDocument/2006/relationships" xmlns:p="http://schemas.openxmlformats.org/presentationml/2006/main">
+  <p:cSld>
+    <p:spTree>
+      <p:nvGrpSpPr>
+        <p:cNvPr id="1" name=""/>
+        <p:cNvGrpSpPr/>
+        <p:nvPr/>
+      </p:nvGrpSpPr>
+      <p:grpSpPr>
+        <a:xfrm>
+          <a:off x="0" y="0"/>
+          <a:ext cx="0" cy="0"/>
+          <a:chOff x="0" y="0"/>
+          <a:chExt cx="0" cy="0"/>
+        </a:xfrm>
+      </p:grpSpPr>
+      <p:sp>
+        <p:nvSpPr>
+          <p:cNvPr id="4098" name="Title 1"/>
+          <p:cNvSpPr>
+            <a:spLocks noGrp="1"/>
+          </p:cNvSpPr>
+          <p:nvPr>
+            <p:ph type="title"/>
+          </p:nvPr>
+        </p:nvSpPr>
+        <p:spPr/>
+        <p:txBody>
+          <a:bodyPr/>
+          <a:lstStyle/>
+          <a:p>
+            <a:r>
+              <a:rPr lang="en-US" dirty="0" smtClean="0"/>
+              <a:t>Logistics</a:t>
+            </a:r>
+          </a:p>
+        </p:txBody>
+      </p:sp>
+      <p:sp>
+        <p:nvSpPr>
+          <p:cNvPr id="4099" name="Content Placeholder 2"/>
+          <p:cNvSpPr>
+            <a:spLocks noGrp="1"/>
+          </p:cNvSpPr>
+          <p:nvPr>
+            <p:ph idx="1"/>
+          </p:nvPr>
+        </p:nvSpPr>
+        <p:spPr/>
+        <p:txBody>
+          <a:bodyPr/>
+          <a:lstStyle/>
+          <a:p>
+            <a:r>
+              <a:rPr lang="en-US" dirty="0" smtClean="0"/>
+              <a:t>5 week commitment, including homework</a:t>
+            </a:r>
+          </a:p>
+          <a:p>
+            <a:r>
+              <a:rPr lang="en-US" dirty="0" smtClean="0"/>
+              <a:t>Sign up for a Project Euler account: </a:t>
+            </a:r>
+            <a:r>
+              <a:rPr lang="en-US" dirty="0" smtClean="0">
+                <a:hlinkClick r:id="rId2"/>
+              </a:rPr>
+              <a:t>https://projecteuler.net/</a:t>
+            </a:r>
+            <a:endParaRPr lang="en-US" dirty="0" smtClean="0"/>
+          </a:p>
+          <a:p>
+            <a:r>
+              <a:rPr lang="en-US" dirty="0" smtClean="0"/>
+              <a:t>Code and slides are available at </a:t>
+            </a:r>
+            <a:r>
+              <a:rPr lang="en-US" dirty="0" smtClean="0">
+                <a:hlinkClick r:id="rId3"/>
+              </a:rPr>
+              <a:t>https://github.com/insideoutclub/Euler.git</a:t>
+            </a:r>
+            <a:endParaRPr lang="en-US" dirty="0" smtClean="0"/>
+          </a:p>
+          <a:p>
+            <a:r>
+              <a:rPr lang="en-US" dirty="0" smtClean="0"/>
+              <a:t>I’ll show solutions &amp; performance in C++ &amp; C#</a:t>
+            </a:r>
+          </a:p>
+          <a:p>
+            <a:r>
+              <a:rPr lang="en-US" dirty="0" smtClean="0"/>
+              <a:t>Use language of your choice and show us how beautiful/fast your solution is.</a:t>
+            </a:r>
+          </a:p>
+          <a:p>
+            <a:pPr marL="0" indent="0">
+              <a:buNone/>
+            </a:pPr>
+            <a:endParaRPr lang="en-US" dirty="0" smtClean="0"/>
+          </a:p>
+        </p:txBody>
+      </p:sp>
+      <p:sp>
+        <p:nvSpPr>
+          <p:cNvPr id="4100" name="Footer Placeholder 3"/>
+          <p:cNvSpPr>
+            <a:spLocks noGrp="1"/>
+          </p:cNvSpPr>
+          <p:nvPr>
+            <p:ph type="ftr" sz="quarter" idx="11"/>
+          </p:nvPr>
+        </p:nvSpPr>
+        <p:spPr>
+          <a:noFill/>
+          <a:ln/>
+          <a:extLst>
+            <a:ext uri="{909E8E84-426E-40DD-AFC4-6F175D3DCCD1}">
+              <a14:hiddenFill xmlns:a14="http://schemas.microsoft.com/office/drawing/2010/main">
+                <a:solidFill>
+                  <a:srgbClr val="FFFFFF"/>
+                </a:solidFill>
+              </a14:hiddenFill>
+            </a:ext>
+            <a:ext uri="{91240B29-F687-4F45-9708-019B960494DF}">
+              <a14:hiddenLine xmlns:a14="http://schemas.microsoft.com/office/drawing/2010/main" w="9525">
+                <a:solidFill>
+                  <a:srgbClr val="000000"/>
+                </a:solidFill>
+                <a:miter lim="800000"/>
+                <a:headEnd/>
+                <a:tailEnd/>
+              </a14:hiddenLine>
+            </a:ext>
+          </a:extLst>
+        </p:spPr>
+        <p:txBody>
+          <a:bodyPr/>
+          <a:lstStyle>
+            <a:lvl1pPr eaLnBrk="0" hangingPunct="0">
+              <a:defRPr sz="2800" b="1">
+                <a:solidFill>
+                  <a:schemeClr val="tx1"/>
+                </a:solidFill>
+                <a:latin typeface="Arial" charset="0"/>
+              </a:defRPr>
+            </a:lvl1pPr>
+            <a:lvl2pPr marL="742950" indent="-285750" eaLnBrk="0" hangingPunct="0">
+              <a:defRPr sz="2800" b="1">
+                <a:solidFill>
+                  <a:schemeClr val="tx1"/>
+                </a:solidFill>
+                <a:latin typeface="Arial" charset="0"/>
+              </a:defRPr>
+            </a:lvl2pPr>
+            <a:lvl3pPr marL="1143000" indent="-228600" eaLnBrk="0" hangingPunct="0">
+              <a:defRPr sz="2800" b="1">
+                <a:solidFill>
+                  <a:schemeClr val="tx1"/>
+                </a:solidFill>
+                <a:latin typeface="Arial" charset="0"/>
+              </a:defRPr>
+            </a:lvl3pPr>
+            <a:lvl4pPr marL="1600200" indent="-228600" eaLnBrk="0" hangingPunct="0">
+              <a:defRPr sz="2800" b="1">
+                <a:solidFill>
+                  <a:schemeClr val="tx1"/>
+                </a:solidFill>
+                <a:latin typeface="Arial" charset="0"/>
+              </a:defRPr>
+            </a:lvl4pPr>
+            <a:lvl5pPr marL="2057400" indent="-228600" eaLnBrk="0" hangingPunct="0">
+              <a:defRPr sz="2800" b="1">
+                <a:solidFill>
+                  <a:schemeClr val="tx1"/>
+                </a:solidFill>
+                <a:latin typeface="Arial" charset="0"/>
+              </a:defRPr>
+            </a:lvl5pPr>
+            <a:lvl6pPr marL="2514600" indent="-228600" eaLnBrk="0" fontAlgn="base" hangingPunct="0">
+              <a:spcBef>
+                <a:spcPct val="0"/>
+              </a:spcBef>
+              <a:spcAft>
+                <a:spcPct val="0"/>
+              </a:spcAft>
+              <a:defRPr sz="2800" b="1">
+                <a:solidFill>
+                  <a:schemeClr val="tx1"/>
+                </a:solidFill>
+                <a:latin typeface="Arial" charset="0"/>
+              </a:defRPr>
+            </a:lvl6pPr>
+            <a:lvl7pPr marL="2971800" indent="-228600" eaLnBrk="0" fontAlgn="base" hangingPunct="0">
+              <a:spcBef>
+                <a:spcPct val="0"/>
+              </a:spcBef>
+              <a:spcAft>
+                <a:spcPct val="0"/>
+              </a:spcAft>
+              <a:defRPr sz="2800" b="1">
+                <a:solidFill>
+                  <a:schemeClr val="tx1"/>
+                </a:solidFill>
+                <a:latin typeface="Arial" charset="0"/>
+              </a:defRPr>
+            </a:lvl7pPr>
+            <a:lvl8pPr marL="3429000" indent="-228600" eaLnBrk="0" fontAlgn="base" hangingPunct="0">
+              <a:spcBef>
+                <a:spcPct val="0"/>
+              </a:spcBef>
+              <a:spcAft>
+                <a:spcPct val="0"/>
+              </a:spcAft>
+              <a:defRPr sz="2800" b="1">
+                <a:solidFill>
+                  <a:schemeClr val="tx1"/>
+                </a:solidFill>
+                <a:latin typeface="Arial" charset="0"/>
+              </a:defRPr>
+            </a:lvl8pPr>
+            <a:lvl9pPr marL="3886200" indent="-228600" eaLnBrk="0" fontAlgn="base" hangingPunct="0">
+              <a:spcBef>
+                <a:spcPct val="0"/>
+              </a:spcBef>
+              <a:spcAft>
+                <a:spcPct val="0"/>
+              </a:spcAft>
+              <a:defRPr sz="2800" b="1">
+                <a:solidFill>
+                  <a:schemeClr val="tx1"/>
+                </a:solidFill>
+                <a:latin typeface="Arial" charset="0"/>
+              </a:defRPr>
+            </a:lvl9pPr>
+          </a:lstStyle>
+          <a:p>
+            <a:r>
+              <a:rPr lang="en-US" sz="1400" b="0" smtClean="0">
+                <a:solidFill>
+                  <a:srgbClr val="FFFFFF"/>
+                </a:solidFill>
+              </a:rPr>
+              <a:t>Teradyne Confidential and Proprietary</a:t>
+            </a:r>
+          </a:p>
+        </p:txBody>
+      </p:sp>
+    </p:spTree>
+  </p:cSld>
+  <p:clrMapOvr>
+    <a:masterClrMapping/>
+  </p:clrMapOvr>
+  <p:timing>
+    <p:tnLst>
+      <p:par>
+        <p:cTn id="1" dur="indefinite" restart="never" nodeType="tmRoot"/>
+      </p:par>
+    </p:tnLst>
+  </p:timing>
+</p:sld>
+</file>
+
 <file path=ppt/slides/slide4.xml><?xml version="1.0" encoding="utf-8"?>
 <p:sld xmlns:a="http://schemas.openxmlformats.org/drawingml/2006/main" xmlns:r="http://schemas.openxmlformats.org/officeDocument/2006/relationships" xmlns:p="http://schemas.openxmlformats.org/presentationml/2006/main">
   <p:cSld>
@@ -18034,8 +17544,13 @@
             </a:pPr>
             <a:r>
               <a:rPr lang="en-US" sz="2400" dirty="0"/>
-              <a:t>// Generate [1, limit)</a:t>
-            </a:r>
+              <a:t>// Generate [1, </a:t>
+            </a:r>
+            <a:r>
+              <a:rPr lang="en-US" sz="2400" dirty="0" smtClean="0"/>
+              <a:t>1000)</a:t>
+            </a:r>
+            <a:endParaRPr lang="en-US" sz="2400" dirty="0"/>
           </a:p>
           <a:p>
             <a:pPr marL="0" indent="0">
@@ -18047,8 +17562,21 @@
             </a:r>
             <a:r>
               <a:rPr lang="en-US" sz="2400" dirty="0"/>
-              <a:t>Filter out multiples of x and y</a:t>
-            </a:r>
+              <a:t>Filter out multiples of </a:t>
+            </a:r>
+            <a:r>
+              <a:rPr lang="en-US" sz="2400" dirty="0" smtClean="0"/>
+              <a:t>3 </a:t>
+            </a:r>
+            <a:r>
+              <a:rPr lang="en-US" sz="2400" dirty="0"/>
+              <a:t>and </a:t>
+            </a:r>
+            <a:r>
+              <a:rPr lang="en-US" sz="2400" dirty="0" smtClean="0"/>
+              <a:t>5</a:t>
+            </a:r>
+            <a:endParaRPr lang="en-US" sz="2400" dirty="0"/>
           </a:p>
           <a:p>
             <a:pPr marL="0" indent="0">
@@ -18088,36 +17616,12 @@
               <a:t>filterImperative</a:t>
             </a:r>
             <a:r>
-              <a:rPr lang="en-US" sz="2400" dirty="0"/>
-              <a:t>(</a:t>
-            </a:r>
-            <a:r>
-              <a:rPr lang="en-US" sz="2400" dirty="0" err="1"/>
-              <a:t>int</a:t>
-            </a:r>
-            <a:r>
-              <a:rPr lang="en-US" sz="2400" dirty="0"/>
-              <a:t> limit, </a:t>
-            </a:r>
-            <a:r>
-              <a:rPr lang="en-US" sz="2400" dirty="0" err="1"/>
-              <a:t>int</a:t>
-            </a:r>
-            <a:r>
-              <a:rPr lang="en-US" sz="2400" dirty="0"/>
-              <a:t> x, </a:t>
-            </a:r>
-            <a:r>
-              <a:rPr lang="en-US" sz="2400" dirty="0" err="1"/>
-              <a:t>int</a:t>
-            </a:r>
-            <a:r>
-              <a:rPr lang="en-US" sz="2400" dirty="0"/>
-              <a:t> y</a:t>
-            </a:r>
-            <a:r>
               <a:rPr lang="en-US" sz="2400" dirty="0" smtClean="0"/>
-              <a:t>) {</a:t>
+              <a:t>() </a:t>
+            </a:r>
+            <a:r>
+              <a:rPr lang="en-US" sz="2400" dirty="0" smtClean="0"/>
+              <a:t>{</a:t>
             </a:r>
             <a:endParaRPr lang="en-US" sz="2400" dirty="0"/>
           </a:p>
@@ -18180,7 +17684,19 @@
             </a:r>
             <a:r>
               <a:rPr lang="en-US" sz="2400" dirty="0"/>
-              <a:t> &lt; limit; ++</a:t>
+              <a:t> &lt; </a:t>
+            </a:r>
+            <a:r>
+              <a:rPr lang="en-US" sz="2400" dirty="0" smtClean="0"/>
+              <a:t>1000</a:t>
+            </a:r>
+            <a:r>
+              <a:rPr lang="en-US" sz="2400" dirty="0" smtClean="0"/>
+              <a:t>; </a:t>
+            </a:r>
+            <a:r>
+              <a:rPr lang="en-US" sz="2400" dirty="0"/>
+              <a:t>++</a:t>
             </a:r>
             <a:r>
               <a:rPr lang="en-US" sz="2400" dirty="0" err="1"/>
@@ -18213,7 +17729,15 @@
             </a:r>
             <a:r>
               <a:rPr lang="en-US" sz="2400" dirty="0"/>
-              <a:t> % x == 0 || </a:t>
+              <a:t> % </a:t>
+            </a:r>
+            <a:r>
+              <a:rPr lang="en-US" sz="2400" dirty="0" smtClean="0"/>
+              <a:t>3 </a:t>
+            </a:r>
+            <a:r>
+              <a:rPr lang="en-US" sz="2400" dirty="0"/>
+              <a:t>== 0 || </a:t>
             </a:r>
             <a:r>
               <a:rPr lang="en-US" sz="2400" dirty="0" err="1"/>
@@ -18221,7 +17745,15 @@
             </a:r>
             <a:r>
               <a:rPr lang="en-US" sz="2400" dirty="0"/>
-              <a:t> % y == 0)</a:t>
+              <a:t> % </a:t>
+            </a:r>
+            <a:r>
+              <a:rPr lang="en-US" sz="2400" dirty="0" smtClean="0"/>
+              <a:t>5 </a:t>
+            </a:r>
+            <a:r>
+              <a:rPr lang="en-US" sz="2400" dirty="0"/>
+              <a:t>== 0)</a:t>
             </a:r>
           </a:p>
           <a:p>
@@ -18896,7 +18428,15 @@
             </a:r>
             <a:r>
               <a:rPr lang="en-US" sz="2400" dirty="0" smtClean="0"/>
-              <a:t>, assign 1 to it, compare it against limit, increment it</a:t>
+              <a:t>, assign 1 to it, compare it against </a:t>
+            </a:r>
+            <a:r>
+              <a:rPr lang="en-US" sz="2400" dirty="0" smtClean="0"/>
+              <a:t>1000, </a:t>
+            </a:r>
+            <a:r>
+              <a:rPr lang="en-US" sz="2400" dirty="0" smtClean="0"/>
+              <a:t>increment it</a:t>
             </a:r>
           </a:p>
           <a:p>
@@ -18914,7 +18454,11 @@
           <a:p>
             <a:r>
               <a:rPr lang="en-US" sz="2400" dirty="0" smtClean="0"/>
-              <a:t>e.g. generate a sequence of integers from 1 to limit</a:t>
+              <a:t>e.g. generate a sequence of integers from 1 to </a:t>
+            </a:r>
+            <a:r>
+              <a:rPr lang="en-US" sz="2400" dirty="0" smtClean="0"/>
+              <a:t>1000</a:t>
             </a:r>
             <a:endParaRPr lang="en-US" sz="2400" dirty="0"/>
           </a:p>
@@ -19149,8 +18693,13 @@
             </a:pPr>
             <a:r>
               <a:rPr lang="en-US" sz="2400" dirty="0"/>
-              <a:t>// Generate [1, limit)</a:t>
-            </a:r>
+              <a:t>// Generate [1, </a:t>
+            </a:r>
+            <a:r>
+              <a:rPr lang="en-US" sz="2400" dirty="0" smtClean="0"/>
+              <a:t>1000)</a:t>
+            </a:r>
+            <a:endParaRPr lang="en-US" sz="2400" dirty="0"/>
           </a:p>
           <a:p>
             <a:pPr marL="0" indent="0">
@@ -19162,8 +18711,21 @@
             </a:r>
             <a:r>
               <a:rPr lang="en-US" sz="2400" dirty="0"/>
-              <a:t>Filter out multiples of x and y</a:t>
-            </a:r>
+              <a:t>Filter out multiples of </a:t>
+            </a:r>
+            <a:r>
+              <a:rPr lang="en-US" sz="2400" dirty="0" smtClean="0"/>
+              <a:t>3 </a:t>
+            </a:r>
+            <a:r>
+              <a:rPr lang="en-US" sz="2400" dirty="0"/>
+              <a:t>and </a:t>
+            </a:r>
+            <a:r>
+              <a:rPr lang="en-US" sz="2400" dirty="0" smtClean="0"/>
+              <a:t>5</a:t>
+            </a:r>
+            <a:endParaRPr lang="en-US" sz="2400" dirty="0"/>
           </a:p>
           <a:p>
             <a:pPr marL="0" indent="0">
@@ -19203,36 +18765,12 @@
               <a:t>filterFunctional</a:t>
             </a:r>
             <a:r>
-              <a:rPr lang="en-US" sz="2400" dirty="0"/>
-              <a:t>(</a:t>
-            </a:r>
-            <a:r>
-              <a:rPr lang="en-US" sz="2400" dirty="0" err="1"/>
-              <a:t>int</a:t>
-            </a:r>
-            <a:r>
-              <a:rPr lang="en-US" sz="2400" dirty="0"/>
-              <a:t> limit, </a:t>
-            </a:r>
-            <a:r>
-              <a:rPr lang="en-US" sz="2400" dirty="0" err="1"/>
-              <a:t>int</a:t>
-            </a:r>
-            <a:r>
-              <a:rPr lang="en-US" sz="2400" dirty="0"/>
-              <a:t> x, </a:t>
-            </a:r>
-            <a:r>
-              <a:rPr lang="en-US" sz="2400" dirty="0" err="1"/>
-              <a:t>int</a:t>
-            </a:r>
-            <a:r>
-              <a:rPr lang="en-US" sz="2400" dirty="0"/>
-              <a:t> y</a:t>
-            </a:r>
-            <a:r>
               <a:rPr lang="en-US" sz="2400" dirty="0" smtClean="0"/>
-              <a:t>) {</a:t>
+              <a:t>() </a:t>
+            </a:r>
+            <a:r>
+              <a:rPr lang="en-US" sz="2400" dirty="0" smtClean="0"/>
+              <a:t>{</a:t>
             </a:r>
             <a:endParaRPr lang="en-US" sz="2400" dirty="0"/>
           </a:p>
@@ -19254,7 +18792,15 @@
             </a:r>
             <a:r>
               <a:rPr lang="en-US" sz="2400" dirty="0"/>
-              <a:t>(1, limit - 1</a:t>
+              <a:t>(1, </a:t>
+            </a:r>
+            <a:r>
+              <a:rPr lang="en-US" sz="2400" dirty="0" smtClean="0"/>
+              <a:t>1000 </a:t>
+            </a:r>
+            <a:r>
+              <a:rPr lang="en-US" sz="2400" dirty="0"/>
+              <a:t>- 1</a:t>
             </a:r>
             <a:r>
               <a:rPr lang="en-US" sz="2400" dirty="0" smtClean="0"/>
@@ -19291,7 +18837,15 @@
             </a:r>
             <a:r>
               <a:rPr lang="en-US" sz="2400" dirty="0"/>
-              <a:t> % x == 0 || </a:t>
+              <a:t> % </a:t>
+            </a:r>
+            <a:r>
+              <a:rPr lang="en-US" sz="2400" dirty="0" smtClean="0"/>
+              <a:t>3 </a:t>
+            </a:r>
+            <a:r>
+              <a:rPr lang="en-US" sz="2400" dirty="0"/>
+              <a:t>== 0 || </a:t>
             </a:r>
             <a:r>
               <a:rPr lang="en-US" sz="2400" dirty="0" err="1"/>
@@ -19299,7 +18853,15 @@
             </a:r>
             <a:r>
               <a:rPr lang="en-US" sz="2400" dirty="0"/>
-              <a:t> % y == 0</a:t>
+              <a:t> % </a:t>
+            </a:r>
+            <a:r>
+              <a:rPr lang="en-US" sz="2400" dirty="0" smtClean="0"/>
+              <a:t>5 </a:t>
+            </a:r>
+            <a:r>
+              <a:rPr lang="en-US" sz="2400" dirty="0"/>
+              <a:t>== 0</a:t>
             </a:r>
             <a:r>
               <a:rPr lang="en-US" sz="2400" dirty="0" smtClean="0"/>
@@ -20197,11 +19759,7 @@
           <a:p>
             <a:r>
               <a:rPr lang="en-US" sz="2400" dirty="0" smtClean="0"/>
-              <a:t>Call it </a:t>
-            </a:r>
-            <a:r>
-              <a:rPr lang="en-US" sz="2400" dirty="0" smtClean="0"/>
-              <a:t>using either of 2 syntaxes:</a:t>
+              <a:t>Call it using either of 2 syntaxes:</a:t>
             </a:r>
           </a:p>
           <a:p>

</xml_diff>

<commit_message>
Last edits before class.
</commit_message>
<xml_diff>
--- a/FiveEasyPieces1.pptx
+++ b/FiveEasyPieces1.pptx
@@ -5,10 +5,10 @@
     <p:sldMasterId id="2147483648" r:id="rId1"/>
   </p:sldMasterIdLst>
   <p:notesMasterIdLst>
-    <p:notesMasterId r:id="rId31"/>
+    <p:notesMasterId r:id="rId32"/>
   </p:notesMasterIdLst>
   <p:handoutMasterIdLst>
-    <p:handoutMasterId r:id="rId32"/>
+    <p:handoutMasterId r:id="rId33"/>
   </p:handoutMasterIdLst>
   <p:sldIdLst>
     <p:sldId id="256" r:id="rId2"/>
@@ -30,8 +30,8 @@
     <p:sldId id="372" r:id="rId18"/>
     <p:sldId id="373" r:id="rId19"/>
     <p:sldId id="374" r:id="rId20"/>
-    <p:sldId id="376" r:id="rId21"/>
-    <p:sldId id="377" r:id="rId22"/>
+    <p:sldId id="386" r:id="rId21"/>
+    <p:sldId id="376" r:id="rId22"/>
     <p:sldId id="378" r:id="rId23"/>
     <p:sldId id="379" r:id="rId24"/>
     <p:sldId id="380" r:id="rId25"/>
@@ -40,6 +40,7 @@
     <p:sldId id="383" r:id="rId28"/>
     <p:sldId id="384" r:id="rId29"/>
     <p:sldId id="385" r:id="rId30"/>
+    <p:sldId id="387" r:id="rId31"/>
   </p:sldIdLst>
   <p:sldSz cx="9144000" cy="6858000" type="screen4x3"/>
   <p:notesSz cx="6954838" cy="9240838"/>
@@ -1729,7 +1730,7 @@
               <a:pPr>
                 <a:defRPr/>
               </a:pPr>
-              <a:t>22</a:t>
+              <a:t>20</a:t>
             </a:fld>
             <a:endParaRPr lang="en-US"/>
           </a:p>
@@ -1824,7 +1825,7 @@
               <a:pPr>
                 <a:defRPr/>
               </a:pPr>
-              <a:t>23</a:t>
+              <a:t>22</a:t>
             </a:fld>
             <a:endParaRPr lang="en-US"/>
           </a:p>
@@ -1919,7 +1920,7 @@
               <a:pPr>
                 <a:defRPr/>
               </a:pPr>
-              <a:t>24</a:t>
+              <a:t>23</a:t>
             </a:fld>
             <a:endParaRPr lang="en-US"/>
           </a:p>
@@ -2014,7 +2015,7 @@
               <a:pPr>
                 <a:defRPr/>
               </a:pPr>
-              <a:t>25</a:t>
+              <a:t>24</a:t>
             </a:fld>
             <a:endParaRPr lang="en-US"/>
           </a:p>
@@ -2129,6 +2130,101 @@
 </file>
 
 <file path=ppt/notesSlides/notesSlide20.xml><?xml version="1.0" encoding="utf-8"?>
+<p:notes xmlns:a="http://schemas.openxmlformats.org/drawingml/2006/main" xmlns:r="http://schemas.openxmlformats.org/officeDocument/2006/relationships" xmlns:p="http://schemas.openxmlformats.org/presentationml/2006/main">
+  <p:cSld>
+    <p:spTree>
+      <p:nvGrpSpPr>
+        <p:cNvPr id="1" name=""/>
+        <p:cNvGrpSpPr/>
+        <p:nvPr/>
+      </p:nvGrpSpPr>
+      <p:grpSpPr>
+        <a:xfrm>
+          <a:off x="0" y="0"/>
+          <a:ext cx="0" cy="0"/>
+          <a:chOff x="0" y="0"/>
+          <a:chExt cx="0" cy="0"/>
+        </a:xfrm>
+      </p:grpSpPr>
+      <p:sp>
+        <p:nvSpPr>
+          <p:cNvPr id="2" name="Slide Image Placeholder 1"/>
+          <p:cNvSpPr>
+            <a:spLocks noGrp="1" noRot="1" noChangeAspect="1"/>
+          </p:cNvSpPr>
+          <p:nvPr>
+            <p:ph type="sldImg"/>
+          </p:nvPr>
+        </p:nvSpPr>
+        <p:spPr>
+          <a:xfrm>
+            <a:off x="1168400" y="693738"/>
+            <a:ext cx="4619625" cy="3465512"/>
+          </a:xfrm>
+        </p:spPr>
+      </p:sp>
+      <p:sp>
+        <p:nvSpPr>
+          <p:cNvPr id="3" name="Notes Placeholder 2"/>
+          <p:cNvSpPr>
+            <a:spLocks noGrp="1"/>
+          </p:cNvSpPr>
+          <p:nvPr>
+            <p:ph type="body" idx="1"/>
+          </p:nvPr>
+        </p:nvSpPr>
+        <p:spPr/>
+        <p:txBody>
+          <a:bodyPr/>
+          <a:lstStyle/>
+          <a:p>
+            <a:endParaRPr lang="en-US" dirty="0"/>
+          </a:p>
+        </p:txBody>
+      </p:sp>
+      <p:sp>
+        <p:nvSpPr>
+          <p:cNvPr id="4" name="Slide Number Placeholder 3"/>
+          <p:cNvSpPr>
+            <a:spLocks noGrp="1"/>
+          </p:cNvSpPr>
+          <p:nvPr>
+            <p:ph type="sldNum" sz="quarter" idx="10"/>
+          </p:nvPr>
+        </p:nvSpPr>
+        <p:spPr/>
+        <p:txBody>
+          <a:bodyPr/>
+          <a:lstStyle/>
+          <a:p>
+            <a:pPr>
+              <a:defRPr/>
+            </a:pPr>
+            <a:fld id="{4A13476B-BE88-43CF-8796-9E97146DFDA0}" type="slidenum">
+              <a:rPr lang="en-US" smtClean="0"/>
+              <a:pPr>
+                <a:defRPr/>
+              </a:pPr>
+              <a:t>25</a:t>
+            </a:fld>
+            <a:endParaRPr lang="en-US"/>
+          </a:p>
+        </p:txBody>
+      </p:sp>
+    </p:spTree>
+    <p:extLst>
+      <p:ext uri="{BB962C8B-B14F-4D97-AF65-F5344CB8AC3E}">
+        <p14:creationId xmlns:p14="http://schemas.microsoft.com/office/powerpoint/2010/main" val="3389556460"/>
+      </p:ext>
+    </p:extLst>
+  </p:cSld>
+  <p:clrMapOvr>
+    <a:masterClrMapping/>
+  </p:clrMapOvr>
+</p:notes>
+</file>
+
+<file path=ppt/notesSlides/notesSlide21.xml><?xml version="1.0" encoding="utf-8"?>
 <p:notes xmlns:a="http://schemas.openxmlformats.org/drawingml/2006/main" xmlns:r="http://schemas.openxmlformats.org/officeDocument/2006/relationships" xmlns:p="http://schemas.openxmlformats.org/presentationml/2006/main">
   <p:cSld>
     <p:spTree>
@@ -7306,15 +7402,7 @@
             </a:r>
             <a:r>
               <a:rPr lang="en-US" sz="2400" dirty="0" smtClean="0"/>
-              <a:t>(1, </a:t>
-            </a:r>
-            <a:r>
-              <a:rPr lang="en-US" sz="2400" dirty="0" smtClean="0"/>
-              <a:t>1000 - </a:t>
-            </a:r>
-            <a:r>
-              <a:rPr lang="en-US" sz="2400" dirty="0" smtClean="0"/>
-              <a:t>1)</a:t>
+              <a:t>(1, 1000 - 1)</a:t>
             </a:r>
           </a:p>
           <a:p>
@@ -7343,15 +7431,7 @@
             </a:r>
             <a:r>
               <a:rPr lang="en-US" sz="2400" dirty="0" smtClean="0"/>
-              <a:t> % </a:t>
-            </a:r>
-            <a:r>
-              <a:rPr lang="en-US" sz="2400" dirty="0" smtClean="0"/>
-              <a:t>3 </a:t>
-            </a:r>
-            <a:r>
-              <a:rPr lang="en-US" sz="2400" dirty="0" smtClean="0"/>
-              <a:t>== 0 || </a:t>
+              <a:t> % 3 == 0 || </a:t>
             </a:r>
             <a:r>
               <a:rPr lang="en-US" sz="2400" dirty="0" err="1" smtClean="0"/>
@@ -7359,15 +7439,7 @@
             </a:r>
             <a:r>
               <a:rPr lang="en-US" sz="2400" dirty="0" smtClean="0"/>
-              <a:t> % </a:t>
-            </a:r>
-            <a:r>
-              <a:rPr lang="en-US" sz="2400" dirty="0" smtClean="0"/>
-              <a:t>5 </a:t>
-            </a:r>
-            <a:r>
-              <a:rPr lang="en-US" sz="2400" dirty="0" smtClean="0"/>
-              <a:t>== 0)</a:t>
+              <a:t> % 5 == 0)</a:t>
             </a:r>
           </a:p>
           <a:p>
@@ -7606,7 +7678,7 @@
             <p:ph idx="1"/>
             <p:extLst>
               <p:ext uri="{D42A27DB-BD31-4B8C-83A1-F6EECF244321}">
-                <p14:modId xmlns:p14="http://schemas.microsoft.com/office/powerpoint/2010/main" val="32421434"/>
+                <p14:modId xmlns:p14="http://schemas.microsoft.com/office/powerpoint/2010/main" val="2316459841"/>
               </p:ext>
             </p:extLst>
           </p:nvPr>
@@ -7842,7 +7914,7 @@
                             <a:srgbClr val="FFFF00"/>
                           </a:solidFill>
                         </a:rPr>
-                        <a:t>4.1</a:t>
+                        <a:t>3.9</a:t>
                       </a:r>
                       <a:endParaRPr lang="en-US" dirty="0">
                         <a:ln>
@@ -7977,7 +8049,7 @@
                             <a:srgbClr val="FFFF00"/>
                           </a:solidFill>
                         </a:rPr>
-                        <a:t>14.8</a:t>
+                        <a:t>14.9</a:t>
                       </a:r>
                       <a:endParaRPr lang="en-US" dirty="0">
                         <a:ln>
@@ -8329,21 +8401,26 @@
               <a:buNone/>
             </a:pPr>
             <a:r>
-              <a:rPr lang="en-US" sz="2400" dirty="0" err="1" smtClean="0"/>
-              <a:t>struct</a:t>
-            </a:r>
-            <a:r>
               <a:rPr lang="en-US" sz="2400" dirty="0" smtClean="0"/>
+              <a:t>static </a:t>
+            </a:r>
+            <a:r>
+              <a:rPr lang="en-US" sz="2400" dirty="0" err="1"/>
+              <a:t>int</a:t>
+            </a:r>
+            <a:r>
+              <a:rPr lang="en-US" sz="2400" dirty="0"/>
               <a:t> </a:t>
             </a:r>
             <a:r>
+              <a:rPr lang="en-US" sz="2400" dirty="0" err="1"/>
+              <a:t>FilterImperative</a:t>
+            </a:r>
+            <a:r>
               <a:rPr lang="en-US" sz="2400" dirty="0" smtClean="0"/>
-              <a:t>IsMultipleOf3Or5 </a:t>
-            </a:r>
-            <a:r>
-              <a:rPr lang="en-US" sz="2400" dirty="0"/>
-              <a:t>{</a:t>
-            </a:r>
+              <a:t>() {</a:t>
+            </a:r>
+            <a:endParaRPr lang="en-US" sz="2400" dirty="0"/>
           </a:p>
           <a:p>
             <a:pPr marL="0" indent="0">
@@ -8351,51 +8428,7 @@
             </a:pPr>
             <a:r>
               <a:rPr lang="en-US" sz="2400" dirty="0"/>
-              <a:t>  </a:t>
-            </a:r>
-            <a:r>
-              <a:rPr lang="en-US" sz="2400" dirty="0" err="1"/>
-              <a:t>bool</a:t>
-            </a:r>
-            <a:r>
-              <a:rPr lang="en-US" sz="2400" dirty="0"/>
-              <a:t> operator()(</a:t>
-            </a:r>
-            <a:r>
-              <a:rPr lang="en-US" sz="2400" dirty="0" err="1"/>
-              <a:t>int</a:t>
-            </a:r>
-            <a:r>
-              <a:rPr lang="en-US" sz="2400" dirty="0"/>
-              <a:t> </a:t>
-            </a:r>
-            <a:r>
-              <a:rPr lang="en-US" sz="2400" dirty="0" err="1"/>
-              <a:t>const</a:t>
-            </a:r>
-            <a:r>
-              <a:rPr lang="en-US" sz="2400" dirty="0"/>
-              <a:t> </a:t>
-            </a:r>
-            <a:r>
-              <a:rPr lang="en-US" sz="2400" dirty="0" err="1" smtClean="0"/>
-              <a:t>i</a:t>
-            </a:r>
-            <a:r>
-              <a:rPr lang="en-US" sz="2400" dirty="0" smtClean="0"/>
-              <a:t>) </a:t>
-            </a:r>
-            <a:r>
-              <a:rPr lang="en-US" sz="2400" dirty="0" err="1"/>
-              <a:t>const</a:t>
-            </a:r>
-            <a:r>
-              <a:rPr lang="en-US" sz="2400" dirty="0"/>
-              <a:t> </a:t>
-            </a:r>
-            <a:r>
-              <a:rPr lang="en-US" sz="2400" dirty="0" smtClean="0"/>
-              <a:t>{</a:t>
+              <a:t>  auto sum = 0;</a:t>
             </a:r>
           </a:p>
           <a:p>
@@ -8403,70 +8436,69 @@
               <a:buNone/>
             </a:pPr>
             <a:r>
+              <a:rPr lang="en-US" sz="2400" dirty="0"/>
+              <a:t>  for (auto </a:t>
+            </a:r>
+            <a:r>
+              <a:rPr lang="en-US" sz="2400" dirty="0" err="1"/>
+              <a:t>i</a:t>
+            </a:r>
+            <a:r>
+              <a:rPr lang="en-US" sz="2400" dirty="0"/>
+              <a:t> = 1; </a:t>
+            </a:r>
+            <a:r>
+              <a:rPr lang="en-US" sz="2400" dirty="0" err="1"/>
+              <a:t>i</a:t>
+            </a:r>
+            <a:r>
+              <a:rPr lang="en-US" sz="2400" dirty="0"/>
+              <a:t> &lt; </a:t>
+            </a:r>
+            <a:r>
               <a:rPr lang="en-US" sz="2400" dirty="0" smtClean="0"/>
-              <a:t>    return </a:t>
-            </a:r>
-            <a:r>
-              <a:rPr lang="en-US" sz="2400" dirty="0" err="1" smtClean="0"/>
+              <a:t>1000; </a:t>
+            </a:r>
+            <a:r>
+              <a:rPr lang="en-US" sz="2400" dirty="0"/>
+              <a:t>++</a:t>
+            </a:r>
+            <a:r>
+              <a:rPr lang="en-US" sz="2400" dirty="0" err="1"/>
               <a:t>i</a:t>
             </a:r>
             <a:r>
-              <a:rPr lang="en-US" sz="2400" dirty="0" smtClean="0"/>
-              <a:t> </a:t>
-            </a:r>
-            <a:r>
               <a:rPr lang="en-US" sz="2400" dirty="0"/>
-              <a:t>% </a:t>
-            </a:r>
-            <a:r>
-              <a:rPr lang="en-US" sz="2400" dirty="0" smtClean="0"/>
-              <a:t>3 </a:t>
-            </a:r>
-            <a:r>
-              <a:rPr lang="en-US" sz="2400" dirty="0"/>
-              <a:t>== </a:t>
-            </a:r>
-            <a:r>
-              <a:rPr lang="en-US" sz="2400" dirty="0" smtClean="0"/>
-              <a:t>0 || </a:t>
-            </a:r>
-            <a:r>
-              <a:rPr lang="en-US" sz="2400" dirty="0" err="1" smtClean="0"/>
-              <a:t>i</a:t>
-            </a:r>
-            <a:r>
-              <a:rPr lang="en-US" sz="2400" dirty="0" smtClean="0"/>
-              <a:t> % 5 == 0; } };</a:t>
-            </a:r>
-            <a:endParaRPr lang="en-US" sz="2400" dirty="0"/>
+              <a:t>)</a:t>
+            </a:r>
           </a:p>
           <a:p>
             <a:pPr marL="0" indent="0">
               <a:buNone/>
             </a:pPr>
             <a:r>
+              <a:rPr lang="en-US" sz="2400" dirty="0"/>
+              <a:t>    if </a:t>
+            </a:r>
+            <a:r>
               <a:rPr lang="en-US" sz="2400" dirty="0" smtClean="0"/>
-              <a:t>static </a:t>
-            </a:r>
-            <a:r>
-              <a:rPr lang="en-US" sz="2400" dirty="0" err="1"/>
-              <a:t>int</a:t>
-            </a:r>
-            <a:r>
-              <a:rPr lang="en-US" sz="2400" dirty="0"/>
-              <a:t> </a:t>
-            </a:r>
-            <a:r>
-              <a:rPr lang="en-US" sz="2400" dirty="0" err="1"/>
-              <a:t>FilterImperative</a:t>
+              <a:t>(</a:t>
+            </a:r>
+            <a:r>
+              <a:rPr lang="en-US" sz="2400" dirty="0" err="1" smtClean="0"/>
+              <a:t>i</a:t>
             </a:r>
             <a:r>
               <a:rPr lang="en-US" sz="2400" dirty="0" smtClean="0"/>
-              <a:t>() </a:t>
+              <a:t> % 3 == 0 || </a:t>
+            </a:r>
+            <a:r>
+              <a:rPr lang="en-US" sz="2400" dirty="0" err="1" smtClean="0"/>
+              <a:t>i</a:t>
             </a:r>
             <a:r>
               <a:rPr lang="en-US" sz="2400" dirty="0" smtClean="0"/>
-              <a:t>{</a:t>
+              <a:t> % 5 == 0)</a:t>
             </a:r>
             <a:endParaRPr lang="en-US" sz="2400" dirty="0"/>
           </a:p>
@@ -8476,7 +8508,15 @@
             </a:pPr>
             <a:r>
               <a:rPr lang="en-US" sz="2400" dirty="0"/>
-              <a:t>  auto sum = 0;</a:t>
+              <a:t>      sum += </a:t>
+            </a:r>
+            <a:r>
+              <a:rPr lang="en-US" sz="2400" dirty="0" err="1"/>
+              <a:t>i</a:t>
+            </a:r>
+            <a:r>
+              <a:rPr lang="en-US" sz="2400" dirty="0"/>
+              <a:t>;</a:t>
             </a:r>
           </a:p>
           <a:p>
@@ -8485,39 +8525,11 @@
             </a:pPr>
             <a:r>
               <a:rPr lang="en-US" sz="2400" dirty="0"/>
-              <a:t>  for (auto </a:t>
-            </a:r>
-            <a:r>
-              <a:rPr lang="en-US" sz="2400" dirty="0" err="1"/>
-              <a:t>i</a:t>
-            </a:r>
-            <a:r>
-              <a:rPr lang="en-US" sz="2400" dirty="0"/>
-              <a:t> = 1; </a:t>
-            </a:r>
-            <a:r>
-              <a:rPr lang="en-US" sz="2400" dirty="0" err="1"/>
-              <a:t>i</a:t>
-            </a:r>
-            <a:r>
-              <a:rPr lang="en-US" sz="2400" dirty="0"/>
-              <a:t> &lt; </a:t>
+              <a:t>  return sum</a:t>
             </a:r>
             <a:r>
               <a:rPr lang="en-US" sz="2400" dirty="0" smtClean="0"/>
-              <a:t>1000; </a:t>
-            </a:r>
-            <a:r>
-              <a:rPr lang="en-US" sz="2400" dirty="0"/>
-              <a:t>++</a:t>
-            </a:r>
-            <a:r>
-              <a:rPr lang="en-US" sz="2400" dirty="0" err="1"/>
-              <a:t>i</a:t>
-            </a:r>
-            <a:r>
-              <a:rPr lang="en-US" sz="2400" dirty="0"/>
-              <a:t>)</a:t>
+              <a:t>;</a:t>
             </a:r>
           </a:p>
           <a:p>
@@ -8525,51 +8537,12 @@
               <a:buNone/>
             </a:pPr>
             <a:r>
-              <a:rPr lang="en-US" sz="2400" dirty="0"/>
-              <a:t>    if (</a:t>
-            </a:r>
-            <a:r>
               <a:rPr lang="en-US" sz="2400" dirty="0" smtClean="0"/>
-              <a:t>IsMultipleOf3Or5()(</a:t>
-            </a:r>
-            <a:r>
-              <a:rPr lang="en-US" sz="2400" dirty="0" err="1" smtClean="0"/>
-              <a:t>i</a:t>
+              <a:t> </a:t>
             </a:r>
             <a:r>
               <a:rPr lang="en-US" sz="2400" dirty="0" smtClean="0"/>
-              <a:t>))</a:t>
-            </a:r>
-            <a:endParaRPr lang="en-US" sz="2400" dirty="0"/>
-          </a:p>
-          <a:p>
-            <a:pPr marL="0" indent="0">
-              <a:buNone/>
-            </a:pPr>
-            <a:r>
-              <a:rPr lang="en-US" sz="2400" dirty="0"/>
-              <a:t>      sum += </a:t>
-            </a:r>
-            <a:r>
-              <a:rPr lang="en-US" sz="2400" dirty="0" err="1"/>
-              <a:t>i</a:t>
-            </a:r>
-            <a:r>
-              <a:rPr lang="en-US" sz="2400" dirty="0"/>
-              <a:t>;</a:t>
-            </a:r>
-          </a:p>
-          <a:p>
-            <a:pPr marL="0" indent="0">
-              <a:buNone/>
-            </a:pPr>
-            <a:r>
-              <a:rPr lang="en-US" sz="2400" dirty="0"/>
-              <a:t>  return sum</a:t>
-            </a:r>
-            <a:r>
-              <a:rPr lang="en-US" sz="2400" dirty="0" smtClean="0"/>
-              <a:t>; }</a:t>
+              <a:t>}</a:t>
             </a:r>
             <a:endParaRPr lang="en-US" sz="2400" dirty="0"/>
           </a:p>
@@ -8809,63 +8782,79 @@
               <a:buNone/>
             </a:pPr>
             <a:r>
+              <a:rPr lang="en-US" sz="2400" dirty="0" err="1" smtClean="0"/>
+              <a:t>struct</a:t>
+            </a:r>
+            <a:r>
+              <a:rPr lang="en-US" sz="2400" dirty="0" smtClean="0"/>
+              <a:t> </a:t>
+            </a:r>
+            <a:r>
               <a:rPr lang="en-US" sz="2400" dirty="0"/>
-              <a:t>static </a:t>
-            </a:r>
-            <a:r>
-              <a:rPr lang="en-US" sz="2400" dirty="0" err="1"/>
-              <a:t>int</a:t>
-            </a:r>
-            <a:r>
-              <a:rPr lang="en-US" sz="2400" dirty="0"/>
-              <a:t> </a:t>
-            </a:r>
-            <a:r>
-              <a:rPr lang="en-US" sz="2400" dirty="0" err="1" smtClean="0"/>
-              <a:t>FilterFunctional</a:t>
-            </a:r>
-            <a:r>
-              <a:rPr lang="en-US" sz="2400" dirty="0" smtClean="0"/>
-              <a:t>() </a:t>
-            </a:r>
-            <a:r>
-              <a:rPr lang="en-US" sz="2400" dirty="0" smtClean="0"/>
-              <a:t>{</a:t>
-            </a:r>
-            <a:endParaRPr lang="en-US" sz="2400" dirty="0"/>
+              <a:t>IsMultipleOf3Or5 {</a:t>
+            </a:r>
           </a:p>
           <a:p>
             <a:pPr marL="0" indent="0">
               <a:buNone/>
             </a:pPr>
             <a:r>
+              <a:rPr lang="en-US" sz="2400" dirty="0"/>
+              <a:t>    </a:t>
+            </a:r>
+            <a:r>
+              <a:rPr lang="en-US" sz="2400" dirty="0" err="1"/>
+              <a:t>bool</a:t>
+            </a:r>
+            <a:r>
+              <a:rPr lang="en-US" sz="2400" dirty="0"/>
+              <a:t> operator()(</a:t>
+            </a:r>
+            <a:r>
+              <a:rPr lang="en-US" sz="2400" dirty="0" err="1"/>
+              <a:t>int</a:t>
+            </a:r>
+            <a:r>
+              <a:rPr lang="en-US" sz="2400" dirty="0"/>
+              <a:t> </a:t>
+            </a:r>
+            <a:r>
+              <a:rPr lang="en-US" sz="2400" dirty="0" err="1" smtClean="0"/>
+              <a:t>i</a:t>
+            </a:r>
+            <a:r>
+              <a:rPr lang="en-US" sz="2400" dirty="0"/>
+              <a:t>) </a:t>
+            </a:r>
+            <a:r>
+              <a:rPr lang="en-US" sz="2400" dirty="0" err="1"/>
+              <a:t>const</a:t>
+            </a:r>
+            <a:r>
+              <a:rPr lang="en-US" sz="2400" dirty="0"/>
+              <a:t> { return </a:t>
+            </a:r>
+            <a:r>
+              <a:rPr lang="en-US" sz="2400" dirty="0" err="1"/>
+              <a:t>i</a:t>
+            </a:r>
+            <a:r>
+              <a:rPr lang="en-US" sz="2400" dirty="0"/>
+              <a:t> % 3 == 0 || </a:t>
+            </a:r>
+            <a:r>
+              <a:rPr lang="en-US" sz="2400" dirty="0" err="1"/>
+              <a:t>i</a:t>
+            </a:r>
+            <a:r>
+              <a:rPr lang="en-US" sz="2400" dirty="0"/>
+              <a:t> % 5 == 0; </a:t>
+            </a:r>
+            <a:r>
               <a:rPr lang="en-US" sz="2400" dirty="0" smtClean="0"/>
-              <a:t>return </a:t>
-            </a:r>
-            <a:r>
-              <a:rPr lang="en-US" sz="2400" dirty="0"/>
-              <a:t>boost::accumulate(boost::</a:t>
-            </a:r>
-            <a:r>
-              <a:rPr lang="en-US" sz="2400" dirty="0" err="1"/>
-              <a:t>irange</a:t>
-            </a:r>
-            <a:r>
-              <a:rPr lang="en-US" sz="2400" dirty="0"/>
-              <a:t>(1, </a:t>
-            </a:r>
-            <a:r>
-              <a:rPr lang="en-US" sz="2400" dirty="0" smtClean="0"/>
-              <a:t>1000</a:t>
-            </a:r>
-            <a:r>
-              <a:rPr lang="en-US" sz="2400" dirty="0" smtClean="0"/>
-              <a:t>) </a:t>
-            </a:r>
-            <a:r>
-              <a:rPr lang="en-US" sz="2400" dirty="0" smtClean="0"/>
-              <a:t>|</a:t>
-            </a:r>
+              <a:t>} };</a:t>
+            </a:r>
+            <a:endParaRPr lang="en-US" sz="2400" dirty="0"/>
           </a:p>
           <a:p>
             <a:pPr marL="0" indent="0">
@@ -8873,32 +8862,74 @@
             </a:pPr>
             <a:r>
               <a:rPr lang="en-US" sz="2400" dirty="0"/>
+              <a:t>static </a:t>
+            </a:r>
+            <a:r>
+              <a:rPr lang="en-US" sz="2400" dirty="0" err="1"/>
+              <a:t>int</a:t>
+            </a:r>
+            <a:r>
+              <a:rPr lang="en-US" sz="2400" dirty="0"/>
               <a:t> </a:t>
             </a:r>
             <a:r>
+              <a:rPr lang="en-US" sz="2400" dirty="0" err="1"/>
+              <a:t>FilterFunctional</a:t>
+            </a:r>
+            <a:r>
               <a:rPr lang="en-US" sz="2400" dirty="0" smtClean="0"/>
-              <a:t>   boost</a:t>
-            </a:r>
-            <a:r>
-              <a:rPr lang="en-US" sz="2400" dirty="0"/>
-              <a:t>::adaptors::</a:t>
-            </a:r>
-            <a:r>
-              <a:rPr lang="en-US" sz="2400" dirty="0" smtClean="0"/>
-              <a:t>filtered(IsMultipleOf3Or5()), </a:t>
-            </a:r>
-            <a:r>
-              <a:rPr lang="en-US" sz="2400" dirty="0"/>
-              <a:t>0);</a:t>
-            </a:r>
+              <a:t>() {</a:t>
+            </a:r>
+            <a:endParaRPr lang="en-US" sz="2400" dirty="0"/>
           </a:p>
           <a:p>
             <a:pPr marL="0" indent="0">
               <a:buNone/>
             </a:pPr>
             <a:r>
+              <a:rPr lang="en-US" sz="2400" dirty="0"/>
+              <a:t>  return ranges::accumulate(ranges::view::</a:t>
+            </a:r>
+            <a:r>
+              <a:rPr lang="en-US" sz="2400" dirty="0" err="1"/>
+              <a:t>ints</a:t>
+            </a:r>
+            <a:r>
+              <a:rPr lang="en-US" sz="2400" dirty="0"/>
+              <a:t>(1, 999) </a:t>
+            </a:r>
+            <a:r>
               <a:rPr lang="en-US" sz="2400" dirty="0" smtClean="0"/>
-              <a:t>}</a:t>
+              <a:t>|</a:t>
+            </a:r>
+          </a:p>
+          <a:p>
+            <a:pPr marL="0" indent="0">
+              <a:buNone/>
+            </a:pPr>
+            <a:r>
+              <a:rPr lang="en-US" sz="2400" dirty="0" smtClean="0"/>
+              <a:t>    ranges</a:t>
+            </a:r>
+            <a:r>
+              <a:rPr lang="en-US" sz="2400" dirty="0"/>
+              <a:t>::view::filter(IsMultipleOf3Or5()), 0</a:t>
+            </a:r>
+            <a:r>
+              <a:rPr lang="en-US" sz="2400" dirty="0" smtClean="0"/>
+              <a:t>); }</a:t>
+            </a:r>
+          </a:p>
+          <a:p>
+            <a:pPr marL="0" indent="0">
+              <a:buNone/>
+            </a:pPr>
+            <a:endParaRPr lang="en-US" sz="2400" dirty="0"/>
+          </a:p>
+          <a:p>
+            <a:r>
+              <a:rPr lang="en-US" sz="2400" dirty="0"/>
+              <a:t>https://github.com/ericniebler/range-v3</a:t>
             </a:r>
           </a:p>
           <a:p>
@@ -8912,11 +8943,15 @@
             </a:r>
             <a:r>
               <a:rPr lang="en-US" sz="2400" dirty="0" smtClean="0"/>
-              <a:t>= boost::</a:t>
+              <a:t>= </a:t>
+            </a:r>
+            <a:r>
+              <a:rPr lang="en-US" sz="2400" dirty="0" smtClean="0"/>
+              <a:t>ranges::view::</a:t>
             </a:r>
             <a:r>
               <a:rPr lang="en-US" sz="2400" dirty="0" err="1" smtClean="0"/>
-              <a:t>irange</a:t>
+              <a:t>ints</a:t>
             </a:r>
             <a:endParaRPr lang="en-US" sz="2400" dirty="0" smtClean="0"/>
           </a:p>
@@ -8927,8 +8962,13 @@
             </a:r>
             <a:r>
               <a:rPr lang="en-US" sz="2400" dirty="0" smtClean="0"/>
-              <a:t> = boost::adaptors::filtered</a:t>
-            </a:r>
+              <a:t> = </a:t>
+            </a:r>
+            <a:r>
+              <a:rPr lang="en-US" sz="2400" dirty="0" smtClean="0"/>
+              <a:t>ranges::view::filter</a:t>
+            </a:r>
+            <a:endParaRPr lang="en-US" sz="2400" dirty="0" smtClean="0"/>
           </a:p>
           <a:p>
             <a:r>
@@ -8937,9 +8977,12 @@
             </a:r>
             <a:r>
               <a:rPr lang="en-US" sz="2400" dirty="0" smtClean="0"/>
-              <a:t> = boost::accumulate</a:t>
-            </a:r>
-            <a:endParaRPr lang="en-US" sz="2400" dirty="0"/>
+              <a:t> = </a:t>
+            </a:r>
+            <a:r>
+              <a:rPr lang="en-US" sz="2400" dirty="0" smtClean="0"/>
+              <a:t>ranges::accumulate</a:t>
+            </a:r>
           </a:p>
         </p:txBody>
       </p:sp>
@@ -9157,7 +9200,7 @@
             <p:ph idx="1"/>
             <p:extLst>
               <p:ext uri="{D42A27DB-BD31-4B8C-83A1-F6EECF244321}">
-                <p14:modId xmlns:p14="http://schemas.microsoft.com/office/powerpoint/2010/main" val="1099940442"/>
+                <p14:modId xmlns:p14="http://schemas.microsoft.com/office/powerpoint/2010/main" val="2877353835"/>
               </p:ext>
             </p:extLst>
           </p:nvPr>
@@ -9461,7 +9504,7 @@
                             <a:srgbClr val="FFFF00"/>
                           </a:solidFill>
                         </a:rPr>
-                        <a:t>4.1</a:t>
+                        <a:t>3.9</a:t>
                       </a:r>
                       <a:endParaRPr lang="en-US" dirty="0">
                         <a:ln>
@@ -9528,7 +9571,7 @@
                             <a:srgbClr val="FFFF00"/>
                           </a:solidFill>
                         </a:rPr>
-                        <a:t>1.6</a:t>
+                        <a:t>1.7</a:t>
                       </a:r>
                       <a:endParaRPr lang="en-US" dirty="0">
                         <a:ln>
@@ -9663,7 +9706,7 @@
                             <a:srgbClr val="FFFF00"/>
                           </a:solidFill>
                         </a:rPr>
-                        <a:t>14.8</a:t>
+                        <a:t>14.9</a:t>
                       </a:r>
                       <a:endParaRPr lang="en-US" dirty="0">
                         <a:ln>
@@ -9941,7 +9984,7 @@
         <p:spPr>
           <a:xfrm>
             <a:off x="680224" y="2732049"/>
-            <a:ext cx="7861610" cy="2246769"/>
+            <a:ext cx="7861610" cy="1815882"/>
           </a:xfrm>
           <a:prstGeom prst="rect">
             <a:avLst/>
@@ -9966,11 +10009,6 @@
               </a:rPr>
               <a:t>The imperative C++ code is more than 2x faster than the imperative C# code</a:t>
             </a:r>
-            <a:endParaRPr lang="en-US" b="0" dirty="0" smtClean="0">
-              <a:solidFill>
-                <a:srgbClr val="FFFF00"/>
-              </a:solidFill>
-            </a:endParaRPr>
           </a:p>
           <a:p>
             <a:pPr marL="457200" indent="-457200">
@@ -9991,15 +10029,7 @@
                   <a:srgbClr val="FFFF00"/>
                 </a:solidFill>
               </a:rPr>
-              <a:t>less of a performance </a:t>
-            </a:r>
-            <a:r>
-              <a:rPr lang="en-US" b="0" dirty="0" smtClean="0">
-                <a:solidFill>
-                  <a:srgbClr val="FFFF00"/>
-                </a:solidFill>
-              </a:rPr>
-              <a:t>penalty </a:t>
+              <a:t>less of a penalty </a:t>
             </a:r>
             <a:r>
               <a:rPr lang="en-US" b="0" dirty="0" smtClean="0">
@@ -10197,11 +10227,7 @@
             </a:r>
             <a:r>
               <a:rPr lang="en-US" sz="2400" dirty="0" smtClean="0"/>
-              <a:t>() </a:t>
-            </a:r>
-            <a:r>
-              <a:rPr lang="en-US" sz="2400" dirty="0" smtClean="0"/>
-              <a:t>{</a:t>
+              <a:t>() {</a:t>
             </a:r>
             <a:endParaRPr lang="en-US" sz="2400" dirty="0"/>
           </a:p>
@@ -10346,11 +10372,7 @@
             </a:r>
             <a:r>
               <a:rPr lang="nn-NO" sz="2400" dirty="0" smtClean="0"/>
-              <a:t>15</a:t>
-            </a:r>
-            <a:r>
-              <a:rPr lang="nn-NO" sz="2400" dirty="0" smtClean="0"/>
-              <a:t>; </a:t>
+              <a:t>15; </a:t>
             </a:r>
             <a:r>
               <a:rPr lang="nn-NO" sz="2400" dirty="0"/>
@@ -11088,11 +11110,7 @@
             </a:r>
             <a:r>
               <a:rPr lang="en-US" sz="2400" dirty="0" smtClean="0"/>
-              <a:t>x) </a:t>
-            </a:r>
-            <a:r>
-              <a:rPr lang="en-US" sz="2400" dirty="0" smtClean="0"/>
-              <a:t>{</a:t>
+              <a:t>x) {</a:t>
             </a:r>
             <a:endParaRPr lang="en-US" sz="2400" dirty="0"/>
           </a:p>
@@ -11110,11 +11128,7 @@
             </a:r>
             <a:r>
               <a:rPr lang="nn-NO" sz="2400" dirty="0" smtClean="0"/>
-              <a:t>1000</a:t>
-            </a:r>
-            <a:r>
-              <a:rPr lang="nn-NO" sz="2400" dirty="0" smtClean="0"/>
-              <a:t>; </a:t>
+              <a:t>1000; </a:t>
             </a:r>
             <a:r>
               <a:rPr lang="nn-NO" sz="2400" dirty="0"/>
@@ -11487,11 +11501,7 @@
             </a:r>
             <a:r>
               <a:rPr lang="en-US" sz="2400" dirty="0" smtClean="0"/>
-              <a:t>() </a:t>
-            </a:r>
-            <a:r>
-              <a:rPr lang="en-US" sz="2400" dirty="0" smtClean="0"/>
-              <a:t>{</a:t>
+              <a:t>() {</a:t>
             </a:r>
             <a:endParaRPr lang="en-US" sz="2400" dirty="0"/>
           </a:p>
@@ -12018,7 +12028,7 @@
       </p:grpSpPr>
       <p:sp>
         <p:nvSpPr>
-          <p:cNvPr id="2" name="Title 1"/>
+          <p:cNvPr id="6146" name="Title 1"/>
           <p:cNvSpPr>
             <a:spLocks noGrp="1"/>
           </p:cNvSpPr>
@@ -12033,15 +12043,15 @@
           <a:p>
             <a:r>
               <a:rPr lang="en-US" dirty="0" smtClean="0"/>
-              <a:t>Functional C++</a:t>
-            </a:r>
-            <a:endParaRPr lang="en-US" dirty="0"/>
+              <a:t>Range Façade = Iterator Method</a:t>
+            </a:r>
+            <a:endParaRPr lang="en-US" dirty="0" smtClean="0"/>
           </a:p>
         </p:txBody>
       </p:sp>
       <p:sp>
         <p:nvSpPr>
-          <p:cNvPr id="3" name="Content Placeholder 2"/>
+          <p:cNvPr id="6147" name="Content Placeholder 2"/>
           <p:cNvSpPr>
             <a:spLocks noGrp="1"/>
           </p:cNvSpPr>
@@ -12051,8 +12061,8 @@
         </p:nvSpPr>
         <p:spPr>
           <a:xfrm>
-            <a:off x="0" y="1219200"/>
-            <a:ext cx="9144000" cy="4929188"/>
+            <a:off x="0" y="1085385"/>
+            <a:ext cx="9144000" cy="5215054"/>
           </a:xfrm>
         </p:spPr>
         <p:txBody>
@@ -12063,38 +12073,102 @@
               <a:buNone/>
             </a:pPr>
             <a:r>
-              <a:rPr lang="en-US" dirty="0"/>
-              <a:t>// Generate multiples of x up to but not including </a:t>
-            </a:r>
-            <a:r>
-              <a:rPr lang="en-US" dirty="0" smtClean="0"/>
-              <a:t>1000</a:t>
-            </a:r>
-            <a:endParaRPr lang="en-US" dirty="0"/>
+              <a:rPr lang="en-US" sz="2400" dirty="0" err="1"/>
+              <a:t>struct</a:t>
+            </a:r>
+            <a:r>
+              <a:rPr lang="en-US" sz="2400" dirty="0"/>
+              <a:t> </a:t>
+            </a:r>
+            <a:r>
+              <a:rPr lang="en-US" sz="2400" dirty="0" err="1"/>
+              <a:t>strided_range</a:t>
+            </a:r>
+            <a:r>
+              <a:rPr lang="en-US" sz="2400" dirty="0"/>
+              <a:t> : public </a:t>
+            </a:r>
+            <a:r>
+              <a:rPr lang="en-US" sz="2400" dirty="0" smtClean="0"/>
+              <a:t>ranges</a:t>
+            </a:r>
+            <a:r>
+              <a:rPr lang="en-US" sz="2400" dirty="0"/>
+              <a:t>::</a:t>
+            </a:r>
+            <a:r>
+              <a:rPr lang="en-US" sz="2400" dirty="0" err="1"/>
+              <a:t>range_facade</a:t>
+            </a:r>
+            <a:r>
+              <a:rPr lang="en-US" sz="2400" dirty="0"/>
+              <a:t>&lt;</a:t>
+            </a:r>
+            <a:r>
+              <a:rPr lang="en-US" sz="2400" dirty="0" err="1"/>
+              <a:t>strided_range</a:t>
+            </a:r>
+            <a:r>
+              <a:rPr lang="en-US" sz="2400" dirty="0" smtClean="0"/>
+              <a:t>&gt; {</a:t>
+            </a:r>
+            <a:endParaRPr lang="en-US" sz="2400" dirty="0"/>
           </a:p>
           <a:p>
             <a:pPr marL="0" indent="0">
               <a:buNone/>
             </a:pPr>
             <a:r>
-              <a:rPr lang="en-US" dirty="0"/>
-              <a:t>static boost::</a:t>
-            </a:r>
-            <a:r>
-              <a:rPr lang="en-US" dirty="0" err="1"/>
-              <a:t>strided_integer_range</a:t>
-            </a:r>
-            <a:r>
-              <a:rPr lang="en-US" dirty="0"/>
-              <a:t>&lt;</a:t>
-            </a:r>
-            <a:r>
-              <a:rPr lang="en-US" dirty="0" err="1"/>
+              <a:rPr lang="en-US" sz="2400" dirty="0" smtClean="0"/>
+              <a:t>  </a:t>
+            </a:r>
+            <a:r>
+              <a:rPr lang="en-US" sz="2400" dirty="0" err="1" smtClean="0"/>
+              <a:t>strided_range</a:t>
+            </a:r>
+            <a:r>
+              <a:rPr lang="en-US" sz="2400" dirty="0" smtClean="0"/>
+              <a:t>(</a:t>
+            </a:r>
+            <a:r>
+              <a:rPr lang="en-US" sz="2400" dirty="0" err="1" smtClean="0"/>
               <a:t>int</a:t>
             </a:r>
             <a:r>
-              <a:rPr lang="en-US" dirty="0" smtClean="0"/>
-              <a:t>&gt;</a:t>
+              <a:rPr lang="en-US" sz="2400" dirty="0" smtClean="0"/>
+              <a:t> </a:t>
+            </a:r>
+            <a:r>
+              <a:rPr lang="en-US" sz="2400" dirty="0"/>
+              <a:t>first, </a:t>
+            </a:r>
+            <a:r>
+              <a:rPr lang="en-US" sz="2400" dirty="0" err="1"/>
+              <a:t>int</a:t>
+            </a:r>
+            <a:r>
+              <a:rPr lang="en-US" sz="2400" dirty="0"/>
+              <a:t> last, </a:t>
+            </a:r>
+            <a:r>
+              <a:rPr lang="en-US" sz="2400" dirty="0" err="1"/>
+              <a:t>int</a:t>
+            </a:r>
+            <a:r>
+              <a:rPr lang="en-US" sz="2400" dirty="0"/>
+              <a:t> </a:t>
+            </a:r>
+            <a:r>
+              <a:rPr lang="en-US" sz="2400" dirty="0" err="1"/>
+              <a:t>step_size</a:t>
+            </a:r>
+            <a:r>
+              <a:rPr lang="en-US" sz="2400" dirty="0"/>
+              <a:t>) </a:t>
+            </a:r>
+            <a:r>
+              <a:rPr lang="en-US" sz="2400" dirty="0" smtClean="0"/>
+              <a:t>:</a:t>
             </a:r>
           </a:p>
           <a:p>
@@ -12102,54 +12176,53 @@
               <a:buNone/>
             </a:pPr>
             <a:r>
-              <a:rPr lang="en-US" dirty="0" err="1" smtClean="0"/>
-              <a:t>MultiplesOf</a:t>
-            </a:r>
-            <a:r>
-              <a:rPr lang="en-US" dirty="0" smtClean="0"/>
+              <a:rPr lang="en-US" sz="2400" dirty="0"/>
+              <a:t> </a:t>
+            </a:r>
+            <a:r>
+              <a:rPr lang="en-US" sz="2400" dirty="0" smtClean="0"/>
+              <a:t>   first(first</a:t>
+            </a:r>
+            <a:r>
+              <a:rPr lang="en-US" sz="2400" dirty="0"/>
+              <a:t>), last(last), </a:t>
+            </a:r>
+            <a:r>
+              <a:rPr lang="en-US" sz="2400" dirty="0" err="1"/>
+              <a:t>step_size</a:t>
+            </a:r>
+            <a:r>
+              <a:rPr lang="en-US" sz="2400" dirty="0"/>
               <a:t>(</a:t>
             </a:r>
             <a:r>
-              <a:rPr lang="en-US" dirty="0" err="1" smtClean="0"/>
-              <a:t>int</a:t>
-            </a:r>
-            <a:r>
-              <a:rPr lang="en-US" dirty="0" smtClean="0"/>
-              <a:t> </a:t>
-            </a:r>
-            <a:r>
-              <a:rPr lang="en-US" dirty="0" smtClean="0"/>
-              <a:t>x) </a:t>
-            </a:r>
-            <a:r>
-              <a:rPr lang="en-US" dirty="0" smtClean="0"/>
-              <a:t>{</a:t>
-            </a:r>
-            <a:endParaRPr lang="en-US" dirty="0"/>
+              <a:rPr lang="en-US" sz="2400" dirty="0" err="1"/>
+              <a:t>step_size</a:t>
+            </a:r>
+            <a:r>
+              <a:rPr lang="en-US" sz="2400" dirty="0"/>
+              <a:t>) {}</a:t>
+            </a:r>
           </a:p>
           <a:p>
             <a:pPr marL="0" indent="0">
               <a:buNone/>
             </a:pPr>
             <a:r>
-              <a:rPr lang="en-US" dirty="0"/>
-              <a:t>  return boost::</a:t>
-            </a:r>
-            <a:r>
-              <a:rPr lang="en-US" dirty="0" err="1"/>
-              <a:t>irange</a:t>
-            </a:r>
-            <a:r>
-              <a:rPr lang="en-US" dirty="0"/>
-              <a:t>(x, </a:t>
-            </a:r>
-            <a:r>
-              <a:rPr lang="en-US" dirty="0" smtClean="0"/>
-              <a:t>1000, </a:t>
-            </a:r>
-            <a:r>
-              <a:rPr lang="en-US" dirty="0"/>
-              <a:t>x);</a:t>
+              <a:rPr lang="en-US" sz="2400" dirty="0" smtClean="0"/>
+              <a:t>  friend </a:t>
+            </a:r>
+            <a:r>
+              <a:rPr lang="en-US" sz="2400" dirty="0"/>
+              <a:t>ranges::</a:t>
+            </a:r>
+            <a:r>
+              <a:rPr lang="en-US" sz="2400" dirty="0" err="1"/>
+              <a:t>range_access</a:t>
+            </a:r>
+            <a:r>
+              <a:rPr lang="en-US" sz="2400" dirty="0"/>
+              <a:t>;</a:t>
             </a:r>
           </a:p>
           <a:p>
@@ -12157,52 +12230,132 @@
               <a:buNone/>
             </a:pPr>
             <a:r>
-              <a:rPr lang="en-US" dirty="0" smtClean="0"/>
-              <a:t>}</a:t>
-            </a:r>
-          </a:p>
-          <a:p>
-            <a:r>
-              <a:rPr lang="en-US" dirty="0" smtClean="0"/>
-              <a:t>boost::</a:t>
-            </a:r>
-            <a:r>
-              <a:rPr lang="en-US" dirty="0" err="1" smtClean="0"/>
-              <a:t>irange</a:t>
-            </a:r>
-            <a:r>
-              <a:rPr lang="en-US" dirty="0" smtClean="0"/>
-              <a:t> allows us to specify a step size, but </a:t>
-            </a:r>
-            <a:r>
-              <a:rPr lang="en-US" dirty="0" err="1" smtClean="0"/>
-              <a:t>Enumerable.Range</a:t>
-            </a:r>
-            <a:r>
-              <a:rPr lang="en-US" dirty="0" smtClean="0"/>
-              <a:t> did not</a:t>
-            </a:r>
-          </a:p>
-          <a:p>
-            <a:r>
-              <a:rPr lang="en-US" dirty="0" smtClean="0"/>
-              <a:t>There is a bug in boost::</a:t>
-            </a:r>
-            <a:r>
-              <a:rPr lang="en-US" dirty="0" err="1" smtClean="0"/>
-              <a:t>irange</a:t>
-            </a:r>
-            <a:r>
-              <a:rPr lang="en-US" dirty="0" smtClean="0"/>
-              <a:t> version 1.50 that’s fixed in some later version</a:t>
-            </a:r>
-            <a:endParaRPr lang="en-US" dirty="0"/>
+              <a:rPr lang="en-US" sz="2400" dirty="0"/>
+              <a:t>  </a:t>
+            </a:r>
+            <a:r>
+              <a:rPr lang="en-US" sz="2400" dirty="0" err="1" smtClean="0"/>
+              <a:t>int</a:t>
+            </a:r>
+            <a:r>
+              <a:rPr lang="en-US" sz="2400" dirty="0" smtClean="0"/>
+              <a:t> </a:t>
+            </a:r>
+            <a:r>
+              <a:rPr lang="en-US" sz="2400" dirty="0" err="1"/>
+              <a:t>const</a:t>
+            </a:r>
+            <a:r>
+              <a:rPr lang="en-US" sz="2400" dirty="0"/>
+              <a:t> &amp; current() </a:t>
+            </a:r>
+            <a:r>
+              <a:rPr lang="en-US" sz="2400" dirty="0" err="1"/>
+              <a:t>const</a:t>
+            </a:r>
+            <a:r>
+              <a:rPr lang="en-US" sz="2400" dirty="0"/>
+              <a:t> { return first; }</a:t>
+            </a:r>
+          </a:p>
+          <a:p>
+            <a:pPr marL="0" indent="0">
+              <a:buNone/>
+            </a:pPr>
+            <a:r>
+              <a:rPr lang="en-US" sz="2400" dirty="0"/>
+              <a:t>  </a:t>
+            </a:r>
+            <a:r>
+              <a:rPr lang="en-US" sz="2400" dirty="0" err="1" smtClean="0"/>
+              <a:t>bool</a:t>
+            </a:r>
+            <a:r>
+              <a:rPr lang="en-US" sz="2400" dirty="0" smtClean="0"/>
+              <a:t> </a:t>
+            </a:r>
+            <a:r>
+              <a:rPr lang="en-US" sz="2400" dirty="0"/>
+              <a:t>done() </a:t>
+            </a:r>
+            <a:r>
+              <a:rPr lang="en-US" sz="2400" dirty="0" err="1"/>
+              <a:t>const</a:t>
+            </a:r>
+            <a:r>
+              <a:rPr lang="en-US" sz="2400" dirty="0"/>
+              <a:t> { return first &gt;= last; }</a:t>
+            </a:r>
+          </a:p>
+          <a:p>
+            <a:pPr marL="0" indent="0">
+              <a:buNone/>
+            </a:pPr>
+            <a:r>
+              <a:rPr lang="en-US" sz="2400" dirty="0"/>
+              <a:t>  </a:t>
+            </a:r>
+            <a:r>
+              <a:rPr lang="en-US" sz="2400" dirty="0" smtClean="0"/>
+              <a:t>void </a:t>
+            </a:r>
+            <a:r>
+              <a:rPr lang="en-US" sz="2400" dirty="0"/>
+              <a:t>next() { first += </a:t>
+            </a:r>
+            <a:r>
+              <a:rPr lang="en-US" sz="2400" dirty="0" err="1"/>
+              <a:t>step_size</a:t>
+            </a:r>
+            <a:r>
+              <a:rPr lang="en-US" sz="2400" dirty="0"/>
+              <a:t>; }</a:t>
+            </a:r>
+          </a:p>
+          <a:p>
+            <a:pPr marL="0" indent="0">
+              <a:buNone/>
+            </a:pPr>
+            <a:r>
+              <a:rPr lang="en-US" sz="2400" dirty="0"/>
+              <a:t>  </a:t>
+            </a:r>
+            <a:r>
+              <a:rPr lang="en-US" sz="2400" dirty="0" err="1" smtClean="0"/>
+              <a:t>int</a:t>
+            </a:r>
+            <a:r>
+              <a:rPr lang="en-US" sz="2400" dirty="0" smtClean="0"/>
+              <a:t> </a:t>
+            </a:r>
+            <a:r>
+              <a:rPr lang="en-US" sz="2400" dirty="0"/>
+              <a:t>first, last, </a:t>
+            </a:r>
+            <a:r>
+              <a:rPr lang="en-US" sz="2400" dirty="0" err="1"/>
+              <a:t>step_size</a:t>
+            </a:r>
+            <a:r>
+              <a:rPr lang="en-US" sz="2400" dirty="0" smtClean="0"/>
+              <a:t>;</a:t>
+            </a:r>
+          </a:p>
+          <a:p>
+            <a:pPr marL="0" indent="0">
+              <a:buNone/>
+            </a:pPr>
+            <a:r>
+              <a:rPr lang="en-US" sz="2400" dirty="0" smtClean="0"/>
+              <a:t> };</a:t>
+            </a:r>
+            <a:endParaRPr lang="en-US" sz="2400" dirty="0"/>
           </a:p>
         </p:txBody>
       </p:sp>
       <p:sp>
         <p:nvSpPr>
-          <p:cNvPr id="4" name="Footer Placeholder 3"/>
+          <p:cNvPr id="6148" name="Footer Placeholder 3"/>
           <p:cNvSpPr>
             <a:spLocks noGrp="1"/>
           </p:cNvSpPr>
@@ -12210,26 +12363,145 @@
             <p:ph type="ftr" sz="quarter" idx="11"/>
           </p:nvPr>
         </p:nvSpPr>
-        <p:spPr/>
+        <p:spPr>
+          <a:noFill/>
+          <a:ln/>
+          <a:extLst>
+            <a:ext uri="{909E8E84-426E-40DD-AFC4-6F175D3DCCD1}">
+              <a14:hiddenFill xmlns:a14="http://schemas.microsoft.com/office/drawing/2010/main">
+                <a:solidFill>
+                  <a:srgbClr val="FFFFFF"/>
+                </a:solidFill>
+              </a14:hiddenFill>
+            </a:ext>
+            <a:ext uri="{91240B29-F687-4F45-9708-019B960494DF}">
+              <a14:hiddenLine xmlns:a14="http://schemas.microsoft.com/office/drawing/2010/main" w="9525">
+                <a:solidFill>
+                  <a:srgbClr val="000000"/>
+                </a:solidFill>
+                <a:miter lim="800000"/>
+                <a:headEnd/>
+                <a:tailEnd/>
+              </a14:hiddenLine>
+            </a:ext>
+          </a:extLst>
+        </p:spPr>
         <p:txBody>
           <a:bodyPr/>
-          <a:lstStyle/>
-          <a:p>
-            <a:pPr>
-              <a:defRPr/>
-            </a:pPr>
-            <a:r>
-              <a:rPr lang="en-US" smtClean="0"/>
+          <a:lstStyle>
+            <a:lvl1pPr eaLnBrk="0" hangingPunct="0">
+              <a:defRPr sz="2800" b="1">
+                <a:solidFill>
+                  <a:schemeClr val="tx1"/>
+                </a:solidFill>
+                <a:latin typeface="Arial" charset="0"/>
+              </a:defRPr>
+            </a:lvl1pPr>
+            <a:lvl2pPr marL="742950" indent="-285750" eaLnBrk="0" hangingPunct="0">
+              <a:defRPr sz="2800" b="1">
+                <a:solidFill>
+                  <a:schemeClr val="tx1"/>
+                </a:solidFill>
+                <a:latin typeface="Arial" charset="0"/>
+              </a:defRPr>
+            </a:lvl2pPr>
+            <a:lvl3pPr marL="1143000" indent="-228600" eaLnBrk="0" hangingPunct="0">
+              <a:defRPr sz="2800" b="1">
+                <a:solidFill>
+                  <a:schemeClr val="tx1"/>
+                </a:solidFill>
+                <a:latin typeface="Arial" charset="0"/>
+              </a:defRPr>
+            </a:lvl3pPr>
+            <a:lvl4pPr marL="1600200" indent="-228600" eaLnBrk="0" hangingPunct="0">
+              <a:defRPr sz="2800" b="1">
+                <a:solidFill>
+                  <a:schemeClr val="tx1"/>
+                </a:solidFill>
+                <a:latin typeface="Arial" charset="0"/>
+              </a:defRPr>
+            </a:lvl4pPr>
+            <a:lvl5pPr marL="2057400" indent="-228600" eaLnBrk="0" hangingPunct="0">
+              <a:defRPr sz="2800" b="1">
+                <a:solidFill>
+                  <a:schemeClr val="tx1"/>
+                </a:solidFill>
+                <a:latin typeface="Arial" charset="0"/>
+              </a:defRPr>
+            </a:lvl5pPr>
+            <a:lvl6pPr marL="2514600" indent="-228600" eaLnBrk="0" fontAlgn="base" hangingPunct="0">
+              <a:spcBef>
+                <a:spcPct val="0"/>
+              </a:spcBef>
+              <a:spcAft>
+                <a:spcPct val="0"/>
+              </a:spcAft>
+              <a:defRPr sz="2800" b="1">
+                <a:solidFill>
+                  <a:schemeClr val="tx1"/>
+                </a:solidFill>
+                <a:latin typeface="Arial" charset="0"/>
+              </a:defRPr>
+            </a:lvl6pPr>
+            <a:lvl7pPr marL="2971800" indent="-228600" eaLnBrk="0" fontAlgn="base" hangingPunct="0">
+              <a:spcBef>
+                <a:spcPct val="0"/>
+              </a:spcBef>
+              <a:spcAft>
+                <a:spcPct val="0"/>
+              </a:spcAft>
+              <a:defRPr sz="2800" b="1">
+                <a:solidFill>
+                  <a:schemeClr val="tx1"/>
+                </a:solidFill>
+                <a:latin typeface="Arial" charset="0"/>
+              </a:defRPr>
+            </a:lvl7pPr>
+            <a:lvl8pPr marL="3429000" indent="-228600" eaLnBrk="0" fontAlgn="base" hangingPunct="0">
+              <a:spcBef>
+                <a:spcPct val="0"/>
+              </a:spcBef>
+              <a:spcAft>
+                <a:spcPct val="0"/>
+              </a:spcAft>
+              <a:defRPr sz="2800" b="1">
+                <a:solidFill>
+                  <a:schemeClr val="tx1"/>
+                </a:solidFill>
+                <a:latin typeface="Arial" charset="0"/>
+              </a:defRPr>
+            </a:lvl8pPr>
+            <a:lvl9pPr marL="3886200" indent="-228600" eaLnBrk="0" fontAlgn="base" hangingPunct="0">
+              <a:spcBef>
+                <a:spcPct val="0"/>
+              </a:spcBef>
+              <a:spcAft>
+                <a:spcPct val="0"/>
+              </a:spcAft>
+              <a:defRPr sz="2800" b="1">
+                <a:solidFill>
+                  <a:schemeClr val="tx1"/>
+                </a:solidFill>
+                <a:latin typeface="Arial" charset="0"/>
+              </a:defRPr>
+            </a:lvl9pPr>
+          </a:lstStyle>
+          <a:p>
+            <a:r>
+              <a:rPr lang="en-US" sz="1400" b="0" smtClean="0">
+                <a:solidFill>
+                  <a:srgbClr val="FFFFFF"/>
+                </a:solidFill>
+              </a:rPr>
               <a:t>Teradyne Confidential and Proprietary</a:t>
             </a:r>
-            <a:endParaRPr lang="en-US"/>
           </a:p>
         </p:txBody>
       </p:sp>
     </p:spTree>
     <p:extLst>
       <p:ext uri="{BB962C8B-B14F-4D97-AF65-F5344CB8AC3E}">
-        <p14:creationId xmlns:p14="http://schemas.microsoft.com/office/powerpoint/2010/main" val="3377776425"/>
+        <p14:creationId xmlns:p14="http://schemas.microsoft.com/office/powerpoint/2010/main" val="890907130"/>
       </p:ext>
     </p:extLst>
   </p:cSld>
@@ -12314,52 +12586,55 @@
               <a:t>static </a:t>
             </a:r>
             <a:r>
-              <a:rPr lang="en-US" dirty="0" err="1" smtClean="0"/>
+              <a:rPr lang="en-US" dirty="0" err="1"/>
               <a:t>int</a:t>
             </a:r>
-            <a:endParaRPr lang="en-US" dirty="0" smtClean="0"/>
+            <a:r>
+              <a:rPr lang="en-US" dirty="0"/>
+              <a:t> </a:t>
+            </a:r>
+            <a:r>
+              <a:rPr lang="en-US" dirty="0" err="1"/>
+              <a:t>GenerateMultiplesFunctional</a:t>
+            </a:r>
+            <a:r>
+              <a:rPr lang="en-US" dirty="0" smtClean="0"/>
+              <a:t>() {</a:t>
+            </a:r>
+            <a:endParaRPr lang="en-US" dirty="0"/>
           </a:p>
           <a:p>
             <a:pPr marL="0" indent="0">
               <a:buNone/>
             </a:pPr>
             <a:r>
-              <a:rPr lang="en-US" dirty="0" err="1" smtClean="0"/>
-              <a:t>GenerateMultiplesFunctional</a:t>
+              <a:rPr lang="en-US" dirty="0"/>
+              <a:t>  </a:t>
             </a:r>
             <a:r>
               <a:rPr lang="en-US" dirty="0" smtClean="0"/>
-              <a:t>() </a:t>
-            </a:r>
-            <a:r>
-              <a:rPr lang="en-US" dirty="0" smtClean="0"/>
-              <a:t>{</a:t>
-            </a:r>
-            <a:endParaRPr lang="en-US" dirty="0"/>
+              <a:t>return</a:t>
+            </a:r>
           </a:p>
           <a:p>
             <a:pPr marL="0" indent="0">
               <a:buNone/>
             </a:pPr>
             <a:r>
+              <a:rPr lang="en-US" dirty="0" smtClean="0"/>
+              <a:t>    ranges</a:t>
+            </a:r>
+            <a:r>
               <a:rPr lang="en-US" dirty="0"/>
-              <a:t>  return boost::</a:t>
-            </a:r>
-            <a:r>
-              <a:rPr lang="en-US" dirty="0" smtClean="0"/>
-              <a:t>accumulate(</a:t>
-            </a:r>
-            <a:r>
-              <a:rPr lang="en-US" dirty="0" err="1" smtClean="0"/>
-              <a:t>MultiplesOf</a:t>
-            </a:r>
-            <a:r>
-              <a:rPr lang="en-US" dirty="0" smtClean="0"/>
-              <a:t>(3), </a:t>
+              <a:t>::accumulate(</a:t>
+            </a:r>
+            <a:r>
+              <a:rPr lang="en-US" dirty="0" err="1"/>
+              <a:t>strided_range</a:t>
             </a:r>
             <a:r>
               <a:rPr lang="en-US" dirty="0"/>
-              <a:t>0) +</a:t>
+              <a:t>(3, 1000, 3), 0) +</a:t>
             </a:r>
           </a:p>
           <a:p>
@@ -12368,31 +12643,23 @@
             </a:pPr>
             <a:r>
               <a:rPr lang="en-US" dirty="0"/>
-              <a:t>  </a:t>
+              <a:t>    </a:t>
             </a:r>
             <a:r>
               <a:rPr lang="en-US" dirty="0" smtClean="0"/>
-              <a:t>           </a:t>
+              <a:t>ranges</a:t>
             </a:r>
             <a:r>
               <a:rPr lang="en-US" dirty="0"/>
-              <a:t>boost::</a:t>
-            </a:r>
-            <a:r>
-              <a:rPr lang="en-US" dirty="0" smtClean="0"/>
-              <a:t>accumulate(</a:t>
-            </a:r>
-            <a:r>
-              <a:rPr lang="en-US" dirty="0" err="1" smtClean="0"/>
-              <a:t>MultiplesOf</a:t>
-            </a:r>
-            <a:r>
-              <a:rPr lang="en-US" dirty="0" smtClean="0"/>
-              <a:t>(5), </a:t>
+              <a:t>::accumulate(</a:t>
+            </a:r>
+            <a:r>
+              <a:rPr lang="en-US" dirty="0" err="1"/>
+              <a:t>strided_range</a:t>
             </a:r>
             <a:r>
               <a:rPr lang="en-US" dirty="0"/>
-              <a:t>0) -</a:t>
+              <a:t>(5, 1000, 5), 0) -</a:t>
             </a:r>
           </a:p>
           <a:p>
@@ -12401,39 +12668,23 @@
             </a:pPr>
             <a:r>
               <a:rPr lang="en-US" dirty="0"/>
-              <a:t>      </a:t>
+              <a:t>    </a:t>
             </a:r>
             <a:r>
               <a:rPr lang="en-US" dirty="0" smtClean="0"/>
-              <a:t>       </a:t>
+              <a:t>ranges</a:t>
             </a:r>
             <a:r>
               <a:rPr lang="en-US" dirty="0"/>
-              <a:t>boost::</a:t>
-            </a:r>
-            <a:r>
-              <a:rPr lang="en-US" dirty="0" smtClean="0"/>
-              <a:t>accumulate(</a:t>
-            </a:r>
-            <a:r>
-              <a:rPr lang="en-US" dirty="0" err="1" smtClean="0"/>
-              <a:t>MultiplesOf</a:t>
-            </a:r>
-            <a:r>
-              <a:rPr lang="en-US" dirty="0" smtClean="0"/>
-              <a:t>(3 </a:t>
+              <a:t>::accumulate(</a:t>
+            </a:r>
+            <a:r>
+              <a:rPr lang="en-US" dirty="0" err="1"/>
+              <a:t>strided_range</a:t>
             </a:r>
             <a:r>
               <a:rPr lang="en-US" dirty="0"/>
-              <a:t>* </a:t>
-            </a:r>
-            <a:r>
-              <a:rPr lang="en-US" dirty="0" smtClean="0"/>
-              <a:t>5), </a:t>
-            </a:r>
-            <a:r>
-              <a:rPr lang="en-US" dirty="0"/>
-              <a:t>0);</a:t>
+              <a:t>(15, 1000, 15), 0);</a:t>
             </a:r>
           </a:p>
           <a:p>
@@ -12441,10 +12692,9 @@
               <a:buNone/>
             </a:pPr>
             <a:r>
-              <a:rPr lang="en-US" dirty="0" smtClean="0"/>
+              <a:rPr lang="en-US" dirty="0"/>
               <a:t>}</a:t>
             </a:r>
-            <a:endParaRPr lang="en-US" dirty="0"/>
           </a:p>
         </p:txBody>
       </p:sp>
@@ -12477,7 +12727,7 @@
     </p:spTree>
     <p:extLst>
       <p:ext uri="{BB962C8B-B14F-4D97-AF65-F5344CB8AC3E}">
-        <p14:creationId xmlns:p14="http://schemas.microsoft.com/office/powerpoint/2010/main" val="104627754"/>
+        <p14:creationId xmlns:p14="http://schemas.microsoft.com/office/powerpoint/2010/main" val="3377776425"/>
       </p:ext>
     </p:extLst>
   </p:cSld>
@@ -12543,7 +12793,7 @@
             <p:ph idx="1"/>
             <p:extLst>
               <p:ext uri="{D42A27DB-BD31-4B8C-83A1-F6EECF244321}">
-                <p14:modId xmlns:p14="http://schemas.microsoft.com/office/powerpoint/2010/main" val="1251952064"/>
+                <p14:modId xmlns:p14="http://schemas.microsoft.com/office/powerpoint/2010/main" val="1208039072"/>
               </p:ext>
             </p:extLst>
           </p:nvPr>
@@ -12914,7 +13164,7 @@
                             <a:srgbClr val="FFFF00"/>
                           </a:solidFill>
                         </a:rPr>
-                        <a:t>0.19</a:t>
+                        <a:t>0.0033</a:t>
                       </a:r>
                       <a:endParaRPr lang="en-US" dirty="0">
                         <a:ln>
@@ -13049,7 +13299,7 @@
                             <a:srgbClr val="FFFF00"/>
                           </a:solidFill>
                         </a:rPr>
-                        <a:t>5.1</a:t>
+                        <a:t>4.9</a:t>
                       </a:r>
                       <a:endParaRPr lang="en-US" dirty="0">
                         <a:ln>
@@ -13116,7 +13366,7 @@
                             <a:srgbClr val="FFFF00"/>
                           </a:solidFill>
                         </a:rPr>
-                        <a:t>0.28</a:t>
+                        <a:t>0.0016</a:t>
                       </a:r>
                       <a:endParaRPr lang="en-US" dirty="0">
                         <a:ln>
@@ -13251,7 +13501,7 @@
                             <a:srgbClr val="FFFF00"/>
                           </a:solidFill>
                         </a:rPr>
-                        <a:t>4.1</a:t>
+                        <a:t>3.9</a:t>
                       </a:r>
                       <a:endParaRPr lang="en-US" dirty="0">
                         <a:ln>
@@ -13318,7 +13568,7 @@
                             <a:srgbClr val="FFFF00"/>
                           </a:solidFill>
                         </a:rPr>
-                        <a:t>1.6</a:t>
+                        <a:t>1.7</a:t>
                       </a:r>
                       <a:endParaRPr lang="en-US" dirty="0">
                         <a:ln>
@@ -13453,7 +13703,7 @@
                             <a:srgbClr val="FFFF00"/>
                           </a:solidFill>
                         </a:rPr>
-                        <a:t>14.8</a:t>
+                        <a:t>14.9</a:t>
                       </a:r>
                       <a:endParaRPr lang="en-US" dirty="0">
                         <a:ln>
@@ -13731,7 +13981,7 @@
         <p:spPr>
           <a:xfrm>
             <a:off x="680224" y="3182790"/>
-            <a:ext cx="7861610" cy="1815882"/>
+            <a:ext cx="7861610" cy="2677656"/>
           </a:xfrm>
           <a:prstGeom prst="rect">
             <a:avLst/>
@@ -13768,7 +14018,29 @@
                   <a:srgbClr val="FFFF00"/>
                 </a:solidFill>
               </a:rPr>
-              <a:t>C++ is still significantly faster than C#</a:t>
+              <a:t>C++ is still significantly faster than C</a:t>
+            </a:r>
+            <a:r>
+              <a:rPr lang="en-US" b="0" dirty="0" smtClean="0">
+                <a:solidFill>
+                  <a:srgbClr val="FFFF00"/>
+                </a:solidFill>
+              </a:rPr>
+              <a:t>#</a:t>
+            </a:r>
+          </a:p>
+          <a:p>
+            <a:pPr marL="457200" indent="-457200">
+              <a:buFont typeface="Arial" pitchFamily="34" charset="0"/>
+              <a:buChar char="•"/>
+            </a:pPr>
+            <a:r>
+              <a:rPr lang="en-US" b="0" dirty="0" smtClean="0">
+                <a:solidFill>
+                  <a:srgbClr val="FFFF00"/>
+                </a:solidFill>
+              </a:rPr>
+              <a:t>Functional C++ code is faster than imperative C++ code?</a:t>
             </a:r>
             <a:endParaRPr lang="en-US" b="0" dirty="0" smtClean="0">
               <a:solidFill>
@@ -14355,15 +14627,7 @@
             </a:pPr>
             <a:r>
               <a:rPr lang="en-US" dirty="0" smtClean="0"/>
-              <a:t>// Compute the sum of [x, </a:t>
-            </a:r>
-            <a:r>
-              <a:rPr lang="en-US" dirty="0" smtClean="0"/>
-              <a:t>1000) </a:t>
-            </a:r>
-            <a:r>
-              <a:rPr lang="en-US" dirty="0" smtClean="0"/>
-              <a:t>step x using </a:t>
+              <a:t>// Compute the sum of [x, 1000) step x using </a:t>
             </a:r>
           </a:p>
           <a:p>
@@ -14405,15 +14669,7 @@
             </a:r>
             <a:r>
               <a:rPr lang="en-US" dirty="0" smtClean="0"/>
-              <a:t> </a:t>
-            </a:r>
-            <a:r>
-              <a:rPr lang="en-US" dirty="0" smtClean="0"/>
-              <a:t>x) </a:t>
-            </a:r>
-            <a:r>
-              <a:rPr lang="en-US" dirty="0" smtClean="0"/>
-              <a:t>{</a:t>
+              <a:t> x) {</a:t>
             </a:r>
           </a:p>
           <a:p>
@@ -14434,15 +14690,7 @@
             </a:r>
             <a:r>
               <a:rPr lang="en-US" dirty="0" smtClean="0"/>
-              <a:t> p = </a:t>
-            </a:r>
-            <a:r>
-              <a:rPr lang="en-US" dirty="0" smtClean="0"/>
-              <a:t>(1000 </a:t>
-            </a:r>
-            <a:r>
-              <a:rPr lang="en-US" dirty="0" smtClean="0"/>
-              <a:t>- 1) / x;</a:t>
+              <a:t> p = (1000 - 1) / x;</a:t>
             </a:r>
           </a:p>
           <a:p>
@@ -14711,11 +14959,7 @@
             </a:r>
             <a:r>
               <a:rPr lang="en-US" dirty="0" smtClean="0"/>
-              <a:t>() </a:t>
-            </a:r>
-            <a:r>
-              <a:rPr lang="en-US" dirty="0" smtClean="0"/>
-              <a:t>{</a:t>
+              <a:t>() {</a:t>
             </a:r>
             <a:endParaRPr lang="en-US" dirty="0"/>
           </a:p>
@@ -14733,11 +14977,7 @@
             </a:r>
             <a:r>
               <a:rPr lang="en-US" dirty="0" smtClean="0"/>
-              <a:t>(3) </a:t>
-            </a:r>
-            <a:r>
-              <a:rPr lang="en-US" dirty="0" smtClean="0"/>
-              <a:t>+</a:t>
+              <a:t>(3) +</a:t>
             </a:r>
           </a:p>
           <a:p>
@@ -14758,11 +14998,7 @@
             </a:r>
             <a:r>
               <a:rPr lang="en-US" dirty="0" smtClean="0"/>
-              <a:t>(5) </a:t>
-            </a:r>
-            <a:r>
-              <a:rPr lang="en-US" dirty="0" smtClean="0"/>
-              <a:t>–</a:t>
+              <a:t>(5) –</a:t>
             </a:r>
           </a:p>
           <a:p>
@@ -14876,7 +15112,7 @@
             <p:ph idx="1"/>
             <p:extLst>
               <p:ext uri="{D42A27DB-BD31-4B8C-83A1-F6EECF244321}">
-                <p14:modId xmlns:p14="http://schemas.microsoft.com/office/powerpoint/2010/main" val="633648291"/>
+                <p14:modId xmlns:p14="http://schemas.microsoft.com/office/powerpoint/2010/main" val="4258463525"/>
               </p:ext>
             </p:extLst>
           </p:nvPr>
@@ -15247,7 +15483,7 @@
                             <a:srgbClr val="FFFF00"/>
                           </a:solidFill>
                         </a:rPr>
-                        <a:t>0.0019</a:t>
+                        <a:t>0.0033</a:t>
                       </a:r>
                       <a:endParaRPr lang="en-US" dirty="0">
                         <a:ln>
@@ -15449,7 +15685,7 @@
                             <a:srgbClr val="FFFF00"/>
                           </a:solidFill>
                         </a:rPr>
-                        <a:t>0.19</a:t>
+                        <a:t>0.0033</a:t>
                       </a:r>
                       <a:endParaRPr lang="en-US" dirty="0">
                         <a:ln>
@@ -15584,7 +15820,7 @@
                             <a:srgbClr val="FFFF00"/>
                           </a:solidFill>
                         </a:rPr>
-                        <a:t>5.1</a:t>
+                        <a:t>5.9</a:t>
                       </a:r>
                       <a:endParaRPr lang="en-US" dirty="0">
                         <a:ln>
@@ -15651,7 +15887,7 @@
                             <a:srgbClr val="FFFF00"/>
                           </a:solidFill>
                         </a:rPr>
-                        <a:t>0.28</a:t>
+                        <a:t>0.0016</a:t>
                       </a:r>
                       <a:endParaRPr lang="en-US" dirty="0">
                         <a:ln>
@@ -15786,7 +16022,7 @@
                             <a:srgbClr val="FFFF00"/>
                           </a:solidFill>
                         </a:rPr>
-                        <a:t>4.1</a:t>
+                        <a:t>3.9</a:t>
                       </a:r>
                       <a:endParaRPr lang="en-US" dirty="0">
                         <a:ln>
@@ -15853,7 +16089,7 @@
                             <a:srgbClr val="FFFF00"/>
                           </a:solidFill>
                         </a:rPr>
-                        <a:t>1.6</a:t>
+                        <a:t>1.7</a:t>
                       </a:r>
                       <a:endParaRPr lang="en-US" dirty="0">
                         <a:ln>
@@ -15988,7 +16224,7 @@
                             <a:srgbClr val="FFFF00"/>
                           </a:solidFill>
                         </a:rPr>
-                        <a:t>14.8</a:t>
+                        <a:t>14.9</a:t>
                       </a:r>
                       <a:endParaRPr lang="en-US" dirty="0">
                         <a:ln>
@@ -16449,22 +16685,13 @@
           <a:p>
             <a:r>
               <a:rPr lang="en-US" dirty="0" smtClean="0"/>
-              <a:t>Be wary of functional code in inner loops in high-performance </a:t>
-            </a:r>
+              <a:t>Be wary of functional code in inner loops in high-performance code</a:t>
+            </a:r>
+          </a:p>
+          <a:p>
             <a:r>
               <a:rPr lang="en-US" dirty="0" smtClean="0"/>
-              <a:t>code</a:t>
-            </a:r>
-            <a:endParaRPr lang="en-US" dirty="0" smtClean="0"/>
-          </a:p>
-          <a:p>
-            <a:r>
-              <a:rPr lang="en-US" dirty="0" smtClean="0"/>
-              <a:t>Write </a:t>
-            </a:r>
-            <a:r>
-              <a:rPr lang="en-US" dirty="0" smtClean="0"/>
-              <a:t>it both ways and measure!</a:t>
+              <a:t>Write it both ways and measure!</a:t>
             </a:r>
           </a:p>
           <a:p>
@@ -16714,7 +16941,11 @@
           <a:p>
             <a:r>
               <a:rPr lang="en-US" dirty="0" smtClean="0"/>
-              <a:t>Further Reading</a:t>
+              <a:t>Further </a:t>
+            </a:r>
+            <a:r>
+              <a:rPr lang="en-US" dirty="0" smtClean="0"/>
+              <a:t>Reading C#</a:t>
             </a:r>
             <a:endParaRPr lang="en-US" dirty="0"/>
           </a:p>
@@ -17229,6 +17460,234 @@
 </p:sld>
 </file>
 
+<file path=ppt/slides/slide30.xml><?xml version="1.0" encoding="utf-8"?>
+<p:sld xmlns:a="http://schemas.openxmlformats.org/drawingml/2006/main" xmlns:r="http://schemas.openxmlformats.org/officeDocument/2006/relationships" xmlns:p="http://schemas.openxmlformats.org/presentationml/2006/main">
+  <p:cSld>
+    <p:spTree>
+      <p:nvGrpSpPr>
+        <p:cNvPr id="1" name=""/>
+        <p:cNvGrpSpPr/>
+        <p:nvPr/>
+      </p:nvGrpSpPr>
+      <p:grpSpPr>
+        <a:xfrm>
+          <a:off x="0" y="0"/>
+          <a:ext cx="0" cy="0"/>
+          <a:chOff x="0" y="0"/>
+          <a:chExt cx="0" cy="0"/>
+        </a:xfrm>
+      </p:grpSpPr>
+      <p:sp>
+        <p:nvSpPr>
+          <p:cNvPr id="2" name="Title 1"/>
+          <p:cNvSpPr>
+            <a:spLocks noGrp="1"/>
+          </p:cNvSpPr>
+          <p:nvPr>
+            <p:ph type="title"/>
+          </p:nvPr>
+        </p:nvSpPr>
+        <p:spPr/>
+        <p:txBody>
+          <a:bodyPr/>
+          <a:lstStyle/>
+          <a:p>
+            <a:r>
+              <a:rPr lang="en-US" dirty="0" smtClean="0"/>
+              <a:t>Further </a:t>
+            </a:r>
+            <a:r>
+              <a:rPr lang="en-US" dirty="0" smtClean="0"/>
+              <a:t>Reading C++</a:t>
+            </a:r>
+            <a:endParaRPr lang="en-US" dirty="0"/>
+          </a:p>
+        </p:txBody>
+      </p:sp>
+      <p:sp>
+        <p:nvSpPr>
+          <p:cNvPr id="3" name="Content Placeholder 2"/>
+          <p:cNvSpPr>
+            <a:spLocks noGrp="1"/>
+          </p:cNvSpPr>
+          <p:nvPr>
+            <p:ph idx="1"/>
+          </p:nvPr>
+        </p:nvSpPr>
+        <p:spPr>
+          <a:xfrm>
+            <a:off x="172379" y="1595437"/>
+            <a:ext cx="6350620" cy="4929188"/>
+          </a:xfrm>
+        </p:spPr>
+        <p:txBody>
+          <a:bodyPr/>
+          <a:lstStyle/>
+          <a:p>
+            <a:r>
+              <a:rPr lang="en-US" dirty="0" smtClean="0"/>
+              <a:t>Ranges v3 </a:t>
+            </a:r>
+            <a:r>
+              <a:rPr lang="en-US" dirty="0" smtClean="0">
+                <a:hlinkClick r:id="rId2"/>
+              </a:rPr>
+              <a:t>https</a:t>
+            </a:r>
+            <a:r>
+              <a:rPr lang="en-US" dirty="0">
+                <a:hlinkClick r:id="rId2"/>
+              </a:rPr>
+              <a:t>://ericniebler.github.io/range-v3/</a:t>
+            </a:r>
+            <a:endParaRPr lang="en-US" dirty="0" smtClean="0"/>
+          </a:p>
+          <a:p>
+            <a:r>
+              <a:rPr lang="en-US" dirty="0" smtClean="0"/>
+              <a:t>Elements of Programming by Alexander </a:t>
+            </a:r>
+            <a:r>
+              <a:rPr lang="en-US" dirty="0" err="1" smtClean="0"/>
+              <a:t>Stepanov</a:t>
+            </a:r>
+            <a:r>
+              <a:rPr lang="en-US" dirty="0" smtClean="0"/>
+              <a:t> and Paul </a:t>
+            </a:r>
+            <a:r>
+              <a:rPr lang="en-US" dirty="0" err="1" smtClean="0"/>
+              <a:t>McJones</a:t>
+            </a:r>
+            <a:endParaRPr lang="en-US" dirty="0" smtClean="0"/>
+          </a:p>
+          <a:p>
+            <a:r>
+              <a:rPr lang="en-US" dirty="0" smtClean="0">
+                <a:hlinkClick r:id="rId3"/>
+              </a:rPr>
+              <a:t>http://www.stepanovpapers.com</a:t>
+            </a:r>
+            <a:endParaRPr lang="en-US" dirty="0" smtClean="0"/>
+          </a:p>
+          <a:p>
+            <a:endParaRPr lang="en-US" dirty="0" smtClean="0"/>
+          </a:p>
+          <a:p>
+            <a:endParaRPr lang="en-US" dirty="0"/>
+          </a:p>
+        </p:txBody>
+      </p:sp>
+      <p:sp>
+        <p:nvSpPr>
+          <p:cNvPr id="4" name="Footer Placeholder 3"/>
+          <p:cNvSpPr>
+            <a:spLocks noGrp="1"/>
+          </p:cNvSpPr>
+          <p:nvPr>
+            <p:ph type="ftr" sz="quarter" idx="11"/>
+          </p:nvPr>
+        </p:nvSpPr>
+        <p:spPr/>
+        <p:txBody>
+          <a:bodyPr/>
+          <a:lstStyle/>
+          <a:p>
+            <a:pPr>
+              <a:defRPr/>
+            </a:pPr>
+            <a:r>
+              <a:rPr lang="en-US" smtClean="0"/>
+              <a:t>Teradyne Confidential and Proprietary</a:t>
+            </a:r>
+            <a:endParaRPr lang="en-US"/>
+          </a:p>
+        </p:txBody>
+      </p:sp>
+      <p:pic>
+        <p:nvPicPr>
+          <p:cNvPr id="5" name="Picture 2"/>
+          <p:cNvPicPr>
+            <a:picLocks noChangeAspect="1" noChangeArrowheads="1"/>
+          </p:cNvPicPr>
+          <p:nvPr/>
+        </p:nvPicPr>
+        <p:blipFill>
+          <a:blip r:embed="rId4">
+            <a:extLst>
+              <a:ext uri="{28A0092B-C50C-407E-A947-70E740481C1C}">
+                <a14:useLocalDpi xmlns:a14="http://schemas.microsoft.com/office/drawing/2010/main" val="0"/>
+              </a:ext>
+            </a:extLst>
+          </a:blip>
+          <a:srcRect/>
+          <a:stretch>
+            <a:fillRect/>
+          </a:stretch>
+        </p:blipFill>
+        <p:spPr bwMode="auto">
+          <a:xfrm>
+            <a:off x="6598975" y="1658983"/>
+            <a:ext cx="2440521" cy="3536496"/>
+          </a:xfrm>
+          <a:prstGeom prst="rect">
+            <a:avLst/>
+          </a:prstGeom>
+          <a:noFill/>
+          <a:ln>
+            <a:noFill/>
+          </a:ln>
+          <a:effectLst/>
+          <a:extLst>
+            <a:ext uri="{909E8E84-426E-40DD-AFC4-6F175D3DCCD1}">
+              <a14:hiddenFill xmlns:a14="http://schemas.microsoft.com/office/drawing/2010/main">
+                <a:solidFill>
+                  <a:schemeClr val="accent1"/>
+                </a:solidFill>
+              </a14:hiddenFill>
+            </a:ext>
+            <a:ext uri="{91240B29-F687-4F45-9708-019B960494DF}">
+              <a14:hiddenLine xmlns:a14="http://schemas.microsoft.com/office/drawing/2010/main" w="9525">
+                <a:solidFill>
+                  <a:schemeClr val="tx1"/>
+                </a:solidFill>
+                <a:miter lim="800000"/>
+                <a:headEnd/>
+                <a:tailEnd/>
+              </a14:hiddenLine>
+            </a:ext>
+            <a:ext uri="{AF507438-7753-43E0-B8FC-AC1667EBCBE1}">
+              <a14:hiddenEffects xmlns:a14="http://schemas.microsoft.com/office/drawing/2010/main">
+                <a:effectLst>
+                  <a:outerShdw dist="35921" dir="2700000" algn="ctr" rotWithShape="0">
+                    <a:schemeClr val="bg2"/>
+                  </a:outerShdw>
+                </a:effectLst>
+              </a14:hiddenEffects>
+            </a:ext>
+          </a:extLst>
+        </p:spPr>
+      </p:pic>
+    </p:spTree>
+    <p:extLst>
+      <p:ext uri="{BB962C8B-B14F-4D97-AF65-F5344CB8AC3E}">
+        <p14:creationId xmlns:p14="http://schemas.microsoft.com/office/powerpoint/2010/main" val="2718821424"/>
+      </p:ext>
+    </p:extLst>
+  </p:cSld>
+  <p:clrMapOvr>
+    <a:masterClrMapping/>
+  </p:clrMapOvr>
+  <p:timing>
+    <p:tnLst>
+      <p:par>
+        <p:cTn id="1" dur="indefinite" restart="never" nodeType="tmRoot"/>
+      </p:par>
+    </p:tnLst>
+  </p:timing>
+</p:sld>
+</file>
+
 <file path=ppt/slides/slide4.xml><?xml version="1.0" encoding="utf-8"?>
 <p:sld xmlns:a="http://schemas.openxmlformats.org/drawingml/2006/main" xmlns:r="http://schemas.openxmlformats.org/officeDocument/2006/relationships" xmlns:p="http://schemas.openxmlformats.org/presentationml/2006/main">
   <p:cSld>
@@ -17617,11 +18076,7 @@
             </a:r>
             <a:r>
               <a:rPr lang="en-US" sz="2400" dirty="0" smtClean="0"/>
-              <a:t>() </a:t>
-            </a:r>
-            <a:r>
-              <a:rPr lang="en-US" sz="2400" dirty="0" smtClean="0"/>
-              <a:t>{</a:t>
+              <a:t>() {</a:t>
             </a:r>
             <a:endParaRPr lang="en-US" sz="2400" dirty="0"/>
           </a:p>
@@ -17688,11 +18143,7 @@
             </a:r>
             <a:r>
               <a:rPr lang="en-US" sz="2400" dirty="0" smtClean="0"/>
-              <a:t>1000</a:t>
-            </a:r>
-            <a:r>
-              <a:rPr lang="en-US" sz="2400" dirty="0" smtClean="0"/>
-              <a:t>; </a:t>
+              <a:t>1000; </a:t>
             </a:r>
             <a:r>
               <a:rPr lang="en-US" sz="2400" dirty="0"/>
@@ -18428,15 +18879,7 @@
             </a:r>
             <a:r>
               <a:rPr lang="en-US" sz="2400" dirty="0" smtClean="0"/>
-              <a:t>, assign 1 to it, compare it against </a:t>
-            </a:r>
-            <a:r>
-              <a:rPr lang="en-US" sz="2400" dirty="0" smtClean="0"/>
-              <a:t>1000, </a:t>
-            </a:r>
-            <a:r>
-              <a:rPr lang="en-US" sz="2400" dirty="0" smtClean="0"/>
-              <a:t>increment it</a:t>
+              <a:t>, assign 1 to it, compare it against 1000, increment it</a:t>
             </a:r>
           </a:p>
           <a:p>
@@ -18454,11 +18897,7 @@
           <a:p>
             <a:r>
               <a:rPr lang="en-US" sz="2400" dirty="0" smtClean="0"/>
-              <a:t>e.g. generate a sequence of integers from 1 to </a:t>
-            </a:r>
-            <a:r>
-              <a:rPr lang="en-US" sz="2400" dirty="0" smtClean="0"/>
-              <a:t>1000</a:t>
+              <a:t>e.g. generate a sequence of integers from 1 to 1000</a:t>
             </a:r>
             <a:endParaRPr lang="en-US" sz="2400" dirty="0"/>
           </a:p>
@@ -18766,11 +19205,7 @@
             </a:r>
             <a:r>
               <a:rPr lang="en-US" sz="2400" dirty="0" smtClean="0"/>
-              <a:t>() </a:t>
-            </a:r>
-            <a:r>
-              <a:rPr lang="en-US" sz="2400" dirty="0" smtClean="0"/>
-              <a:t>{</a:t>
+              <a:t>() {</a:t>
             </a:r>
             <a:endParaRPr lang="en-US" sz="2400" dirty="0"/>
           </a:p>
@@ -19343,18 +19778,16 @@
           </a:p>
           <a:p>
             <a:r>
-              <a:rPr lang="en-US" sz="2400" dirty="0" smtClean="0"/>
-              <a:t>The C++ equivalent is a pair of iterators.</a:t>
-            </a:r>
-          </a:p>
-          <a:p>
-            <a:r>
               <a:rPr lang="en-US" sz="2400" dirty="0" err="1" smtClean="0"/>
               <a:t>Enumerable.Range</a:t>
             </a:r>
             <a:r>
               <a:rPr lang="en-US" sz="2400" dirty="0" smtClean="0"/>
-              <a:t> returns an </a:t>
+              <a:t> </a:t>
+            </a:r>
+            <a:r>
+              <a:rPr lang="en-US" sz="2400" dirty="0" smtClean="0"/>
+              <a:t>returns an </a:t>
             </a:r>
             <a:r>
               <a:rPr lang="en-US" sz="2400" dirty="0" err="1" smtClean="0"/>

</xml_diff>